<commit_message>
Change IP adress back
</commit_message>
<xml_diff>
--- a/pitch/pitch.pptx
+++ b/pitch/pitch.pptx
@@ -122,7 +122,7 @@
   </p:defaultTextStyle>
   <p:extLst>
     <p:ext uri="{EFAFB233-063F-42B5-8137-9DF3F51BA10A}">
-      <p15:sldGuideLst xmlns:p15="http://schemas.microsoft.com/office/powerpoint/2012/main" xmlns="">
+      <p15:sldGuideLst xmlns:p15="http://schemas.microsoft.com/office/powerpoint/2012/main">
         <p15:guide id="3" pos="294" userDrawn="1">
           <p15:clr>
             <a:srgbClr val="A4A3A4"/>
@@ -136,7 +136,7 @@
       </p15:sldGuideLst>
     </p:ext>
     <p:ext uri="{2D200454-40CA-4A62-9FC3-DE9A4176ACB9}">
-      <p15:notesGuideLst xmlns:p15="http://schemas.microsoft.com/office/powerpoint/2012/main" xmlns=""/>
+      <p15:notesGuideLst xmlns:p15="http://schemas.microsoft.com/office/powerpoint/2012/main"/>
     </p:ext>
   </p:extLst>
 </p:presentation>
@@ -228,7 +228,7 @@
             <a:pPr algn="l"/>
             <a:fld id="{5ED5F780-471C-4CCE-BB88-8634FF48E50C}" type="datetime1">
               <a:rPr lang="de-DE" sz="800" smtClean="0"/>
-              <a:t>07.07.2022</a:t>
+              <a:t>08.07.2022</a:t>
             </a:fld>
             <a:endParaRPr lang="en-US" sz="800"/>
           </a:p>
@@ -316,7 +316,7 @@
   <p:hf/>
   <p:extLst>
     <p:ext uri="{56416CCD-93CA-4268-BC5B-53C4BB910035}">
-      <p15:sldGuideLst xmlns:p15="http://schemas.microsoft.com/office/powerpoint/2012/main" xmlns="">
+      <p15:sldGuideLst xmlns:p15="http://schemas.microsoft.com/office/powerpoint/2012/main">
         <p15:guide id="1" orient="horz" pos="2880" userDrawn="1">
           <p15:clr>
             <a:srgbClr val="F26B43"/>
@@ -423,7 +423,7 @@
           <a:p>
             <a:fld id="{C284191B-A352-458B-81F0-1FA2149F7941}" type="datetime1">
               <a:rPr lang="de-DE" smtClean="0"/>
-              <a:t>07.07.2022</a:t>
+              <a:t>08.07.2022</a:t>
             </a:fld>
             <a:endParaRPr lang="en-US"/>
           </a:p>
@@ -724,7 +724,7 @@
   </p:notesStyle>
   <p:extLst>
     <p:ext uri="{620B2872-D7B9-4A21-9093-7833F8D536E1}">
-      <p15:sldGuideLst xmlns:p15="http://schemas.microsoft.com/office/powerpoint/2012/main" xmlns="">
+      <p15:sldGuideLst xmlns:p15="http://schemas.microsoft.com/office/powerpoint/2012/main">
         <p15:guide id="1" orient="horz" pos="2880" userDrawn="1">
           <p15:clr>
             <a:srgbClr val="F26B43"/>
@@ -872,10 +872,10 @@
           <p:cNvPr id="7" name="Grafik 6">
             <a:extLst>
               <a:ext uri="{FF2B5EF4-FFF2-40B4-BE49-F238E27FC236}">
-                <a16:creationId xmlns:a16="http://schemas.microsoft.com/office/drawing/2014/main" xmlns="" id="{18916216-B032-4200-99C8-5BA3A21F8800}"/>
+                <a16:creationId xmlns:a16="http://schemas.microsoft.com/office/drawing/2014/main" id="{18916216-B032-4200-99C8-5BA3A21F8800}"/>
               </a:ext>
               <a:ext uri="{C183D7F6-B498-43B3-948B-1728B52AA6E4}">
-                <adec:decorative xmlns:adec="http://schemas.microsoft.com/office/drawing/2017/decorative" xmlns="" val="1"/>
+                <adec:decorative xmlns:adec="http://schemas.microsoft.com/office/drawing/2017/decorative" val="1"/>
               </a:ext>
             </a:extLst>
           </p:cNvPr>
@@ -911,10 +911,10 @@
           <p:cNvPr id="8" name="Grafik 7">
             <a:extLst>
               <a:ext uri="{FF2B5EF4-FFF2-40B4-BE49-F238E27FC236}">
-                <a16:creationId xmlns:a16="http://schemas.microsoft.com/office/drawing/2014/main" xmlns="" id="{A72007CB-CD36-48DD-9918-1BFC87D15E94}"/>
+                <a16:creationId xmlns:a16="http://schemas.microsoft.com/office/drawing/2014/main" id="{A72007CB-CD36-48DD-9918-1BFC87D15E94}"/>
               </a:ext>
               <a:ext uri="{C183D7F6-B498-43B3-948B-1728B52AA6E4}">
-                <adec:decorative xmlns:adec="http://schemas.microsoft.com/office/drawing/2017/decorative" xmlns="" val="1"/>
+                <adec:decorative xmlns:adec="http://schemas.microsoft.com/office/drawing/2017/decorative" val="1"/>
               </a:ext>
             </a:extLst>
           </p:cNvPr>
@@ -987,7 +987,7 @@
           <p:cNvPr id="3" name="Titel 2">
             <a:extLst>
               <a:ext uri="{FF2B5EF4-FFF2-40B4-BE49-F238E27FC236}">
-                <a16:creationId xmlns:a16="http://schemas.microsoft.com/office/drawing/2014/main" xmlns="" id="{86BA6808-8CD4-4528-935A-3978EF1718CF}"/>
+                <a16:creationId xmlns:a16="http://schemas.microsoft.com/office/drawing/2014/main" id="{86BA6808-8CD4-4528-935A-3978EF1718CF}"/>
               </a:ext>
             </a:extLst>
           </p:cNvPr>
@@ -1122,7 +1122,7 @@
           <p:cNvPr id="14" name="Textplatzhalter 10">
             <a:extLst>
               <a:ext uri="{FF2B5EF4-FFF2-40B4-BE49-F238E27FC236}">
-                <a16:creationId xmlns:a16="http://schemas.microsoft.com/office/drawing/2014/main" xmlns="" id="{3A6FC492-F4FE-474B-9BFE-DAAE645B98B7}"/>
+                <a16:creationId xmlns:a16="http://schemas.microsoft.com/office/drawing/2014/main" id="{3A6FC492-F4FE-474B-9BFE-DAAE645B98B7}"/>
               </a:ext>
             </a:extLst>
           </p:cNvPr>
@@ -1216,10 +1216,10 @@
           <p:cNvPr id="10" name="Freihandform: Form 9">
             <a:extLst>
               <a:ext uri="{FF2B5EF4-FFF2-40B4-BE49-F238E27FC236}">
-                <a16:creationId xmlns:a16="http://schemas.microsoft.com/office/drawing/2014/main" xmlns="" id="{15285CE5-013A-4554-99D3-E6E1B753071F}"/>
+                <a16:creationId xmlns:a16="http://schemas.microsoft.com/office/drawing/2014/main" id="{15285CE5-013A-4554-99D3-E6E1B753071F}"/>
               </a:ext>
               <a:ext uri="{C183D7F6-B498-43B3-948B-1728B52AA6E4}">
-                <adec:decorative xmlns:adec="http://schemas.microsoft.com/office/drawing/2017/decorative" xmlns="" val="1"/>
+                <adec:decorative xmlns:adec="http://schemas.microsoft.com/office/drawing/2017/decorative" val="1"/>
               </a:ext>
             </a:extLst>
           </p:cNvPr>
@@ -1634,7 +1634,7 @@
           <p:cNvPr id="6" name="object 3">
             <a:extLst>
               <a:ext uri="{C183D7F6-B498-43B3-948B-1728B52AA6E4}">
-                <adec:decorative xmlns:adec="http://schemas.microsoft.com/office/drawing/2017/decorative" xmlns="" val="1"/>
+                <adec:decorative xmlns:adec="http://schemas.microsoft.com/office/drawing/2017/decorative" val="1"/>
               </a:ext>
             </a:extLst>
           </p:cNvPr>
@@ -1920,10 +1920,10 @@
           <p:cNvPr id="8" name="Grafik 7">
             <a:extLst>
               <a:ext uri="{FF2B5EF4-FFF2-40B4-BE49-F238E27FC236}">
-                <a16:creationId xmlns:a16="http://schemas.microsoft.com/office/drawing/2014/main" xmlns="" id="{0B21D629-C43C-4D84-9C1B-3D969EC17A69}"/>
+                <a16:creationId xmlns:a16="http://schemas.microsoft.com/office/drawing/2014/main" id="{0B21D629-C43C-4D84-9C1B-3D969EC17A69}"/>
               </a:ext>
               <a:ext uri="{C183D7F6-B498-43B3-948B-1728B52AA6E4}">
-                <adec:decorative xmlns:adec="http://schemas.microsoft.com/office/drawing/2017/decorative" xmlns="" val="1"/>
+                <adec:decorative xmlns:adec="http://schemas.microsoft.com/office/drawing/2017/decorative" val="1"/>
               </a:ext>
             </a:extLst>
           </p:cNvPr>
@@ -2063,10 +2063,10 @@
           <p:cNvPr id="5" name="Datumsplatzhalter 4">
             <a:extLst>
               <a:ext uri="{FF2B5EF4-FFF2-40B4-BE49-F238E27FC236}">
-                <a16:creationId xmlns:a16="http://schemas.microsoft.com/office/drawing/2014/main" xmlns="" id="{B6086A93-C998-4DD4-907D-8C07509ABF98}"/>
+                <a16:creationId xmlns:a16="http://schemas.microsoft.com/office/drawing/2014/main" id="{B6086A93-C998-4DD4-907D-8C07509ABF98}"/>
               </a:ext>
               <a:ext uri="{C183D7F6-B498-43B3-948B-1728B52AA6E4}">
-                <adec:decorative xmlns:adec="http://schemas.microsoft.com/office/drawing/2017/decorative" xmlns="" val="1"/>
+                <adec:decorative xmlns:adec="http://schemas.microsoft.com/office/drawing/2017/decorative" val="1"/>
               </a:ext>
             </a:extLst>
           </p:cNvPr>
@@ -2095,10 +2095,10 @@
           <p:cNvPr id="7" name="Fußzeilenplatzhalter 6">
             <a:extLst>
               <a:ext uri="{FF2B5EF4-FFF2-40B4-BE49-F238E27FC236}">
-                <a16:creationId xmlns:a16="http://schemas.microsoft.com/office/drawing/2014/main" xmlns="" id="{422A565F-39ED-4357-84FF-EA09854AF259}"/>
+                <a16:creationId xmlns:a16="http://schemas.microsoft.com/office/drawing/2014/main" id="{422A565F-39ED-4357-84FF-EA09854AF259}"/>
               </a:ext>
               <a:ext uri="{C183D7F6-B498-43B3-948B-1728B52AA6E4}">
-                <adec:decorative xmlns:adec="http://schemas.microsoft.com/office/drawing/2017/decorative" xmlns="" val="1"/>
+                <adec:decorative xmlns:adec="http://schemas.microsoft.com/office/drawing/2017/decorative" val="1"/>
               </a:ext>
             </a:extLst>
           </p:cNvPr>
@@ -2127,10 +2127,10 @@
           <p:cNvPr id="12" name="Foliennummernplatzhalter 11">
             <a:extLst>
               <a:ext uri="{FF2B5EF4-FFF2-40B4-BE49-F238E27FC236}">
-                <a16:creationId xmlns:a16="http://schemas.microsoft.com/office/drawing/2014/main" xmlns="" id="{E5BB86C6-1C9A-466D-9CE1-51ACECEC4AA9}"/>
+                <a16:creationId xmlns:a16="http://schemas.microsoft.com/office/drawing/2014/main" id="{E5BB86C6-1C9A-466D-9CE1-51ACECEC4AA9}"/>
               </a:ext>
               <a:ext uri="{C183D7F6-B498-43B3-948B-1728B52AA6E4}">
-                <adec:decorative xmlns:adec="http://schemas.microsoft.com/office/drawing/2017/decorative" xmlns="" val="1"/>
+                <adec:decorative xmlns:adec="http://schemas.microsoft.com/office/drawing/2017/decorative" val="1"/>
               </a:ext>
             </a:extLst>
           </p:cNvPr>
@@ -2190,7 +2190,7 @@
           <p:cNvPr id="9" name="Titel 8">
             <a:extLst>
               <a:ext uri="{FF2B5EF4-FFF2-40B4-BE49-F238E27FC236}">
-                <a16:creationId xmlns:a16="http://schemas.microsoft.com/office/drawing/2014/main" xmlns="" id="{622D3E87-4D5E-42EE-BFAA-DEFADCE546B4}"/>
+                <a16:creationId xmlns:a16="http://schemas.microsoft.com/office/drawing/2014/main" id="{622D3E87-4D5E-42EE-BFAA-DEFADCE546B4}"/>
               </a:ext>
             </a:extLst>
           </p:cNvPr>
@@ -2219,7 +2219,7 @@
           <p:cNvPr id="10" name="Textplatzhalter 7">
             <a:extLst>
               <a:ext uri="{FF2B5EF4-FFF2-40B4-BE49-F238E27FC236}">
-                <a16:creationId xmlns:a16="http://schemas.microsoft.com/office/drawing/2014/main" xmlns="" id="{5900F60D-1768-48E3-A1B5-14BBCB67FE0A}"/>
+                <a16:creationId xmlns:a16="http://schemas.microsoft.com/office/drawing/2014/main" id="{5900F60D-1768-48E3-A1B5-14BBCB67FE0A}"/>
               </a:ext>
             </a:extLst>
           </p:cNvPr>
@@ -2370,10 +2370,10 @@
           <p:cNvPr id="2" name="Datumsplatzhalter 1">
             <a:extLst>
               <a:ext uri="{FF2B5EF4-FFF2-40B4-BE49-F238E27FC236}">
-                <a16:creationId xmlns:a16="http://schemas.microsoft.com/office/drawing/2014/main" xmlns="" id="{B26C1CE2-380C-47E9-8B35-F134CD44F6C6}"/>
+                <a16:creationId xmlns:a16="http://schemas.microsoft.com/office/drawing/2014/main" id="{B26C1CE2-380C-47E9-8B35-F134CD44F6C6}"/>
               </a:ext>
               <a:ext uri="{C183D7F6-B498-43B3-948B-1728B52AA6E4}">
-                <adec:decorative xmlns:adec="http://schemas.microsoft.com/office/drawing/2017/decorative" xmlns="" val="1"/>
+                <adec:decorative xmlns:adec="http://schemas.microsoft.com/office/drawing/2017/decorative" val="1"/>
               </a:ext>
             </a:extLst>
           </p:cNvPr>
@@ -2402,10 +2402,10 @@
           <p:cNvPr id="8" name="Fußzeilenplatzhalter 7">
             <a:extLst>
               <a:ext uri="{FF2B5EF4-FFF2-40B4-BE49-F238E27FC236}">
-                <a16:creationId xmlns:a16="http://schemas.microsoft.com/office/drawing/2014/main" xmlns="" id="{9F59A20B-DB44-4B88-8F73-16D397003E7C}"/>
+                <a16:creationId xmlns:a16="http://schemas.microsoft.com/office/drawing/2014/main" id="{9F59A20B-DB44-4B88-8F73-16D397003E7C}"/>
               </a:ext>
               <a:ext uri="{C183D7F6-B498-43B3-948B-1728B52AA6E4}">
-                <adec:decorative xmlns:adec="http://schemas.microsoft.com/office/drawing/2017/decorative" xmlns="" val="1"/>
+                <adec:decorative xmlns:adec="http://schemas.microsoft.com/office/drawing/2017/decorative" val="1"/>
               </a:ext>
             </a:extLst>
           </p:cNvPr>
@@ -2434,10 +2434,10 @@
           <p:cNvPr id="11" name="Foliennummernplatzhalter 10">
             <a:extLst>
               <a:ext uri="{FF2B5EF4-FFF2-40B4-BE49-F238E27FC236}">
-                <a16:creationId xmlns:a16="http://schemas.microsoft.com/office/drawing/2014/main" xmlns="" id="{32D1C785-1D2F-41C8-A2D0-E08EFC817535}"/>
+                <a16:creationId xmlns:a16="http://schemas.microsoft.com/office/drawing/2014/main" id="{32D1C785-1D2F-41C8-A2D0-E08EFC817535}"/>
               </a:ext>
               <a:ext uri="{C183D7F6-B498-43B3-948B-1728B52AA6E4}">
-                <adec:decorative xmlns:adec="http://schemas.microsoft.com/office/drawing/2017/decorative" xmlns="" val="1"/>
+                <adec:decorative xmlns:adec="http://schemas.microsoft.com/office/drawing/2017/decorative" val="1"/>
               </a:ext>
             </a:extLst>
           </p:cNvPr>
@@ -2497,7 +2497,7 @@
           <p:cNvPr id="2" name="Titel 1">
             <a:extLst>
               <a:ext uri="{FF2B5EF4-FFF2-40B4-BE49-F238E27FC236}">
-                <a16:creationId xmlns:a16="http://schemas.microsoft.com/office/drawing/2014/main" xmlns="" id="{A65E59DF-9C98-443E-93E0-C25D5A93D369}"/>
+                <a16:creationId xmlns:a16="http://schemas.microsoft.com/office/drawing/2014/main" id="{A65E59DF-9C98-443E-93E0-C25D5A93D369}"/>
               </a:ext>
             </a:extLst>
           </p:cNvPr>
@@ -2526,7 +2526,7 @@
           <p:cNvPr id="12" name="Textplatzhalter 7">
             <a:extLst>
               <a:ext uri="{FF2B5EF4-FFF2-40B4-BE49-F238E27FC236}">
-                <a16:creationId xmlns:a16="http://schemas.microsoft.com/office/drawing/2014/main" xmlns="" id="{2FF756D6-45BE-4CA9-8D73-7DC21CF7EB0A}"/>
+                <a16:creationId xmlns:a16="http://schemas.microsoft.com/office/drawing/2014/main" id="{2FF756D6-45BE-4CA9-8D73-7DC21CF7EB0A}"/>
               </a:ext>
             </a:extLst>
           </p:cNvPr>
@@ -2815,10 +2815,10 @@
           <p:cNvPr id="5" name="Datumsplatzhalter 4">
             <a:extLst>
               <a:ext uri="{FF2B5EF4-FFF2-40B4-BE49-F238E27FC236}">
-                <a16:creationId xmlns:a16="http://schemas.microsoft.com/office/drawing/2014/main" xmlns="" id="{E90AF344-C881-4077-8537-07C2F8DC9A74}"/>
+                <a16:creationId xmlns:a16="http://schemas.microsoft.com/office/drawing/2014/main" id="{E90AF344-C881-4077-8537-07C2F8DC9A74}"/>
               </a:ext>
               <a:ext uri="{C183D7F6-B498-43B3-948B-1728B52AA6E4}">
-                <adec:decorative xmlns:adec="http://schemas.microsoft.com/office/drawing/2017/decorative" xmlns="" val="1"/>
+                <adec:decorative xmlns:adec="http://schemas.microsoft.com/office/drawing/2017/decorative" val="1"/>
               </a:ext>
             </a:extLst>
           </p:cNvPr>
@@ -2847,10 +2847,10 @@
           <p:cNvPr id="6" name="Fußzeilenplatzhalter 5">
             <a:extLst>
               <a:ext uri="{FF2B5EF4-FFF2-40B4-BE49-F238E27FC236}">
-                <a16:creationId xmlns:a16="http://schemas.microsoft.com/office/drawing/2014/main" xmlns="" id="{65369630-FBC8-4C3D-BCE7-36D2FE5C7307}"/>
+                <a16:creationId xmlns:a16="http://schemas.microsoft.com/office/drawing/2014/main" id="{65369630-FBC8-4C3D-BCE7-36D2FE5C7307}"/>
               </a:ext>
               <a:ext uri="{C183D7F6-B498-43B3-948B-1728B52AA6E4}">
-                <adec:decorative xmlns:adec="http://schemas.microsoft.com/office/drawing/2017/decorative" xmlns="" val="1"/>
+                <adec:decorative xmlns:adec="http://schemas.microsoft.com/office/drawing/2017/decorative" val="1"/>
               </a:ext>
             </a:extLst>
           </p:cNvPr>
@@ -2879,10 +2879,10 @@
           <p:cNvPr id="10" name="Foliennummernplatzhalter 9">
             <a:extLst>
               <a:ext uri="{FF2B5EF4-FFF2-40B4-BE49-F238E27FC236}">
-                <a16:creationId xmlns:a16="http://schemas.microsoft.com/office/drawing/2014/main" xmlns="" id="{8CFDF553-C627-44C0-80CA-525DD4D48F4D}"/>
+                <a16:creationId xmlns:a16="http://schemas.microsoft.com/office/drawing/2014/main" id="{8CFDF553-C627-44C0-80CA-525DD4D48F4D}"/>
               </a:ext>
               <a:ext uri="{C183D7F6-B498-43B3-948B-1728B52AA6E4}">
-                <adec:decorative xmlns:adec="http://schemas.microsoft.com/office/drawing/2017/decorative" xmlns="" val="1"/>
+                <adec:decorative xmlns:adec="http://schemas.microsoft.com/office/drawing/2017/decorative" val="1"/>
               </a:ext>
             </a:extLst>
           </p:cNvPr>
@@ -2942,7 +2942,7 @@
           <p:cNvPr id="4" name="Titel 3">
             <a:extLst>
               <a:ext uri="{FF2B5EF4-FFF2-40B4-BE49-F238E27FC236}">
-                <a16:creationId xmlns:a16="http://schemas.microsoft.com/office/drawing/2014/main" xmlns="" id="{03E3249F-FD38-4D4D-9020-0251E0AF5910}"/>
+                <a16:creationId xmlns:a16="http://schemas.microsoft.com/office/drawing/2014/main" id="{03E3249F-FD38-4D4D-9020-0251E0AF5910}"/>
               </a:ext>
             </a:extLst>
           </p:cNvPr>
@@ -2971,7 +2971,7 @@
           <p:cNvPr id="15" name="Textplatzhalter 7">
             <a:extLst>
               <a:ext uri="{FF2B5EF4-FFF2-40B4-BE49-F238E27FC236}">
-                <a16:creationId xmlns:a16="http://schemas.microsoft.com/office/drawing/2014/main" xmlns="" id="{5501507C-4075-4224-82B8-ACF0E98687D5}"/>
+                <a16:creationId xmlns:a16="http://schemas.microsoft.com/office/drawing/2014/main" id="{5501507C-4075-4224-82B8-ACF0E98687D5}"/>
               </a:ext>
             </a:extLst>
           </p:cNvPr>
@@ -3132,10 +3132,10 @@
           <p:cNvPr id="2" name="Datumsplatzhalter 1">
             <a:extLst>
               <a:ext uri="{FF2B5EF4-FFF2-40B4-BE49-F238E27FC236}">
-                <a16:creationId xmlns:a16="http://schemas.microsoft.com/office/drawing/2014/main" xmlns="" id="{525B685E-EB8C-4F4E-80A6-C9FD90B4C788}"/>
+                <a16:creationId xmlns:a16="http://schemas.microsoft.com/office/drawing/2014/main" id="{525B685E-EB8C-4F4E-80A6-C9FD90B4C788}"/>
               </a:ext>
               <a:ext uri="{C183D7F6-B498-43B3-948B-1728B52AA6E4}">
-                <adec:decorative xmlns:adec="http://schemas.microsoft.com/office/drawing/2017/decorative" xmlns="" val="1"/>
+                <adec:decorative xmlns:adec="http://schemas.microsoft.com/office/drawing/2017/decorative" val="1"/>
               </a:ext>
             </a:extLst>
           </p:cNvPr>
@@ -3164,10 +3164,10 @@
           <p:cNvPr id="8" name="Fußzeilenplatzhalter 7">
             <a:extLst>
               <a:ext uri="{FF2B5EF4-FFF2-40B4-BE49-F238E27FC236}">
-                <a16:creationId xmlns:a16="http://schemas.microsoft.com/office/drawing/2014/main" xmlns="" id="{F0794A1E-3BA0-4D9C-A222-8EBDB4DA20C9}"/>
+                <a16:creationId xmlns:a16="http://schemas.microsoft.com/office/drawing/2014/main" id="{F0794A1E-3BA0-4D9C-A222-8EBDB4DA20C9}"/>
               </a:ext>
               <a:ext uri="{C183D7F6-B498-43B3-948B-1728B52AA6E4}">
-                <adec:decorative xmlns:adec="http://schemas.microsoft.com/office/drawing/2017/decorative" xmlns="" val="1"/>
+                <adec:decorative xmlns:adec="http://schemas.microsoft.com/office/drawing/2017/decorative" val="1"/>
               </a:ext>
             </a:extLst>
           </p:cNvPr>
@@ -3196,10 +3196,10 @@
           <p:cNvPr id="9" name="Foliennummernplatzhalter 8">
             <a:extLst>
               <a:ext uri="{FF2B5EF4-FFF2-40B4-BE49-F238E27FC236}">
-                <a16:creationId xmlns:a16="http://schemas.microsoft.com/office/drawing/2014/main" xmlns="" id="{03483C74-DCE9-454D-9C95-024DD98FAE14}"/>
+                <a16:creationId xmlns:a16="http://schemas.microsoft.com/office/drawing/2014/main" id="{03483C74-DCE9-454D-9C95-024DD98FAE14}"/>
               </a:ext>
               <a:ext uri="{C183D7F6-B498-43B3-948B-1728B52AA6E4}">
-                <adec:decorative xmlns:adec="http://schemas.microsoft.com/office/drawing/2017/decorative" xmlns="" val="1"/>
+                <adec:decorative xmlns:adec="http://schemas.microsoft.com/office/drawing/2017/decorative" val="1"/>
               </a:ext>
             </a:extLst>
           </p:cNvPr>
@@ -3259,7 +3259,7 @@
           <p:cNvPr id="2" name="Titel 1">
             <a:extLst>
               <a:ext uri="{FF2B5EF4-FFF2-40B4-BE49-F238E27FC236}">
-                <a16:creationId xmlns:a16="http://schemas.microsoft.com/office/drawing/2014/main" xmlns="" id="{62301769-7A5F-4726-A7DE-F0F6415EC062}"/>
+                <a16:creationId xmlns:a16="http://schemas.microsoft.com/office/drawing/2014/main" id="{62301769-7A5F-4726-A7DE-F0F6415EC062}"/>
               </a:ext>
             </a:extLst>
           </p:cNvPr>
@@ -3288,7 +3288,7 @@
           <p:cNvPr id="12" name="Textplatzhalter 7">
             <a:extLst>
               <a:ext uri="{FF2B5EF4-FFF2-40B4-BE49-F238E27FC236}">
-                <a16:creationId xmlns:a16="http://schemas.microsoft.com/office/drawing/2014/main" xmlns="" id="{6BEED840-629E-4E70-924A-3F5FA272B6BC}"/>
+                <a16:creationId xmlns:a16="http://schemas.microsoft.com/office/drawing/2014/main" id="{6BEED840-629E-4E70-924A-3F5FA272B6BC}"/>
               </a:ext>
             </a:extLst>
           </p:cNvPr>
@@ -3416,10 +3416,10 @@
           <p:cNvPr id="4" name="Datumsplatzhalter 3">
             <a:extLst>
               <a:ext uri="{FF2B5EF4-FFF2-40B4-BE49-F238E27FC236}">
-                <a16:creationId xmlns:a16="http://schemas.microsoft.com/office/drawing/2014/main" xmlns="" id="{65B32AC5-E9DE-4649-B1AC-9A62A340C736}"/>
+                <a16:creationId xmlns:a16="http://schemas.microsoft.com/office/drawing/2014/main" id="{65B32AC5-E9DE-4649-B1AC-9A62A340C736}"/>
               </a:ext>
               <a:ext uri="{C183D7F6-B498-43B3-948B-1728B52AA6E4}">
-                <adec:decorative xmlns:adec="http://schemas.microsoft.com/office/drawing/2017/decorative" xmlns="" val="1"/>
+                <adec:decorative xmlns:adec="http://schemas.microsoft.com/office/drawing/2017/decorative" val="1"/>
               </a:ext>
             </a:extLst>
           </p:cNvPr>
@@ -3448,10 +3448,10 @@
           <p:cNvPr id="8" name="Fußzeilenplatzhalter 7">
             <a:extLst>
               <a:ext uri="{FF2B5EF4-FFF2-40B4-BE49-F238E27FC236}">
-                <a16:creationId xmlns:a16="http://schemas.microsoft.com/office/drawing/2014/main" xmlns="" id="{385FC210-A7D0-48A0-965B-FED973105A9B}"/>
+                <a16:creationId xmlns:a16="http://schemas.microsoft.com/office/drawing/2014/main" id="{385FC210-A7D0-48A0-965B-FED973105A9B}"/>
               </a:ext>
               <a:ext uri="{C183D7F6-B498-43B3-948B-1728B52AA6E4}">
-                <adec:decorative xmlns:adec="http://schemas.microsoft.com/office/drawing/2017/decorative" xmlns="" val="1"/>
+                <adec:decorative xmlns:adec="http://schemas.microsoft.com/office/drawing/2017/decorative" val="1"/>
               </a:ext>
             </a:extLst>
           </p:cNvPr>
@@ -3480,10 +3480,10 @@
           <p:cNvPr id="9" name="Foliennummernplatzhalter 8">
             <a:extLst>
               <a:ext uri="{FF2B5EF4-FFF2-40B4-BE49-F238E27FC236}">
-                <a16:creationId xmlns:a16="http://schemas.microsoft.com/office/drawing/2014/main" xmlns="" id="{94CA4BF4-EDC6-4CFF-AE4B-CB671709F924}"/>
+                <a16:creationId xmlns:a16="http://schemas.microsoft.com/office/drawing/2014/main" id="{94CA4BF4-EDC6-4CFF-AE4B-CB671709F924}"/>
               </a:ext>
               <a:ext uri="{C183D7F6-B498-43B3-948B-1728B52AA6E4}">
-                <adec:decorative xmlns:adec="http://schemas.microsoft.com/office/drawing/2017/decorative" xmlns="" val="1"/>
+                <adec:decorative xmlns:adec="http://schemas.microsoft.com/office/drawing/2017/decorative" val="1"/>
               </a:ext>
             </a:extLst>
           </p:cNvPr>
@@ -3543,7 +3543,7 @@
           <p:cNvPr id="3" name="Titel 2">
             <a:extLst>
               <a:ext uri="{FF2B5EF4-FFF2-40B4-BE49-F238E27FC236}">
-                <a16:creationId xmlns:a16="http://schemas.microsoft.com/office/drawing/2014/main" xmlns="" id="{63CA99B5-A2F2-4F10-9CFB-140C563A4A28}"/>
+                <a16:creationId xmlns:a16="http://schemas.microsoft.com/office/drawing/2014/main" id="{63CA99B5-A2F2-4F10-9CFB-140C563A4A28}"/>
               </a:ext>
             </a:extLst>
           </p:cNvPr>
@@ -3572,7 +3572,7 @@
           <p:cNvPr id="15" name="Textplatzhalter 7">
             <a:extLst>
               <a:ext uri="{FF2B5EF4-FFF2-40B4-BE49-F238E27FC236}">
-                <a16:creationId xmlns:a16="http://schemas.microsoft.com/office/drawing/2014/main" xmlns="" id="{F23A02F9-9EFB-40DA-A6A9-B4AB8316E8D8}"/>
+                <a16:creationId xmlns:a16="http://schemas.microsoft.com/office/drawing/2014/main" id="{F23A02F9-9EFB-40DA-A6A9-B4AB8316E8D8}"/>
               </a:ext>
             </a:extLst>
           </p:cNvPr>
@@ -3806,7 +3806,7 @@
           <p:cNvPr id="6" name="Titel 5">
             <a:extLst>
               <a:ext uri="{FF2B5EF4-FFF2-40B4-BE49-F238E27FC236}">
-                <a16:creationId xmlns:a16="http://schemas.microsoft.com/office/drawing/2014/main" xmlns="" id="{3A8DCC85-4928-492C-BEE7-FC5B55B32E11}"/>
+                <a16:creationId xmlns:a16="http://schemas.microsoft.com/office/drawing/2014/main" id="{3A8DCC85-4928-492C-BEE7-FC5B55B32E11}"/>
               </a:ext>
             </a:extLst>
           </p:cNvPr>
@@ -4153,10 +4153,10 @@
           <p:cNvPr id="2" name="Datumsplatzhalter 1">
             <a:extLst>
               <a:ext uri="{FF2B5EF4-FFF2-40B4-BE49-F238E27FC236}">
-                <a16:creationId xmlns:a16="http://schemas.microsoft.com/office/drawing/2014/main" xmlns="" id="{9E3799E2-3C23-4EE3-8932-7D8BEC42B9DA}"/>
+                <a16:creationId xmlns:a16="http://schemas.microsoft.com/office/drawing/2014/main" id="{9E3799E2-3C23-4EE3-8932-7D8BEC42B9DA}"/>
               </a:ext>
               <a:ext uri="{C183D7F6-B498-43B3-948B-1728B52AA6E4}">
-                <adec:decorative xmlns:adec="http://schemas.microsoft.com/office/drawing/2017/decorative" xmlns="" val="1"/>
+                <adec:decorative xmlns:adec="http://schemas.microsoft.com/office/drawing/2017/decorative" val="1"/>
               </a:ext>
             </a:extLst>
           </p:cNvPr>
@@ -4185,10 +4185,10 @@
           <p:cNvPr id="7" name="Fußzeilenplatzhalter 6">
             <a:extLst>
               <a:ext uri="{FF2B5EF4-FFF2-40B4-BE49-F238E27FC236}">
-                <a16:creationId xmlns:a16="http://schemas.microsoft.com/office/drawing/2014/main" xmlns="" id="{FAAF8D85-2BDA-4B6B-9739-948CC7B45B04}"/>
+                <a16:creationId xmlns:a16="http://schemas.microsoft.com/office/drawing/2014/main" id="{FAAF8D85-2BDA-4B6B-9739-948CC7B45B04}"/>
               </a:ext>
               <a:ext uri="{C183D7F6-B498-43B3-948B-1728B52AA6E4}">
-                <adec:decorative xmlns:adec="http://schemas.microsoft.com/office/drawing/2017/decorative" xmlns="" val="1"/>
+                <adec:decorative xmlns:adec="http://schemas.microsoft.com/office/drawing/2017/decorative" val="1"/>
               </a:ext>
             </a:extLst>
           </p:cNvPr>
@@ -4217,10 +4217,10 @@
           <p:cNvPr id="9" name="Foliennummernplatzhalter 8">
             <a:extLst>
               <a:ext uri="{FF2B5EF4-FFF2-40B4-BE49-F238E27FC236}">
-                <a16:creationId xmlns:a16="http://schemas.microsoft.com/office/drawing/2014/main" xmlns="" id="{49B14986-AEF7-4911-8AC9-241E2F85323A}"/>
+                <a16:creationId xmlns:a16="http://schemas.microsoft.com/office/drawing/2014/main" id="{49B14986-AEF7-4911-8AC9-241E2F85323A}"/>
               </a:ext>
               <a:ext uri="{C183D7F6-B498-43B3-948B-1728B52AA6E4}">
-                <adec:decorative xmlns:adec="http://schemas.microsoft.com/office/drawing/2017/decorative" xmlns="" val="1"/>
+                <adec:decorative xmlns:adec="http://schemas.microsoft.com/office/drawing/2017/decorative" val="1"/>
               </a:ext>
             </a:extLst>
           </p:cNvPr>
@@ -4280,7 +4280,7 @@
           <p:cNvPr id="6" name="Titel 5">
             <a:extLst>
               <a:ext uri="{FF2B5EF4-FFF2-40B4-BE49-F238E27FC236}">
-                <a16:creationId xmlns:a16="http://schemas.microsoft.com/office/drawing/2014/main" xmlns="" id="{E792EEEF-D15B-42F6-B267-A355CF4E4DBF}"/>
+                <a16:creationId xmlns:a16="http://schemas.microsoft.com/office/drawing/2014/main" id="{E792EEEF-D15B-42F6-B267-A355CF4E4DBF}"/>
               </a:ext>
             </a:extLst>
           </p:cNvPr>
@@ -4627,10 +4627,10 @@
           <p:cNvPr id="2" name="Datumsplatzhalter 1">
             <a:extLst>
               <a:ext uri="{FF2B5EF4-FFF2-40B4-BE49-F238E27FC236}">
-                <a16:creationId xmlns:a16="http://schemas.microsoft.com/office/drawing/2014/main" xmlns="" id="{424AC54E-2FE8-44FD-8448-789AC527CD62}"/>
+                <a16:creationId xmlns:a16="http://schemas.microsoft.com/office/drawing/2014/main" id="{424AC54E-2FE8-44FD-8448-789AC527CD62}"/>
               </a:ext>
               <a:ext uri="{C183D7F6-B498-43B3-948B-1728B52AA6E4}">
-                <adec:decorative xmlns:adec="http://schemas.microsoft.com/office/drawing/2017/decorative" xmlns="" val="1"/>
+                <adec:decorative xmlns:adec="http://schemas.microsoft.com/office/drawing/2017/decorative" val="1"/>
               </a:ext>
             </a:extLst>
           </p:cNvPr>
@@ -4659,10 +4659,10 @@
           <p:cNvPr id="7" name="Fußzeilenplatzhalter 6">
             <a:extLst>
               <a:ext uri="{FF2B5EF4-FFF2-40B4-BE49-F238E27FC236}">
-                <a16:creationId xmlns:a16="http://schemas.microsoft.com/office/drawing/2014/main" xmlns="" id="{FD788027-74D9-4A2C-99EF-860F4806E5B7}"/>
+                <a16:creationId xmlns:a16="http://schemas.microsoft.com/office/drawing/2014/main" id="{FD788027-74D9-4A2C-99EF-860F4806E5B7}"/>
               </a:ext>
               <a:ext uri="{C183D7F6-B498-43B3-948B-1728B52AA6E4}">
-                <adec:decorative xmlns:adec="http://schemas.microsoft.com/office/drawing/2017/decorative" xmlns="" val="1"/>
+                <adec:decorative xmlns:adec="http://schemas.microsoft.com/office/drawing/2017/decorative" val="1"/>
               </a:ext>
             </a:extLst>
           </p:cNvPr>
@@ -4691,10 +4691,10 @@
           <p:cNvPr id="9" name="Foliennummernplatzhalter 8">
             <a:extLst>
               <a:ext uri="{FF2B5EF4-FFF2-40B4-BE49-F238E27FC236}">
-                <a16:creationId xmlns:a16="http://schemas.microsoft.com/office/drawing/2014/main" xmlns="" id="{1E67A0A4-F964-4E95-B836-83B9DA51486C}"/>
+                <a16:creationId xmlns:a16="http://schemas.microsoft.com/office/drawing/2014/main" id="{1E67A0A4-F964-4E95-B836-83B9DA51486C}"/>
               </a:ext>
               <a:ext uri="{C183D7F6-B498-43B3-948B-1728B52AA6E4}">
-                <adec:decorative xmlns:adec="http://schemas.microsoft.com/office/drawing/2017/decorative" xmlns="" val="1"/>
+                <adec:decorative xmlns:adec="http://schemas.microsoft.com/office/drawing/2017/decorative" val="1"/>
               </a:ext>
             </a:extLst>
           </p:cNvPr>
@@ -4754,7 +4754,7 @@
           <p:cNvPr id="6" name="Titel 5">
             <a:extLst>
               <a:ext uri="{FF2B5EF4-FFF2-40B4-BE49-F238E27FC236}">
-                <a16:creationId xmlns:a16="http://schemas.microsoft.com/office/drawing/2014/main" xmlns="" id="{2369BABE-C34D-4B71-ABE7-625BE220F249}"/>
+                <a16:creationId xmlns:a16="http://schemas.microsoft.com/office/drawing/2014/main" id="{2369BABE-C34D-4B71-ABE7-625BE220F249}"/>
               </a:ext>
             </a:extLst>
           </p:cNvPr>
@@ -4783,7 +4783,7 @@
           <p:cNvPr id="16" name="Textplatzhalter 7">
             <a:extLst>
               <a:ext uri="{FF2B5EF4-FFF2-40B4-BE49-F238E27FC236}">
-                <a16:creationId xmlns:a16="http://schemas.microsoft.com/office/drawing/2014/main" xmlns="" id="{4F73F404-72E1-4BC9-B71C-D15CC679050E}"/>
+                <a16:creationId xmlns:a16="http://schemas.microsoft.com/office/drawing/2014/main" id="{4F73F404-72E1-4BC9-B71C-D15CC679050E}"/>
               </a:ext>
             </a:extLst>
           </p:cNvPr>
@@ -4822,7 +4822,7 @@
           <p:cNvPr id="9" name="Rechteck 8">
             <a:extLst>
               <a:ext uri="{C183D7F6-B498-43B3-948B-1728B52AA6E4}">
-                <adec:decorative xmlns:adec="http://schemas.microsoft.com/office/drawing/2017/decorative" xmlns="" val="1"/>
+                <adec:decorative xmlns:adec="http://schemas.microsoft.com/office/drawing/2017/decorative" val="1"/>
               </a:ext>
             </a:extLst>
           </p:cNvPr>
@@ -4874,7 +4874,7 @@
           <p:cNvPr id="8" name="Bildplatzhalter 7">
             <a:extLst>
               <a:ext uri="{C183D7F6-B498-43B3-948B-1728B52AA6E4}">
-                <adec:decorative xmlns:adec="http://schemas.microsoft.com/office/drawing/2017/decorative" xmlns="" val="1"/>
+                <adec:decorative xmlns:adec="http://schemas.microsoft.com/office/drawing/2017/decorative" val="1"/>
               </a:ext>
             </a:extLst>
           </p:cNvPr>
@@ -5054,7 +5054,7 @@
           <p:cNvPr id="21" name="Rechteck 20">
             <a:extLst>
               <a:ext uri="{C183D7F6-B498-43B3-948B-1728B52AA6E4}">
-                <adec:decorative xmlns:adec="http://schemas.microsoft.com/office/drawing/2017/decorative" xmlns="" val="1"/>
+                <adec:decorative xmlns:adec="http://schemas.microsoft.com/office/drawing/2017/decorative" val="1"/>
               </a:ext>
             </a:extLst>
           </p:cNvPr>
@@ -5106,7 +5106,7 @@
           <p:cNvPr id="22" name="Bildplatzhalter 7">
             <a:extLst>
               <a:ext uri="{C183D7F6-B498-43B3-948B-1728B52AA6E4}">
-                <adec:decorative xmlns:adec="http://schemas.microsoft.com/office/drawing/2017/decorative" xmlns="" val="1"/>
+                <adec:decorative xmlns:adec="http://schemas.microsoft.com/office/drawing/2017/decorative" val="1"/>
               </a:ext>
             </a:extLst>
           </p:cNvPr>
@@ -5286,10 +5286,10 @@
           <p:cNvPr id="2" name="Datumsplatzhalter 1">
             <a:extLst>
               <a:ext uri="{FF2B5EF4-FFF2-40B4-BE49-F238E27FC236}">
-                <a16:creationId xmlns:a16="http://schemas.microsoft.com/office/drawing/2014/main" xmlns="" id="{67891870-DFB4-45E6-9383-4A10E76B3D6A}"/>
+                <a16:creationId xmlns:a16="http://schemas.microsoft.com/office/drawing/2014/main" id="{67891870-DFB4-45E6-9383-4A10E76B3D6A}"/>
               </a:ext>
               <a:ext uri="{C183D7F6-B498-43B3-948B-1728B52AA6E4}">
-                <adec:decorative xmlns:adec="http://schemas.microsoft.com/office/drawing/2017/decorative" xmlns="" val="1"/>
+                <adec:decorative xmlns:adec="http://schemas.microsoft.com/office/drawing/2017/decorative" val="1"/>
               </a:ext>
             </a:extLst>
           </p:cNvPr>
@@ -5318,10 +5318,10 @@
           <p:cNvPr id="7" name="Fußzeilenplatzhalter 6">
             <a:extLst>
               <a:ext uri="{FF2B5EF4-FFF2-40B4-BE49-F238E27FC236}">
-                <a16:creationId xmlns:a16="http://schemas.microsoft.com/office/drawing/2014/main" xmlns="" id="{5B04DB42-8004-4EC2-BA6C-C35BBD8F5FAD}"/>
+                <a16:creationId xmlns:a16="http://schemas.microsoft.com/office/drawing/2014/main" id="{5B04DB42-8004-4EC2-BA6C-C35BBD8F5FAD}"/>
               </a:ext>
               <a:ext uri="{C183D7F6-B498-43B3-948B-1728B52AA6E4}">
-                <adec:decorative xmlns:adec="http://schemas.microsoft.com/office/drawing/2017/decorative" xmlns="" val="1"/>
+                <adec:decorative xmlns:adec="http://schemas.microsoft.com/office/drawing/2017/decorative" val="1"/>
               </a:ext>
             </a:extLst>
           </p:cNvPr>
@@ -5350,10 +5350,10 @@
           <p:cNvPr id="10" name="Foliennummernplatzhalter 9">
             <a:extLst>
               <a:ext uri="{FF2B5EF4-FFF2-40B4-BE49-F238E27FC236}">
-                <a16:creationId xmlns:a16="http://schemas.microsoft.com/office/drawing/2014/main" xmlns="" id="{2AC375FE-0D6A-422E-9BA2-D4859CDA8902}"/>
+                <a16:creationId xmlns:a16="http://schemas.microsoft.com/office/drawing/2014/main" id="{2AC375FE-0D6A-422E-9BA2-D4859CDA8902}"/>
               </a:ext>
               <a:ext uri="{C183D7F6-B498-43B3-948B-1728B52AA6E4}">
-                <adec:decorative xmlns:adec="http://schemas.microsoft.com/office/drawing/2017/decorative" xmlns="" val="1"/>
+                <adec:decorative xmlns:adec="http://schemas.microsoft.com/office/drawing/2017/decorative" val="1"/>
               </a:ext>
             </a:extLst>
           </p:cNvPr>
@@ -5413,7 +5413,7 @@
           <p:cNvPr id="6" name="Titel 5">
             <a:extLst>
               <a:ext uri="{FF2B5EF4-FFF2-40B4-BE49-F238E27FC236}">
-                <a16:creationId xmlns:a16="http://schemas.microsoft.com/office/drawing/2014/main" xmlns="" id="{38B00749-49F7-4FC9-AE55-9A89B4673F2B}"/>
+                <a16:creationId xmlns:a16="http://schemas.microsoft.com/office/drawing/2014/main" id="{38B00749-49F7-4FC9-AE55-9A89B4673F2B}"/>
               </a:ext>
             </a:extLst>
           </p:cNvPr>
@@ -5442,7 +5442,7 @@
           <p:cNvPr id="25" name="Textplatzhalter 7">
             <a:extLst>
               <a:ext uri="{FF2B5EF4-FFF2-40B4-BE49-F238E27FC236}">
-                <a16:creationId xmlns:a16="http://schemas.microsoft.com/office/drawing/2014/main" xmlns="" id="{234A045F-25D1-4F69-800A-3EC98AD24806}"/>
+                <a16:creationId xmlns:a16="http://schemas.microsoft.com/office/drawing/2014/main" id="{234A045F-25D1-4F69-800A-3EC98AD24806}"/>
               </a:ext>
             </a:extLst>
           </p:cNvPr>
@@ -5481,7 +5481,7 @@
           <p:cNvPr id="9" name="Rechteck 8">
             <a:extLst>
               <a:ext uri="{C183D7F6-B498-43B3-948B-1728B52AA6E4}">
-                <adec:decorative xmlns:adec="http://schemas.microsoft.com/office/drawing/2017/decorative" xmlns="" val="1"/>
+                <adec:decorative xmlns:adec="http://schemas.microsoft.com/office/drawing/2017/decorative" val="1"/>
               </a:ext>
             </a:extLst>
           </p:cNvPr>
@@ -5533,10 +5533,10 @@
           <p:cNvPr id="21" name="Bildplatzhalter 7">
             <a:extLst>
               <a:ext uri="{FF2B5EF4-FFF2-40B4-BE49-F238E27FC236}">
-                <a16:creationId xmlns:a16="http://schemas.microsoft.com/office/drawing/2014/main" xmlns="" id="{0CCFCC13-9E94-4A8E-927E-B90EB96934B9}"/>
+                <a16:creationId xmlns:a16="http://schemas.microsoft.com/office/drawing/2014/main" id="{0CCFCC13-9E94-4A8E-927E-B90EB96934B9}"/>
               </a:ext>
               <a:ext uri="{C183D7F6-B498-43B3-948B-1728B52AA6E4}">
-                <adec:decorative xmlns:adec="http://schemas.microsoft.com/office/drawing/2017/decorative" xmlns="" val="1"/>
+                <adec:decorative xmlns:adec="http://schemas.microsoft.com/office/drawing/2017/decorative" val="1"/>
               </a:ext>
             </a:extLst>
           </p:cNvPr>
@@ -5716,7 +5716,7 @@
           <p:cNvPr id="13" name="Rechteck 12">
             <a:extLst>
               <a:ext uri="{C183D7F6-B498-43B3-948B-1728B52AA6E4}">
-                <adec:decorative xmlns:adec="http://schemas.microsoft.com/office/drawing/2017/decorative" xmlns="" val="1"/>
+                <adec:decorative xmlns:adec="http://schemas.microsoft.com/office/drawing/2017/decorative" val="1"/>
               </a:ext>
             </a:extLst>
           </p:cNvPr>
@@ -5768,10 +5768,10 @@
           <p:cNvPr id="22" name="Bildplatzhalter 7">
             <a:extLst>
               <a:ext uri="{FF2B5EF4-FFF2-40B4-BE49-F238E27FC236}">
-                <a16:creationId xmlns:a16="http://schemas.microsoft.com/office/drawing/2014/main" xmlns="" id="{34D29721-8BC0-4D90-A4F3-75A72451E902}"/>
+                <a16:creationId xmlns:a16="http://schemas.microsoft.com/office/drawing/2014/main" id="{34D29721-8BC0-4D90-A4F3-75A72451E902}"/>
               </a:ext>
               <a:ext uri="{C183D7F6-B498-43B3-948B-1728B52AA6E4}">
-                <adec:decorative xmlns:adec="http://schemas.microsoft.com/office/drawing/2017/decorative" xmlns="" val="1"/>
+                <adec:decorative xmlns:adec="http://schemas.microsoft.com/office/drawing/2017/decorative" val="1"/>
               </a:ext>
             </a:extLst>
           </p:cNvPr>
@@ -5951,7 +5951,7 @@
           <p:cNvPr id="17" name="Rechteck 16">
             <a:extLst>
               <a:ext uri="{C183D7F6-B498-43B3-948B-1728B52AA6E4}">
-                <adec:decorative xmlns:adec="http://schemas.microsoft.com/office/drawing/2017/decorative" xmlns="" val="1"/>
+                <adec:decorative xmlns:adec="http://schemas.microsoft.com/office/drawing/2017/decorative" val="1"/>
               </a:ext>
             </a:extLst>
           </p:cNvPr>
@@ -6003,10 +6003,10 @@
           <p:cNvPr id="23" name="Bildplatzhalter 7">
             <a:extLst>
               <a:ext uri="{FF2B5EF4-FFF2-40B4-BE49-F238E27FC236}">
-                <a16:creationId xmlns:a16="http://schemas.microsoft.com/office/drawing/2014/main" xmlns="" id="{01CD30C1-0EF4-4BAD-97BF-FFFDBEF2C182}"/>
+                <a16:creationId xmlns:a16="http://schemas.microsoft.com/office/drawing/2014/main" id="{01CD30C1-0EF4-4BAD-97BF-FFFDBEF2C182}"/>
               </a:ext>
               <a:ext uri="{C183D7F6-B498-43B3-948B-1728B52AA6E4}">
-                <adec:decorative xmlns:adec="http://schemas.microsoft.com/office/drawing/2017/decorative" xmlns="" val="1"/>
+                <adec:decorative xmlns:adec="http://schemas.microsoft.com/office/drawing/2017/decorative" val="1"/>
               </a:ext>
             </a:extLst>
           </p:cNvPr>
@@ -6186,10 +6186,10 @@
           <p:cNvPr id="2" name="Datumsplatzhalter 1">
             <a:extLst>
               <a:ext uri="{FF2B5EF4-FFF2-40B4-BE49-F238E27FC236}">
-                <a16:creationId xmlns:a16="http://schemas.microsoft.com/office/drawing/2014/main" xmlns="" id="{B5737E52-6A3C-46DC-946E-C8C9351FA4CA}"/>
+                <a16:creationId xmlns:a16="http://schemas.microsoft.com/office/drawing/2014/main" id="{B5737E52-6A3C-46DC-946E-C8C9351FA4CA}"/>
               </a:ext>
               <a:ext uri="{C183D7F6-B498-43B3-948B-1728B52AA6E4}">
-                <adec:decorative xmlns:adec="http://schemas.microsoft.com/office/drawing/2017/decorative" xmlns="" val="1"/>
+                <adec:decorative xmlns:adec="http://schemas.microsoft.com/office/drawing/2017/decorative" val="1"/>
               </a:ext>
             </a:extLst>
           </p:cNvPr>
@@ -6218,10 +6218,10 @@
           <p:cNvPr id="7" name="Fußzeilenplatzhalter 6">
             <a:extLst>
               <a:ext uri="{FF2B5EF4-FFF2-40B4-BE49-F238E27FC236}">
-                <a16:creationId xmlns:a16="http://schemas.microsoft.com/office/drawing/2014/main" xmlns="" id="{F045F5D0-F689-442E-B9D8-1F4BAD70A0FF}"/>
+                <a16:creationId xmlns:a16="http://schemas.microsoft.com/office/drawing/2014/main" id="{F045F5D0-F689-442E-B9D8-1F4BAD70A0FF}"/>
               </a:ext>
               <a:ext uri="{C183D7F6-B498-43B3-948B-1728B52AA6E4}">
-                <adec:decorative xmlns:adec="http://schemas.microsoft.com/office/drawing/2017/decorative" xmlns="" val="1"/>
+                <adec:decorative xmlns:adec="http://schemas.microsoft.com/office/drawing/2017/decorative" val="1"/>
               </a:ext>
             </a:extLst>
           </p:cNvPr>
@@ -6250,10 +6250,10 @@
           <p:cNvPr id="8" name="Foliennummernplatzhalter 7">
             <a:extLst>
               <a:ext uri="{FF2B5EF4-FFF2-40B4-BE49-F238E27FC236}">
-                <a16:creationId xmlns:a16="http://schemas.microsoft.com/office/drawing/2014/main" xmlns="" id="{FA0B96AE-C8F3-44FA-AE7D-D6C08699149A}"/>
+                <a16:creationId xmlns:a16="http://schemas.microsoft.com/office/drawing/2014/main" id="{FA0B96AE-C8F3-44FA-AE7D-D6C08699149A}"/>
               </a:ext>
               <a:ext uri="{C183D7F6-B498-43B3-948B-1728B52AA6E4}">
-                <adec:decorative xmlns:adec="http://schemas.microsoft.com/office/drawing/2017/decorative" xmlns="" val="1"/>
+                <adec:decorative xmlns:adec="http://schemas.microsoft.com/office/drawing/2017/decorative" val="1"/>
               </a:ext>
             </a:extLst>
           </p:cNvPr>
@@ -6313,10 +6313,10 @@
           <p:cNvPr id="7" name="Grafik 6">
             <a:extLst>
               <a:ext uri="{FF2B5EF4-FFF2-40B4-BE49-F238E27FC236}">
-                <a16:creationId xmlns:a16="http://schemas.microsoft.com/office/drawing/2014/main" xmlns="" id="{18916216-B032-4200-99C8-5BA3A21F8800}"/>
+                <a16:creationId xmlns:a16="http://schemas.microsoft.com/office/drawing/2014/main" id="{18916216-B032-4200-99C8-5BA3A21F8800}"/>
               </a:ext>
               <a:ext uri="{C183D7F6-B498-43B3-948B-1728B52AA6E4}">
-                <adec:decorative xmlns:adec="http://schemas.microsoft.com/office/drawing/2017/decorative" xmlns="" val="1"/>
+                <adec:decorative xmlns:adec="http://schemas.microsoft.com/office/drawing/2017/decorative" val="1"/>
               </a:ext>
             </a:extLst>
           </p:cNvPr>
@@ -6352,10 +6352,10 @@
           <p:cNvPr id="8" name="Grafik 7">
             <a:extLst>
               <a:ext uri="{FF2B5EF4-FFF2-40B4-BE49-F238E27FC236}">
-                <a16:creationId xmlns:a16="http://schemas.microsoft.com/office/drawing/2014/main" xmlns="" id="{A72007CB-CD36-48DD-9918-1BFC87D15E94}"/>
+                <a16:creationId xmlns:a16="http://schemas.microsoft.com/office/drawing/2014/main" id="{A72007CB-CD36-48DD-9918-1BFC87D15E94}"/>
               </a:ext>
               <a:ext uri="{C183D7F6-B498-43B3-948B-1728B52AA6E4}">
-                <adec:decorative xmlns:adec="http://schemas.microsoft.com/office/drawing/2017/decorative" xmlns="" val="1"/>
+                <adec:decorative xmlns:adec="http://schemas.microsoft.com/office/drawing/2017/decorative" val="1"/>
               </a:ext>
             </a:extLst>
           </p:cNvPr>
@@ -6428,7 +6428,7 @@
           <p:cNvPr id="3" name="Titel 2">
             <a:extLst>
               <a:ext uri="{FF2B5EF4-FFF2-40B4-BE49-F238E27FC236}">
-                <a16:creationId xmlns:a16="http://schemas.microsoft.com/office/drawing/2014/main" xmlns="" id="{86BA6808-8CD4-4528-935A-3978EF1718CF}"/>
+                <a16:creationId xmlns:a16="http://schemas.microsoft.com/office/drawing/2014/main" id="{86BA6808-8CD4-4528-935A-3978EF1718CF}"/>
               </a:ext>
             </a:extLst>
           </p:cNvPr>
@@ -6563,7 +6563,7 @@
           <p:cNvPr id="14" name="Textplatzhalter 10">
             <a:extLst>
               <a:ext uri="{FF2B5EF4-FFF2-40B4-BE49-F238E27FC236}">
-                <a16:creationId xmlns:a16="http://schemas.microsoft.com/office/drawing/2014/main" xmlns="" id="{3A6FC492-F4FE-474B-9BFE-DAAE645B98B7}"/>
+                <a16:creationId xmlns:a16="http://schemas.microsoft.com/office/drawing/2014/main" id="{3A6FC492-F4FE-474B-9BFE-DAAE645B98B7}"/>
               </a:ext>
             </a:extLst>
           </p:cNvPr>
@@ -6657,7 +6657,7 @@
           <p:cNvPr id="6" name="Titel 5">
             <a:extLst>
               <a:ext uri="{FF2B5EF4-FFF2-40B4-BE49-F238E27FC236}">
-                <a16:creationId xmlns:a16="http://schemas.microsoft.com/office/drawing/2014/main" xmlns="" id="{300D522C-4936-4859-8D4D-0C55FD55D08F}"/>
+                <a16:creationId xmlns:a16="http://schemas.microsoft.com/office/drawing/2014/main" id="{300D522C-4936-4859-8D4D-0C55FD55D08F}"/>
               </a:ext>
             </a:extLst>
           </p:cNvPr>
@@ -6686,7 +6686,7 @@
           <p:cNvPr id="29" name="Textplatzhalter 7">
             <a:extLst>
               <a:ext uri="{FF2B5EF4-FFF2-40B4-BE49-F238E27FC236}">
-                <a16:creationId xmlns:a16="http://schemas.microsoft.com/office/drawing/2014/main" xmlns="" id="{51AA1992-9A0E-4E06-BCFA-97D889E62091}"/>
+                <a16:creationId xmlns:a16="http://schemas.microsoft.com/office/drawing/2014/main" id="{51AA1992-9A0E-4E06-BCFA-97D889E62091}"/>
               </a:ext>
             </a:extLst>
           </p:cNvPr>
@@ -6725,7 +6725,7 @@
           <p:cNvPr id="9" name="Rechteck 8">
             <a:extLst>
               <a:ext uri="{C183D7F6-B498-43B3-948B-1728B52AA6E4}">
-                <adec:decorative xmlns:adec="http://schemas.microsoft.com/office/drawing/2017/decorative" xmlns="" val="1"/>
+                <adec:decorative xmlns:adec="http://schemas.microsoft.com/office/drawing/2017/decorative" val="1"/>
               </a:ext>
             </a:extLst>
           </p:cNvPr>
@@ -6777,10 +6777,10 @@
           <p:cNvPr id="23" name="Bildplatzhalter 7">
             <a:extLst>
               <a:ext uri="{FF2B5EF4-FFF2-40B4-BE49-F238E27FC236}">
-                <a16:creationId xmlns:a16="http://schemas.microsoft.com/office/drawing/2014/main" xmlns="" id="{8148DC21-4CB2-4171-8B0E-7865619CB5BB}"/>
+                <a16:creationId xmlns:a16="http://schemas.microsoft.com/office/drawing/2014/main" id="{8148DC21-4CB2-4171-8B0E-7865619CB5BB}"/>
               </a:ext>
               <a:ext uri="{C183D7F6-B498-43B3-948B-1728B52AA6E4}">
-                <adec:decorative xmlns:adec="http://schemas.microsoft.com/office/drawing/2017/decorative" xmlns="" val="1"/>
+                <adec:decorative xmlns:adec="http://schemas.microsoft.com/office/drawing/2017/decorative" val="1"/>
               </a:ext>
             </a:extLst>
           </p:cNvPr>
@@ -6960,7 +6960,7 @@
           <p:cNvPr id="24" name="Rechteck 23">
             <a:extLst>
               <a:ext uri="{C183D7F6-B498-43B3-948B-1728B52AA6E4}">
-                <adec:decorative xmlns:adec="http://schemas.microsoft.com/office/drawing/2017/decorative" xmlns="" val="1"/>
+                <adec:decorative xmlns:adec="http://schemas.microsoft.com/office/drawing/2017/decorative" val="1"/>
               </a:ext>
             </a:extLst>
           </p:cNvPr>
@@ -7012,10 +7012,10 @@
           <p:cNvPr id="37" name="Bildplatzhalter 7">
             <a:extLst>
               <a:ext uri="{FF2B5EF4-FFF2-40B4-BE49-F238E27FC236}">
-                <a16:creationId xmlns:a16="http://schemas.microsoft.com/office/drawing/2014/main" xmlns="" id="{515DA547-D380-4DDE-8F77-C8902B702291}"/>
+                <a16:creationId xmlns:a16="http://schemas.microsoft.com/office/drawing/2014/main" id="{515DA547-D380-4DDE-8F77-C8902B702291}"/>
               </a:ext>
               <a:ext uri="{C183D7F6-B498-43B3-948B-1728B52AA6E4}">
-                <adec:decorative xmlns:adec="http://schemas.microsoft.com/office/drawing/2017/decorative" xmlns="" val="1"/>
+                <adec:decorative xmlns:adec="http://schemas.microsoft.com/office/drawing/2017/decorative" val="1"/>
               </a:ext>
             </a:extLst>
           </p:cNvPr>
@@ -7195,7 +7195,7 @@
           <p:cNvPr id="28" name="Rechteck 27">
             <a:extLst>
               <a:ext uri="{C183D7F6-B498-43B3-948B-1728B52AA6E4}">
-                <adec:decorative xmlns:adec="http://schemas.microsoft.com/office/drawing/2017/decorative" xmlns="" val="1"/>
+                <adec:decorative xmlns:adec="http://schemas.microsoft.com/office/drawing/2017/decorative" val="1"/>
               </a:ext>
             </a:extLst>
           </p:cNvPr>
@@ -7247,10 +7247,10 @@
           <p:cNvPr id="38" name="Bildplatzhalter 7">
             <a:extLst>
               <a:ext uri="{FF2B5EF4-FFF2-40B4-BE49-F238E27FC236}">
-                <a16:creationId xmlns:a16="http://schemas.microsoft.com/office/drawing/2014/main" xmlns="" id="{27A38D11-8E8E-44F4-9460-58E87F53EFA8}"/>
+                <a16:creationId xmlns:a16="http://schemas.microsoft.com/office/drawing/2014/main" id="{27A38D11-8E8E-44F4-9460-58E87F53EFA8}"/>
               </a:ext>
               <a:ext uri="{C183D7F6-B498-43B3-948B-1728B52AA6E4}">
-                <adec:decorative xmlns:adec="http://schemas.microsoft.com/office/drawing/2017/decorative" xmlns="" val="1"/>
+                <adec:decorative xmlns:adec="http://schemas.microsoft.com/office/drawing/2017/decorative" val="1"/>
               </a:ext>
             </a:extLst>
           </p:cNvPr>
@@ -7430,7 +7430,7 @@
           <p:cNvPr id="32" name="Rechteck 31">
             <a:extLst>
               <a:ext uri="{C183D7F6-B498-43B3-948B-1728B52AA6E4}">
-                <adec:decorative xmlns:adec="http://schemas.microsoft.com/office/drawing/2017/decorative" xmlns="" val="1"/>
+                <adec:decorative xmlns:adec="http://schemas.microsoft.com/office/drawing/2017/decorative" val="1"/>
               </a:ext>
             </a:extLst>
           </p:cNvPr>
@@ -7482,10 +7482,10 @@
           <p:cNvPr id="39" name="Bildplatzhalter 7">
             <a:extLst>
               <a:ext uri="{FF2B5EF4-FFF2-40B4-BE49-F238E27FC236}">
-                <a16:creationId xmlns:a16="http://schemas.microsoft.com/office/drawing/2014/main" xmlns="" id="{F9D0B43C-E1CE-4C97-B82A-2D4CC82B3CB1}"/>
+                <a16:creationId xmlns:a16="http://schemas.microsoft.com/office/drawing/2014/main" id="{F9D0B43C-E1CE-4C97-B82A-2D4CC82B3CB1}"/>
               </a:ext>
               <a:ext uri="{C183D7F6-B498-43B3-948B-1728B52AA6E4}">
-                <adec:decorative xmlns:adec="http://schemas.microsoft.com/office/drawing/2017/decorative" xmlns="" val="1"/>
+                <adec:decorative xmlns:adec="http://schemas.microsoft.com/office/drawing/2017/decorative" val="1"/>
               </a:ext>
             </a:extLst>
           </p:cNvPr>
@@ -7665,10 +7665,10 @@
           <p:cNvPr id="2" name="Datumsplatzhalter 1">
             <a:extLst>
               <a:ext uri="{FF2B5EF4-FFF2-40B4-BE49-F238E27FC236}">
-                <a16:creationId xmlns:a16="http://schemas.microsoft.com/office/drawing/2014/main" xmlns="" id="{59D2061A-F7B9-4066-8B32-A1C3482EF45F}"/>
+                <a16:creationId xmlns:a16="http://schemas.microsoft.com/office/drawing/2014/main" id="{59D2061A-F7B9-4066-8B32-A1C3482EF45F}"/>
               </a:ext>
               <a:ext uri="{C183D7F6-B498-43B3-948B-1728B52AA6E4}">
-                <adec:decorative xmlns:adec="http://schemas.microsoft.com/office/drawing/2017/decorative" xmlns="" val="1"/>
+                <adec:decorative xmlns:adec="http://schemas.microsoft.com/office/drawing/2017/decorative" val="1"/>
               </a:ext>
             </a:extLst>
           </p:cNvPr>
@@ -7697,10 +7697,10 @@
           <p:cNvPr id="7" name="Fußzeilenplatzhalter 6">
             <a:extLst>
               <a:ext uri="{FF2B5EF4-FFF2-40B4-BE49-F238E27FC236}">
-                <a16:creationId xmlns:a16="http://schemas.microsoft.com/office/drawing/2014/main" xmlns="" id="{03FA1FEC-5452-4CA7-AC29-AAC289A6BF9A}"/>
+                <a16:creationId xmlns:a16="http://schemas.microsoft.com/office/drawing/2014/main" id="{03FA1FEC-5452-4CA7-AC29-AAC289A6BF9A}"/>
               </a:ext>
               <a:ext uri="{C183D7F6-B498-43B3-948B-1728B52AA6E4}">
-                <adec:decorative xmlns:adec="http://schemas.microsoft.com/office/drawing/2017/decorative" xmlns="" val="1"/>
+                <adec:decorative xmlns:adec="http://schemas.microsoft.com/office/drawing/2017/decorative" val="1"/>
               </a:ext>
             </a:extLst>
           </p:cNvPr>
@@ -7729,10 +7729,10 @@
           <p:cNvPr id="8" name="Foliennummernplatzhalter 7">
             <a:extLst>
               <a:ext uri="{FF2B5EF4-FFF2-40B4-BE49-F238E27FC236}">
-                <a16:creationId xmlns:a16="http://schemas.microsoft.com/office/drawing/2014/main" xmlns="" id="{2FF134CF-6C49-4AA3-AF75-2A80F4C02FB0}"/>
+                <a16:creationId xmlns:a16="http://schemas.microsoft.com/office/drawing/2014/main" id="{2FF134CF-6C49-4AA3-AF75-2A80F4C02FB0}"/>
               </a:ext>
               <a:ext uri="{C183D7F6-B498-43B3-948B-1728B52AA6E4}">
-                <adec:decorative xmlns:adec="http://schemas.microsoft.com/office/drawing/2017/decorative" xmlns="" val="1"/>
+                <adec:decorative xmlns:adec="http://schemas.microsoft.com/office/drawing/2017/decorative" val="1"/>
               </a:ext>
             </a:extLst>
           </p:cNvPr>
@@ -7792,7 +7792,7 @@
           <p:cNvPr id="6" name="Titel 5">
             <a:extLst>
               <a:ext uri="{FF2B5EF4-FFF2-40B4-BE49-F238E27FC236}">
-                <a16:creationId xmlns:a16="http://schemas.microsoft.com/office/drawing/2014/main" xmlns="" id="{CA6FC187-6C25-4F69-9AFE-1DD17195077A}"/>
+                <a16:creationId xmlns:a16="http://schemas.microsoft.com/office/drawing/2014/main" id="{CA6FC187-6C25-4F69-9AFE-1DD17195077A}"/>
               </a:ext>
             </a:extLst>
           </p:cNvPr>
@@ -7821,7 +7821,7 @@
           <p:cNvPr id="7" name="Textplatzhalter 7">
             <a:extLst>
               <a:ext uri="{FF2B5EF4-FFF2-40B4-BE49-F238E27FC236}">
-                <a16:creationId xmlns:a16="http://schemas.microsoft.com/office/drawing/2014/main" xmlns="" id="{6B0B00BC-A6AE-499E-84DC-2DAD144AC366}"/>
+                <a16:creationId xmlns:a16="http://schemas.microsoft.com/office/drawing/2014/main" id="{6B0B00BC-A6AE-499E-84DC-2DAD144AC366}"/>
               </a:ext>
             </a:extLst>
           </p:cNvPr>
@@ -7860,10 +7860,10 @@
           <p:cNvPr id="2" name="Datumsplatzhalter 1">
             <a:extLst>
               <a:ext uri="{FF2B5EF4-FFF2-40B4-BE49-F238E27FC236}">
-                <a16:creationId xmlns:a16="http://schemas.microsoft.com/office/drawing/2014/main" xmlns="" id="{F5C91D90-14FB-4048-90C7-46ECAAC1A854}"/>
+                <a16:creationId xmlns:a16="http://schemas.microsoft.com/office/drawing/2014/main" id="{F5C91D90-14FB-4048-90C7-46ECAAC1A854}"/>
               </a:ext>
               <a:ext uri="{C183D7F6-B498-43B3-948B-1728B52AA6E4}">
-                <adec:decorative xmlns:adec="http://schemas.microsoft.com/office/drawing/2017/decorative" xmlns="" val="1"/>
+                <adec:decorative xmlns:adec="http://schemas.microsoft.com/office/drawing/2017/decorative" val="1"/>
               </a:ext>
             </a:extLst>
           </p:cNvPr>
@@ -7892,10 +7892,10 @@
           <p:cNvPr id="8" name="Fußzeilenplatzhalter 7">
             <a:extLst>
               <a:ext uri="{FF2B5EF4-FFF2-40B4-BE49-F238E27FC236}">
-                <a16:creationId xmlns:a16="http://schemas.microsoft.com/office/drawing/2014/main" xmlns="" id="{76EB3F55-4D9D-4868-AB1E-72DEFF73228D}"/>
+                <a16:creationId xmlns:a16="http://schemas.microsoft.com/office/drawing/2014/main" id="{76EB3F55-4D9D-4868-AB1E-72DEFF73228D}"/>
               </a:ext>
               <a:ext uri="{C183D7F6-B498-43B3-948B-1728B52AA6E4}">
-                <adec:decorative xmlns:adec="http://schemas.microsoft.com/office/drawing/2017/decorative" xmlns="" val="1"/>
+                <adec:decorative xmlns:adec="http://schemas.microsoft.com/office/drawing/2017/decorative" val="1"/>
               </a:ext>
             </a:extLst>
           </p:cNvPr>
@@ -7924,10 +7924,10 @@
           <p:cNvPr id="9" name="Foliennummernplatzhalter 8">
             <a:extLst>
               <a:ext uri="{FF2B5EF4-FFF2-40B4-BE49-F238E27FC236}">
-                <a16:creationId xmlns:a16="http://schemas.microsoft.com/office/drawing/2014/main" xmlns="" id="{3F23070B-2BFB-4265-B171-72C9AFED1F2B}"/>
+                <a16:creationId xmlns:a16="http://schemas.microsoft.com/office/drawing/2014/main" id="{3F23070B-2BFB-4265-B171-72C9AFED1F2B}"/>
               </a:ext>
               <a:ext uri="{C183D7F6-B498-43B3-948B-1728B52AA6E4}">
-                <adec:decorative xmlns:adec="http://schemas.microsoft.com/office/drawing/2017/decorative" xmlns="" val="1"/>
+                <adec:decorative xmlns:adec="http://schemas.microsoft.com/office/drawing/2017/decorative" val="1"/>
               </a:ext>
             </a:extLst>
           </p:cNvPr>
@@ -7987,10 +7987,10 @@
           <p:cNvPr id="5" name="Datumsplatzhalter 4">
             <a:extLst>
               <a:ext uri="{FF2B5EF4-FFF2-40B4-BE49-F238E27FC236}">
-                <a16:creationId xmlns:a16="http://schemas.microsoft.com/office/drawing/2014/main" xmlns="" id="{8EB4CBF2-CB08-4260-9880-58E2CB8136E3}"/>
+                <a16:creationId xmlns:a16="http://schemas.microsoft.com/office/drawing/2014/main" id="{8EB4CBF2-CB08-4260-9880-58E2CB8136E3}"/>
               </a:ext>
               <a:ext uri="{C183D7F6-B498-43B3-948B-1728B52AA6E4}">
-                <adec:decorative xmlns:adec="http://schemas.microsoft.com/office/drawing/2017/decorative" xmlns="" val="1"/>
+                <adec:decorative xmlns:adec="http://schemas.microsoft.com/office/drawing/2017/decorative" val="1"/>
               </a:ext>
             </a:extLst>
           </p:cNvPr>
@@ -8019,10 +8019,10 @@
           <p:cNvPr id="6" name="Fußzeilenplatzhalter 5">
             <a:extLst>
               <a:ext uri="{FF2B5EF4-FFF2-40B4-BE49-F238E27FC236}">
-                <a16:creationId xmlns:a16="http://schemas.microsoft.com/office/drawing/2014/main" xmlns="" id="{506F32DB-70F8-46A0-9893-754D621F6EF8}"/>
+                <a16:creationId xmlns:a16="http://schemas.microsoft.com/office/drawing/2014/main" id="{506F32DB-70F8-46A0-9893-754D621F6EF8}"/>
               </a:ext>
               <a:ext uri="{C183D7F6-B498-43B3-948B-1728B52AA6E4}">
-                <adec:decorative xmlns:adec="http://schemas.microsoft.com/office/drawing/2017/decorative" xmlns="" val="1"/>
+                <adec:decorative xmlns:adec="http://schemas.microsoft.com/office/drawing/2017/decorative" val="1"/>
               </a:ext>
             </a:extLst>
           </p:cNvPr>
@@ -8051,10 +8051,10 @@
           <p:cNvPr id="7" name="Foliennummernplatzhalter 6">
             <a:extLst>
               <a:ext uri="{FF2B5EF4-FFF2-40B4-BE49-F238E27FC236}">
-                <a16:creationId xmlns:a16="http://schemas.microsoft.com/office/drawing/2014/main" xmlns="" id="{1E68AB4C-9B2E-45E8-ADE4-94712E4C94CE}"/>
+                <a16:creationId xmlns:a16="http://schemas.microsoft.com/office/drawing/2014/main" id="{1E68AB4C-9B2E-45E8-ADE4-94712E4C94CE}"/>
               </a:ext>
               <a:ext uri="{C183D7F6-B498-43B3-948B-1728B52AA6E4}">
-                <adec:decorative xmlns:adec="http://schemas.microsoft.com/office/drawing/2017/decorative" xmlns="" val="1"/>
+                <adec:decorative xmlns:adec="http://schemas.microsoft.com/office/drawing/2017/decorative" val="1"/>
               </a:ext>
             </a:extLst>
           </p:cNvPr>
@@ -8114,10 +8114,10 @@
           <p:cNvPr id="15" name="Grafik 14">
             <a:extLst>
               <a:ext uri="{FF2B5EF4-FFF2-40B4-BE49-F238E27FC236}">
-                <a16:creationId xmlns:a16="http://schemas.microsoft.com/office/drawing/2014/main" xmlns="" id="{6A65769C-F1B2-46A8-BE29-7BDA292637F7}"/>
+                <a16:creationId xmlns:a16="http://schemas.microsoft.com/office/drawing/2014/main" id="{6A65769C-F1B2-46A8-BE29-7BDA292637F7}"/>
               </a:ext>
               <a:ext uri="{C183D7F6-B498-43B3-948B-1728B52AA6E4}">
-                <adec:decorative xmlns:adec="http://schemas.microsoft.com/office/drawing/2017/decorative" xmlns="" val="1"/>
+                <adec:decorative xmlns:adec="http://schemas.microsoft.com/office/drawing/2017/decorative" val="1"/>
               </a:ext>
             </a:extLst>
           </p:cNvPr>
@@ -8153,10 +8153,10 @@
           <p:cNvPr id="17" name="Grafik 16">
             <a:extLst>
               <a:ext uri="{FF2B5EF4-FFF2-40B4-BE49-F238E27FC236}">
-                <a16:creationId xmlns:a16="http://schemas.microsoft.com/office/drawing/2014/main" xmlns="" id="{D336D8DB-9367-4FF1-A5AE-E9BB1F8D0313}"/>
+                <a16:creationId xmlns:a16="http://schemas.microsoft.com/office/drawing/2014/main" id="{D336D8DB-9367-4FF1-A5AE-E9BB1F8D0313}"/>
               </a:ext>
               <a:ext uri="{C183D7F6-B498-43B3-948B-1728B52AA6E4}">
-                <adec:decorative xmlns:adec="http://schemas.microsoft.com/office/drawing/2017/decorative" xmlns="" val="1"/>
+                <adec:decorative xmlns:adec="http://schemas.microsoft.com/office/drawing/2017/decorative" val="1"/>
               </a:ext>
             </a:extLst>
           </p:cNvPr>
@@ -8384,7 +8384,7 @@
           <p:cNvPr id="6" name="Bildplatzhalter 7">
             <a:extLst>
               <a:ext uri="{C183D7F6-B498-43B3-948B-1728B52AA6E4}">
-                <adec:decorative xmlns:adec="http://schemas.microsoft.com/office/drawing/2017/decorative" xmlns="" val="1"/>
+                <adec:decorative xmlns:adec="http://schemas.microsoft.com/office/drawing/2017/decorative" val="1"/>
               </a:ext>
             </a:extLst>
           </p:cNvPr>
@@ -8496,7 +8496,7 @@
           <p:cNvPr id="26" name="E-Mail">
             <a:extLst>
               <a:ext uri="{FF2B5EF4-FFF2-40B4-BE49-F238E27FC236}">
-                <a16:creationId xmlns:a16="http://schemas.microsoft.com/office/drawing/2014/main" xmlns="" id="{3F6E91DA-4315-4842-8A73-EF9BF09F6867}"/>
+                <a16:creationId xmlns:a16="http://schemas.microsoft.com/office/drawing/2014/main" id="{3F6E91DA-4315-4842-8A73-EF9BF09F6867}"/>
               </a:ext>
             </a:extLst>
           </p:cNvPr>
@@ -8596,7 +8596,7 @@
           <p:cNvPr id="28" name="Email Adresse">
             <a:extLst>
               <a:ext uri="{FF2B5EF4-FFF2-40B4-BE49-F238E27FC236}">
-                <a16:creationId xmlns:a16="http://schemas.microsoft.com/office/drawing/2014/main" xmlns="" id="{2E9486C1-A07E-4972-B438-0354636F62C8}"/>
+                <a16:creationId xmlns:a16="http://schemas.microsoft.com/office/drawing/2014/main" id="{2E9486C1-A07E-4972-B438-0354636F62C8}"/>
               </a:ext>
             </a:extLst>
           </p:cNvPr>
@@ -8676,7 +8676,7 @@
           <p:cNvPr id="29" name="Telefonnummer">
             <a:extLst>
               <a:ext uri="{FF2B5EF4-FFF2-40B4-BE49-F238E27FC236}">
-                <a16:creationId xmlns:a16="http://schemas.microsoft.com/office/drawing/2014/main" xmlns="" id="{3CBB6CEB-664B-42B5-8E61-99712350A32C}"/>
+                <a16:creationId xmlns:a16="http://schemas.microsoft.com/office/drawing/2014/main" id="{3CBB6CEB-664B-42B5-8E61-99712350A32C}"/>
               </a:ext>
             </a:extLst>
           </p:cNvPr>
@@ -8780,7 +8780,7 @@
           <p:cNvPr id="30" name="Durchwahl">
             <a:extLst>
               <a:ext uri="{FF2B5EF4-FFF2-40B4-BE49-F238E27FC236}">
-                <a16:creationId xmlns:a16="http://schemas.microsoft.com/office/drawing/2014/main" xmlns="" id="{1D874AC3-A5E6-4160-B089-7D15670623B6}"/>
+                <a16:creationId xmlns:a16="http://schemas.microsoft.com/office/drawing/2014/main" id="{1D874AC3-A5E6-4160-B089-7D15670623B6}"/>
               </a:ext>
             </a:extLst>
           </p:cNvPr>
@@ -8851,7 +8851,7 @@
           <p:cNvPr id="31" name="www">
             <a:extLst>
               <a:ext uri="{FF2B5EF4-FFF2-40B4-BE49-F238E27FC236}">
-                <a16:creationId xmlns:a16="http://schemas.microsoft.com/office/drawing/2014/main" xmlns="" id="{2D50EB94-1B6A-4808-869F-07F41859F9C9}"/>
+                <a16:creationId xmlns:a16="http://schemas.microsoft.com/office/drawing/2014/main" id="{2D50EB94-1B6A-4808-869F-07F41859F9C9}"/>
               </a:ext>
             </a:extLst>
           </p:cNvPr>
@@ -8922,7 +8922,7 @@
           <p:cNvPr id="32" name="Webadresse">
             <a:extLst>
               <a:ext uri="{FF2B5EF4-FFF2-40B4-BE49-F238E27FC236}">
-                <a16:creationId xmlns:a16="http://schemas.microsoft.com/office/drawing/2014/main" xmlns="" id="{6E6785CE-8C96-4924-8283-EC51081BD240}"/>
+                <a16:creationId xmlns:a16="http://schemas.microsoft.com/office/drawing/2014/main" id="{6E6785CE-8C96-4924-8283-EC51081BD240}"/>
               </a:ext>
             </a:extLst>
           </p:cNvPr>
@@ -9002,7 +9002,7 @@
           <p:cNvPr id="33" name="Universität Stuttgart">
             <a:extLst>
               <a:ext uri="{FF2B5EF4-FFF2-40B4-BE49-F238E27FC236}">
-                <a16:creationId xmlns:a16="http://schemas.microsoft.com/office/drawing/2014/main" xmlns="" id="{0C08BB04-B052-4FF7-B62B-8ABD826FA796}"/>
+                <a16:creationId xmlns:a16="http://schemas.microsoft.com/office/drawing/2014/main" id="{0C08BB04-B052-4FF7-B62B-8ABD826FA796}"/>
               </a:ext>
             </a:extLst>
           </p:cNvPr>
@@ -9099,7 +9099,7 @@
           <p:cNvPr id="34" name="Abteilung Institut">
             <a:extLst>
               <a:ext uri="{FF2B5EF4-FFF2-40B4-BE49-F238E27FC236}">
-                <a16:creationId xmlns:a16="http://schemas.microsoft.com/office/drawing/2014/main" xmlns="" id="{547D4004-B9BD-4097-81E1-6F5F7DA08A0D}"/>
+                <a16:creationId xmlns:a16="http://schemas.microsoft.com/office/drawing/2014/main" id="{547D4004-B9BD-4097-81E1-6F5F7DA08A0D}"/>
               </a:ext>
             </a:extLst>
           </p:cNvPr>
@@ -9191,7 +9191,7 @@
           <p:cNvPr id="35" name="Adressfeld">
             <a:extLst>
               <a:ext uri="{FF2B5EF4-FFF2-40B4-BE49-F238E27FC236}">
-                <a16:creationId xmlns:a16="http://schemas.microsoft.com/office/drawing/2014/main" xmlns="" id="{9484ABC1-A1AA-40CB-8BB1-AB6F21778D07}"/>
+                <a16:creationId xmlns:a16="http://schemas.microsoft.com/office/drawing/2014/main" id="{9484ABC1-A1AA-40CB-8BB1-AB6F21778D07}"/>
               </a:ext>
             </a:extLst>
           </p:cNvPr>
@@ -9307,10 +9307,10 @@
           <p:cNvPr id="28" name="Grafik 27">
             <a:extLst>
               <a:ext uri="{FF2B5EF4-FFF2-40B4-BE49-F238E27FC236}">
-                <a16:creationId xmlns:a16="http://schemas.microsoft.com/office/drawing/2014/main" xmlns="" id="{FB752999-B480-46AD-86AB-B98CEC626865}"/>
+                <a16:creationId xmlns:a16="http://schemas.microsoft.com/office/drawing/2014/main" id="{FB752999-B480-46AD-86AB-B98CEC626865}"/>
               </a:ext>
               <a:ext uri="{C183D7F6-B498-43B3-948B-1728B52AA6E4}">
-                <adec:decorative xmlns:adec="http://schemas.microsoft.com/office/drawing/2017/decorative" xmlns="" val="1"/>
+                <adec:decorative xmlns:adec="http://schemas.microsoft.com/office/drawing/2017/decorative" val="1"/>
               </a:ext>
             </a:extLst>
           </p:cNvPr>
@@ -9347,10 +9347,10 @@
           <p:cNvPr id="29" name="Grafik 28">
             <a:extLst>
               <a:ext uri="{FF2B5EF4-FFF2-40B4-BE49-F238E27FC236}">
-                <a16:creationId xmlns:a16="http://schemas.microsoft.com/office/drawing/2014/main" xmlns="" id="{EA94CF37-DF83-4EB6-B7FC-3A54F0E0CFEA}"/>
+                <a16:creationId xmlns:a16="http://schemas.microsoft.com/office/drawing/2014/main" id="{EA94CF37-DF83-4EB6-B7FC-3A54F0E0CFEA}"/>
               </a:ext>
               <a:ext uri="{C183D7F6-B498-43B3-948B-1728B52AA6E4}">
-                <adec:decorative xmlns:adec="http://schemas.microsoft.com/office/drawing/2017/decorative" xmlns="" val="1"/>
+                <adec:decorative xmlns:adec="http://schemas.microsoft.com/office/drawing/2017/decorative" val="1"/>
               </a:ext>
             </a:extLst>
           </p:cNvPr>
@@ -9579,7 +9579,7 @@
           <p:cNvPr id="27" name="Bildplatzhalter 7">
             <a:extLst>
               <a:ext uri="{FF2B5EF4-FFF2-40B4-BE49-F238E27FC236}">
-                <a16:creationId xmlns:a16="http://schemas.microsoft.com/office/drawing/2014/main" xmlns="" id="{E8FAD59D-97FD-4838-AA91-B266FA5DD370}"/>
+                <a16:creationId xmlns:a16="http://schemas.microsoft.com/office/drawing/2014/main" id="{E8FAD59D-97FD-4838-AA91-B266FA5DD370}"/>
               </a:ext>
             </a:extLst>
           </p:cNvPr>
@@ -9689,7 +9689,7 @@
           <p:cNvPr id="21" name="E-Mail">
             <a:extLst>
               <a:ext uri="{FF2B5EF4-FFF2-40B4-BE49-F238E27FC236}">
-                <a16:creationId xmlns:a16="http://schemas.microsoft.com/office/drawing/2014/main" xmlns="" id="{0EF3AEB7-6218-41A3-AF52-E25C7AF428CB}"/>
+                <a16:creationId xmlns:a16="http://schemas.microsoft.com/office/drawing/2014/main" id="{0EF3AEB7-6218-41A3-AF52-E25C7AF428CB}"/>
               </a:ext>
             </a:extLst>
           </p:cNvPr>
@@ -9789,7 +9789,7 @@
           <p:cNvPr id="30" name="Email Adresse">
             <a:extLst>
               <a:ext uri="{FF2B5EF4-FFF2-40B4-BE49-F238E27FC236}">
-                <a16:creationId xmlns:a16="http://schemas.microsoft.com/office/drawing/2014/main" xmlns="" id="{118DEBC9-D26E-41CE-8AAB-C22253B8FBDB}"/>
+                <a16:creationId xmlns:a16="http://schemas.microsoft.com/office/drawing/2014/main" id="{118DEBC9-D26E-41CE-8AAB-C22253B8FBDB}"/>
               </a:ext>
             </a:extLst>
           </p:cNvPr>
@@ -9869,7 +9869,7 @@
           <p:cNvPr id="38" name="Durchwahl">
             <a:extLst>
               <a:ext uri="{FF2B5EF4-FFF2-40B4-BE49-F238E27FC236}">
-                <a16:creationId xmlns:a16="http://schemas.microsoft.com/office/drawing/2014/main" xmlns="" id="{E133C5D0-8225-4F00-87C0-B1A77BDD5308}"/>
+                <a16:creationId xmlns:a16="http://schemas.microsoft.com/office/drawing/2014/main" id="{E133C5D0-8225-4F00-87C0-B1A77BDD5308}"/>
               </a:ext>
             </a:extLst>
           </p:cNvPr>
@@ -9944,7 +9944,7 @@
           <p:cNvPr id="32" name="Durchwahl">
             <a:extLst>
               <a:ext uri="{FF2B5EF4-FFF2-40B4-BE49-F238E27FC236}">
-                <a16:creationId xmlns:a16="http://schemas.microsoft.com/office/drawing/2014/main" xmlns="" id="{76EA4574-E195-402F-BE7A-C5DAB28ED00E}"/>
+                <a16:creationId xmlns:a16="http://schemas.microsoft.com/office/drawing/2014/main" id="{76EA4574-E195-402F-BE7A-C5DAB28ED00E}"/>
               </a:ext>
             </a:extLst>
           </p:cNvPr>
@@ -10015,7 +10015,7 @@
           <p:cNvPr id="33" name="www">
             <a:extLst>
               <a:ext uri="{FF2B5EF4-FFF2-40B4-BE49-F238E27FC236}">
-                <a16:creationId xmlns:a16="http://schemas.microsoft.com/office/drawing/2014/main" xmlns="" id="{A2A5A03D-8A1F-46C2-8C7A-3BB7531CDFB9}"/>
+                <a16:creationId xmlns:a16="http://schemas.microsoft.com/office/drawing/2014/main" id="{A2A5A03D-8A1F-46C2-8C7A-3BB7531CDFB9}"/>
               </a:ext>
             </a:extLst>
           </p:cNvPr>
@@ -10086,7 +10086,7 @@
           <p:cNvPr id="34" name="Webadresse">
             <a:extLst>
               <a:ext uri="{FF2B5EF4-FFF2-40B4-BE49-F238E27FC236}">
-                <a16:creationId xmlns:a16="http://schemas.microsoft.com/office/drawing/2014/main" xmlns="" id="{728AF890-7B6D-440A-957D-471333F7DC28}"/>
+                <a16:creationId xmlns:a16="http://schemas.microsoft.com/office/drawing/2014/main" id="{728AF890-7B6D-440A-957D-471333F7DC28}"/>
               </a:ext>
             </a:extLst>
           </p:cNvPr>
@@ -10166,7 +10166,7 @@
           <p:cNvPr id="35" name="Universität Stuttgart">
             <a:extLst>
               <a:ext uri="{FF2B5EF4-FFF2-40B4-BE49-F238E27FC236}">
-                <a16:creationId xmlns:a16="http://schemas.microsoft.com/office/drawing/2014/main" xmlns="" id="{9B3B404A-B28D-4400-A9AD-FAFEB6FD8D1D}"/>
+                <a16:creationId xmlns:a16="http://schemas.microsoft.com/office/drawing/2014/main" id="{9B3B404A-B28D-4400-A9AD-FAFEB6FD8D1D}"/>
               </a:ext>
             </a:extLst>
           </p:cNvPr>
@@ -10263,7 +10263,7 @@
           <p:cNvPr id="36" name="Abteilung Institut">
             <a:extLst>
               <a:ext uri="{FF2B5EF4-FFF2-40B4-BE49-F238E27FC236}">
-                <a16:creationId xmlns:a16="http://schemas.microsoft.com/office/drawing/2014/main" xmlns="" id="{635F31DC-6AAF-4C41-8D74-05D4427F48EA}"/>
+                <a16:creationId xmlns:a16="http://schemas.microsoft.com/office/drawing/2014/main" id="{635F31DC-6AAF-4C41-8D74-05D4427F48EA}"/>
               </a:ext>
             </a:extLst>
           </p:cNvPr>
@@ -10355,7 +10355,7 @@
           <p:cNvPr id="37" name="Adressfeld">
             <a:extLst>
               <a:ext uri="{FF2B5EF4-FFF2-40B4-BE49-F238E27FC236}">
-                <a16:creationId xmlns:a16="http://schemas.microsoft.com/office/drawing/2014/main" xmlns="" id="{4C5BC753-6D21-46B4-A737-8F9A5E20BA27}"/>
+                <a16:creationId xmlns:a16="http://schemas.microsoft.com/office/drawing/2014/main" id="{4C5BC753-6D21-46B4-A737-8F9A5E20BA27}"/>
               </a:ext>
             </a:extLst>
           </p:cNvPr>
@@ -10457,10 +10457,10 @@
           <p:cNvPr id="14" name="Grafik 13">
             <a:extLst>
               <a:ext uri="{FF2B5EF4-FFF2-40B4-BE49-F238E27FC236}">
-                <a16:creationId xmlns:a16="http://schemas.microsoft.com/office/drawing/2014/main" xmlns="" id="{81775667-CF64-48AD-BB4D-F55AF1DD9BD6}"/>
+                <a16:creationId xmlns:a16="http://schemas.microsoft.com/office/drawing/2014/main" id="{81775667-CF64-48AD-BB4D-F55AF1DD9BD6}"/>
               </a:ext>
               <a:ext uri="{C183D7F6-B498-43B3-948B-1728B52AA6E4}">
-                <adec:decorative xmlns:adec="http://schemas.microsoft.com/office/drawing/2017/decorative" xmlns="" val="1"/>
+                <adec:decorative xmlns:adec="http://schemas.microsoft.com/office/drawing/2017/decorative" val="1"/>
               </a:ext>
             </a:extLst>
           </p:cNvPr>
@@ -10496,10 +10496,10 @@
           <p:cNvPr id="26" name="Textplatzhalter 9">
             <a:extLst>
               <a:ext uri="{FF2B5EF4-FFF2-40B4-BE49-F238E27FC236}">
-                <a16:creationId xmlns:a16="http://schemas.microsoft.com/office/drawing/2014/main" xmlns="" id="{CCC87B1C-0FE3-4333-ACA0-A95E3356614D}"/>
+                <a16:creationId xmlns:a16="http://schemas.microsoft.com/office/drawing/2014/main" id="{CCC87B1C-0FE3-4333-ACA0-A95E3356614D}"/>
               </a:ext>
               <a:ext uri="{C183D7F6-B498-43B3-948B-1728B52AA6E4}">
-                <adec:decorative xmlns:adec="http://schemas.microsoft.com/office/drawing/2017/decorative" xmlns="" val="0"/>
+                <adec:decorative xmlns:adec="http://schemas.microsoft.com/office/drawing/2017/decorative" val="0"/>
               </a:ext>
             </a:extLst>
           </p:cNvPr>
@@ -10735,7 +10735,7 @@
           <p:cNvPr id="6" name="Bildplatzhalter 7">
             <a:extLst>
               <a:ext uri="{C183D7F6-B498-43B3-948B-1728B52AA6E4}">
-                <adec:decorative xmlns:adec="http://schemas.microsoft.com/office/drawing/2017/decorative" xmlns="" val="1"/>
+                <adec:decorative xmlns:adec="http://schemas.microsoft.com/office/drawing/2017/decorative" val="1"/>
               </a:ext>
             </a:extLst>
           </p:cNvPr>
@@ -10847,7 +10847,7 @@
           <p:cNvPr id="20" name="E-Mail">
             <a:extLst>
               <a:ext uri="{FF2B5EF4-FFF2-40B4-BE49-F238E27FC236}">
-                <a16:creationId xmlns:a16="http://schemas.microsoft.com/office/drawing/2014/main" xmlns="" id="{9F03756C-F8E1-41A9-9E8F-8F8808524CC2}"/>
+                <a16:creationId xmlns:a16="http://schemas.microsoft.com/office/drawing/2014/main" id="{9F03756C-F8E1-41A9-9E8F-8F8808524CC2}"/>
               </a:ext>
             </a:extLst>
           </p:cNvPr>
@@ -10947,7 +10947,7 @@
           <p:cNvPr id="28" name="Email Adresse">
             <a:extLst>
               <a:ext uri="{FF2B5EF4-FFF2-40B4-BE49-F238E27FC236}">
-                <a16:creationId xmlns:a16="http://schemas.microsoft.com/office/drawing/2014/main" xmlns="" id="{16E0C391-6D81-4638-AEFC-89677A952E40}"/>
+                <a16:creationId xmlns:a16="http://schemas.microsoft.com/office/drawing/2014/main" id="{16E0C391-6D81-4638-AEFC-89677A952E40}"/>
               </a:ext>
             </a:extLst>
           </p:cNvPr>
@@ -11027,7 +11027,7 @@
           <p:cNvPr id="29" name="Telefonnummer">
             <a:extLst>
               <a:ext uri="{FF2B5EF4-FFF2-40B4-BE49-F238E27FC236}">
-                <a16:creationId xmlns:a16="http://schemas.microsoft.com/office/drawing/2014/main" xmlns="" id="{962EF95F-DFF9-42AD-846E-88B8E1EACBB8}"/>
+                <a16:creationId xmlns:a16="http://schemas.microsoft.com/office/drawing/2014/main" id="{962EF95F-DFF9-42AD-846E-88B8E1EACBB8}"/>
               </a:ext>
             </a:extLst>
           </p:cNvPr>
@@ -11128,7 +11128,7 @@
           <p:cNvPr id="30" name="Durchwahl">
             <a:extLst>
               <a:ext uri="{FF2B5EF4-FFF2-40B4-BE49-F238E27FC236}">
-                <a16:creationId xmlns:a16="http://schemas.microsoft.com/office/drawing/2014/main" xmlns="" id="{51DB8C5B-BB3C-4960-B1FA-19ECA6C9B7D6}"/>
+                <a16:creationId xmlns:a16="http://schemas.microsoft.com/office/drawing/2014/main" id="{51DB8C5B-BB3C-4960-B1FA-19ECA6C9B7D6}"/>
               </a:ext>
             </a:extLst>
           </p:cNvPr>
@@ -11199,7 +11199,7 @@
           <p:cNvPr id="31" name="www">
             <a:extLst>
               <a:ext uri="{FF2B5EF4-FFF2-40B4-BE49-F238E27FC236}">
-                <a16:creationId xmlns:a16="http://schemas.microsoft.com/office/drawing/2014/main" xmlns="" id="{49C9DA9F-B659-4D05-AF78-F90AE17CE3AA}"/>
+                <a16:creationId xmlns:a16="http://schemas.microsoft.com/office/drawing/2014/main" id="{49C9DA9F-B659-4D05-AF78-F90AE17CE3AA}"/>
               </a:ext>
             </a:extLst>
           </p:cNvPr>
@@ -11270,7 +11270,7 @@
           <p:cNvPr id="32" name="Webadresse">
             <a:extLst>
               <a:ext uri="{FF2B5EF4-FFF2-40B4-BE49-F238E27FC236}">
-                <a16:creationId xmlns:a16="http://schemas.microsoft.com/office/drawing/2014/main" xmlns="" id="{0C4D8FC5-457E-4A8D-8556-21F9679D91EE}"/>
+                <a16:creationId xmlns:a16="http://schemas.microsoft.com/office/drawing/2014/main" id="{0C4D8FC5-457E-4A8D-8556-21F9679D91EE}"/>
               </a:ext>
             </a:extLst>
           </p:cNvPr>
@@ -11350,7 +11350,7 @@
           <p:cNvPr id="33" name="Universität Stuttgart">
             <a:extLst>
               <a:ext uri="{FF2B5EF4-FFF2-40B4-BE49-F238E27FC236}">
-                <a16:creationId xmlns:a16="http://schemas.microsoft.com/office/drawing/2014/main" xmlns="" id="{83E91CC7-0E6F-4BB9-B42C-DCE91142E97E}"/>
+                <a16:creationId xmlns:a16="http://schemas.microsoft.com/office/drawing/2014/main" id="{83E91CC7-0E6F-4BB9-B42C-DCE91142E97E}"/>
               </a:ext>
             </a:extLst>
           </p:cNvPr>
@@ -11447,7 +11447,7 @@
           <p:cNvPr id="34" name="Abteilung Institut">
             <a:extLst>
               <a:ext uri="{FF2B5EF4-FFF2-40B4-BE49-F238E27FC236}">
-                <a16:creationId xmlns:a16="http://schemas.microsoft.com/office/drawing/2014/main" xmlns="" id="{1D7FCBA3-310D-4C4F-B627-581B3FB01F62}"/>
+                <a16:creationId xmlns:a16="http://schemas.microsoft.com/office/drawing/2014/main" id="{1D7FCBA3-310D-4C4F-B627-581B3FB01F62}"/>
               </a:ext>
             </a:extLst>
           </p:cNvPr>
@@ -11539,7 +11539,7 @@
           <p:cNvPr id="35" name="Adressfeld">
             <a:extLst>
               <a:ext uri="{FF2B5EF4-FFF2-40B4-BE49-F238E27FC236}">
-                <a16:creationId xmlns:a16="http://schemas.microsoft.com/office/drawing/2014/main" xmlns="" id="{3734D7D9-80A3-43EF-A48F-5C4CFE547D22}"/>
+                <a16:creationId xmlns:a16="http://schemas.microsoft.com/office/drawing/2014/main" id="{3734D7D9-80A3-43EF-A48F-5C4CFE547D22}"/>
               </a:ext>
             </a:extLst>
           </p:cNvPr>
@@ -11655,10 +11655,10 @@
           <p:cNvPr id="19" name="Grafik 18">
             <a:extLst>
               <a:ext uri="{FF2B5EF4-FFF2-40B4-BE49-F238E27FC236}">
-                <a16:creationId xmlns:a16="http://schemas.microsoft.com/office/drawing/2014/main" xmlns="" id="{E346FCD1-C77C-481D-AFE7-B381E7852474}"/>
+                <a16:creationId xmlns:a16="http://schemas.microsoft.com/office/drawing/2014/main" id="{E346FCD1-C77C-481D-AFE7-B381E7852474}"/>
               </a:ext>
               <a:ext uri="{C183D7F6-B498-43B3-948B-1728B52AA6E4}">
-                <adec:decorative xmlns:adec="http://schemas.microsoft.com/office/drawing/2017/decorative" xmlns="" val="1"/>
+                <adec:decorative xmlns:adec="http://schemas.microsoft.com/office/drawing/2017/decorative" val="1"/>
               </a:ext>
             </a:extLst>
           </p:cNvPr>
@@ -11695,7 +11695,7 @@
           <p:cNvPr id="28" name="Textplatzhalter 9">
             <a:extLst>
               <a:ext uri="{FF2B5EF4-FFF2-40B4-BE49-F238E27FC236}">
-                <a16:creationId xmlns:a16="http://schemas.microsoft.com/office/drawing/2014/main" xmlns="" id="{F9396F62-FEBC-4F38-A2F8-B90611FD8C22}"/>
+                <a16:creationId xmlns:a16="http://schemas.microsoft.com/office/drawing/2014/main" id="{F9396F62-FEBC-4F38-A2F8-B90611FD8C22}"/>
               </a:ext>
             </a:extLst>
           </p:cNvPr>
@@ -11935,7 +11935,7 @@
           <p:cNvPr id="27" name="Bildplatzhalter 7">
             <a:extLst>
               <a:ext uri="{FF2B5EF4-FFF2-40B4-BE49-F238E27FC236}">
-                <a16:creationId xmlns:a16="http://schemas.microsoft.com/office/drawing/2014/main" xmlns="" id="{E8FAD59D-97FD-4838-AA91-B266FA5DD370}"/>
+                <a16:creationId xmlns:a16="http://schemas.microsoft.com/office/drawing/2014/main" id="{E8FAD59D-97FD-4838-AA91-B266FA5DD370}"/>
               </a:ext>
             </a:extLst>
           </p:cNvPr>
@@ -12045,7 +12045,7 @@
           <p:cNvPr id="21" name="E-Mail">
             <a:extLst>
               <a:ext uri="{FF2B5EF4-FFF2-40B4-BE49-F238E27FC236}">
-                <a16:creationId xmlns:a16="http://schemas.microsoft.com/office/drawing/2014/main" xmlns="" id="{DCA0F4E3-1440-45FD-9AD3-AC60C7275A79}"/>
+                <a16:creationId xmlns:a16="http://schemas.microsoft.com/office/drawing/2014/main" id="{DCA0F4E3-1440-45FD-9AD3-AC60C7275A79}"/>
               </a:ext>
             </a:extLst>
           </p:cNvPr>
@@ -12145,7 +12145,7 @@
           <p:cNvPr id="30" name="Email Adresse">
             <a:extLst>
               <a:ext uri="{FF2B5EF4-FFF2-40B4-BE49-F238E27FC236}">
-                <a16:creationId xmlns:a16="http://schemas.microsoft.com/office/drawing/2014/main" xmlns="" id="{18AFB8D7-22AC-4F06-9D32-AF7F36CC699E}"/>
+                <a16:creationId xmlns:a16="http://schemas.microsoft.com/office/drawing/2014/main" id="{18AFB8D7-22AC-4F06-9D32-AF7F36CC699E}"/>
               </a:ext>
             </a:extLst>
           </p:cNvPr>
@@ -12225,7 +12225,7 @@
           <p:cNvPr id="37" name="Durchwahl">
             <a:extLst>
               <a:ext uri="{FF2B5EF4-FFF2-40B4-BE49-F238E27FC236}">
-                <a16:creationId xmlns:a16="http://schemas.microsoft.com/office/drawing/2014/main" xmlns="" id="{185017B9-74A5-4F34-B4F0-E3B0154A9FDA}"/>
+                <a16:creationId xmlns:a16="http://schemas.microsoft.com/office/drawing/2014/main" id="{185017B9-74A5-4F34-B4F0-E3B0154A9FDA}"/>
               </a:ext>
             </a:extLst>
           </p:cNvPr>
@@ -12296,7 +12296,7 @@
           <p:cNvPr id="31" name="Durchwahl">
             <a:extLst>
               <a:ext uri="{FF2B5EF4-FFF2-40B4-BE49-F238E27FC236}">
-                <a16:creationId xmlns:a16="http://schemas.microsoft.com/office/drawing/2014/main" xmlns="" id="{01FBFF05-552E-459B-91AE-83CAFE128CD4}"/>
+                <a16:creationId xmlns:a16="http://schemas.microsoft.com/office/drawing/2014/main" id="{01FBFF05-552E-459B-91AE-83CAFE128CD4}"/>
               </a:ext>
             </a:extLst>
           </p:cNvPr>
@@ -12367,7 +12367,7 @@
           <p:cNvPr id="32" name="www">
             <a:extLst>
               <a:ext uri="{FF2B5EF4-FFF2-40B4-BE49-F238E27FC236}">
-                <a16:creationId xmlns:a16="http://schemas.microsoft.com/office/drawing/2014/main" xmlns="" id="{67CA897D-892F-4CE9-B942-3B8DA0BA2496}"/>
+                <a16:creationId xmlns:a16="http://schemas.microsoft.com/office/drawing/2014/main" id="{67CA897D-892F-4CE9-B942-3B8DA0BA2496}"/>
               </a:ext>
             </a:extLst>
           </p:cNvPr>
@@ -12438,7 +12438,7 @@
           <p:cNvPr id="33" name="Webadresse">
             <a:extLst>
               <a:ext uri="{FF2B5EF4-FFF2-40B4-BE49-F238E27FC236}">
-                <a16:creationId xmlns:a16="http://schemas.microsoft.com/office/drawing/2014/main" xmlns="" id="{2BEFE346-3B3E-4B37-B098-AEC82CBD8CB3}"/>
+                <a16:creationId xmlns:a16="http://schemas.microsoft.com/office/drawing/2014/main" id="{2BEFE346-3B3E-4B37-B098-AEC82CBD8CB3}"/>
               </a:ext>
             </a:extLst>
           </p:cNvPr>
@@ -12518,7 +12518,7 @@
           <p:cNvPr id="34" name="Universität Stuttgart">
             <a:extLst>
               <a:ext uri="{FF2B5EF4-FFF2-40B4-BE49-F238E27FC236}">
-                <a16:creationId xmlns:a16="http://schemas.microsoft.com/office/drawing/2014/main" xmlns="" id="{1170A3D9-2665-43AC-B8CF-228214AB4591}"/>
+                <a16:creationId xmlns:a16="http://schemas.microsoft.com/office/drawing/2014/main" id="{1170A3D9-2665-43AC-B8CF-228214AB4591}"/>
               </a:ext>
             </a:extLst>
           </p:cNvPr>
@@ -12615,7 +12615,7 @@
           <p:cNvPr id="35" name="Abteilung Institut">
             <a:extLst>
               <a:ext uri="{FF2B5EF4-FFF2-40B4-BE49-F238E27FC236}">
-                <a16:creationId xmlns:a16="http://schemas.microsoft.com/office/drawing/2014/main" xmlns="" id="{E7568E75-9942-41F4-B0BF-B47296C8126E}"/>
+                <a16:creationId xmlns:a16="http://schemas.microsoft.com/office/drawing/2014/main" id="{E7568E75-9942-41F4-B0BF-B47296C8126E}"/>
               </a:ext>
             </a:extLst>
           </p:cNvPr>
@@ -12707,7 +12707,7 @@
           <p:cNvPr id="36" name="Adressfeld">
             <a:extLst>
               <a:ext uri="{FF2B5EF4-FFF2-40B4-BE49-F238E27FC236}">
-                <a16:creationId xmlns:a16="http://schemas.microsoft.com/office/drawing/2014/main" xmlns="" id="{4CC9AD5A-92CF-494C-BE6A-00BD7C60B579}"/>
+                <a16:creationId xmlns:a16="http://schemas.microsoft.com/office/drawing/2014/main" id="{4CC9AD5A-92CF-494C-BE6A-00BD7C60B579}"/>
               </a:ext>
             </a:extLst>
           </p:cNvPr>
@@ -13191,10 +13191,10 @@
           <p:cNvPr id="7" name="Grafik 6">
             <a:extLst>
               <a:ext uri="{FF2B5EF4-FFF2-40B4-BE49-F238E27FC236}">
-                <a16:creationId xmlns:a16="http://schemas.microsoft.com/office/drawing/2014/main" xmlns="" id="{18916216-B032-4200-99C8-5BA3A21F8800}"/>
+                <a16:creationId xmlns:a16="http://schemas.microsoft.com/office/drawing/2014/main" id="{18916216-B032-4200-99C8-5BA3A21F8800}"/>
               </a:ext>
               <a:ext uri="{C183D7F6-B498-43B3-948B-1728B52AA6E4}">
-                <adec:decorative xmlns:adec="http://schemas.microsoft.com/office/drawing/2017/decorative" xmlns="" val="1"/>
+                <adec:decorative xmlns:adec="http://schemas.microsoft.com/office/drawing/2017/decorative" val="1"/>
               </a:ext>
             </a:extLst>
           </p:cNvPr>
@@ -13230,10 +13230,10 @@
           <p:cNvPr id="8" name="Grafik 7">
             <a:extLst>
               <a:ext uri="{FF2B5EF4-FFF2-40B4-BE49-F238E27FC236}">
-                <a16:creationId xmlns:a16="http://schemas.microsoft.com/office/drawing/2014/main" xmlns="" id="{A72007CB-CD36-48DD-9918-1BFC87D15E94}"/>
+                <a16:creationId xmlns:a16="http://schemas.microsoft.com/office/drawing/2014/main" id="{A72007CB-CD36-48DD-9918-1BFC87D15E94}"/>
               </a:ext>
               <a:ext uri="{C183D7F6-B498-43B3-948B-1728B52AA6E4}">
-                <adec:decorative xmlns:adec="http://schemas.microsoft.com/office/drawing/2017/decorative" xmlns="" val="1"/>
+                <adec:decorative xmlns:adec="http://schemas.microsoft.com/office/drawing/2017/decorative" val="1"/>
               </a:ext>
             </a:extLst>
           </p:cNvPr>
@@ -13306,7 +13306,7 @@
           <p:cNvPr id="3" name="Titel 2">
             <a:extLst>
               <a:ext uri="{FF2B5EF4-FFF2-40B4-BE49-F238E27FC236}">
-                <a16:creationId xmlns:a16="http://schemas.microsoft.com/office/drawing/2014/main" xmlns="" id="{86BA6808-8CD4-4528-935A-3978EF1718CF}"/>
+                <a16:creationId xmlns:a16="http://schemas.microsoft.com/office/drawing/2014/main" id="{86BA6808-8CD4-4528-935A-3978EF1718CF}"/>
               </a:ext>
             </a:extLst>
           </p:cNvPr>
@@ -13447,7 +13447,7 @@
           <p:cNvPr id="14" name="Textplatzhalter 10">
             <a:extLst>
               <a:ext uri="{FF2B5EF4-FFF2-40B4-BE49-F238E27FC236}">
-                <a16:creationId xmlns:a16="http://schemas.microsoft.com/office/drawing/2014/main" xmlns="" id="{3A6FC492-F4FE-474B-9BFE-DAAE645B98B7}"/>
+                <a16:creationId xmlns:a16="http://schemas.microsoft.com/office/drawing/2014/main" id="{3A6FC492-F4FE-474B-9BFE-DAAE645B98B7}"/>
               </a:ext>
             </a:extLst>
           </p:cNvPr>
@@ -13541,10 +13541,10 @@
           <p:cNvPr id="10" name="Grafik 9">
             <a:extLst>
               <a:ext uri="{FF2B5EF4-FFF2-40B4-BE49-F238E27FC236}">
-                <a16:creationId xmlns:a16="http://schemas.microsoft.com/office/drawing/2014/main" xmlns="" id="{CA70C5C8-1CB6-4CC4-A9D8-081FC52E5A92}"/>
+                <a16:creationId xmlns:a16="http://schemas.microsoft.com/office/drawing/2014/main" id="{CA70C5C8-1CB6-4CC4-A9D8-081FC52E5A92}"/>
               </a:ext>
               <a:ext uri="{C183D7F6-B498-43B3-948B-1728B52AA6E4}">
-                <adec:decorative xmlns:adec="http://schemas.microsoft.com/office/drawing/2017/decorative" xmlns="" val="1"/>
+                <adec:decorative xmlns:adec="http://schemas.microsoft.com/office/drawing/2017/decorative" val="1"/>
               </a:ext>
             </a:extLst>
           </p:cNvPr>
@@ -13618,7 +13618,7 @@
           <p:cNvPr id="8" name="Titel 2">
             <a:extLst>
               <a:ext uri="{FF2B5EF4-FFF2-40B4-BE49-F238E27FC236}">
-                <a16:creationId xmlns:a16="http://schemas.microsoft.com/office/drawing/2014/main" xmlns="" id="{098769ED-90D0-4473-B1B2-1CE12B519F39}"/>
+                <a16:creationId xmlns:a16="http://schemas.microsoft.com/office/drawing/2014/main" id="{098769ED-90D0-4473-B1B2-1CE12B519F39}"/>
               </a:ext>
             </a:extLst>
           </p:cNvPr>
@@ -13746,7 +13746,7 @@
           <p:cNvPr id="7" name="Bildplatzhalter 4">
             <a:extLst>
               <a:ext uri="{FF2B5EF4-FFF2-40B4-BE49-F238E27FC236}">
-                <a16:creationId xmlns:a16="http://schemas.microsoft.com/office/drawing/2014/main" xmlns="" id="{B9FD99DC-C17A-49FB-8F13-40F41E801ABC}"/>
+                <a16:creationId xmlns:a16="http://schemas.microsoft.com/office/drawing/2014/main" id="{B9FD99DC-C17A-49FB-8F13-40F41E801ABC}"/>
               </a:ext>
             </a:extLst>
           </p:cNvPr>
@@ -13825,10 +13825,10 @@
           <p:cNvPr id="11" name="Grafik 10">
             <a:extLst>
               <a:ext uri="{FF2B5EF4-FFF2-40B4-BE49-F238E27FC236}">
-                <a16:creationId xmlns:a16="http://schemas.microsoft.com/office/drawing/2014/main" xmlns="" id="{30BE638A-719E-41CB-B435-44353E5553A3}"/>
+                <a16:creationId xmlns:a16="http://schemas.microsoft.com/office/drawing/2014/main" id="{30BE638A-719E-41CB-B435-44353E5553A3}"/>
               </a:ext>
               <a:ext uri="{C183D7F6-B498-43B3-948B-1728B52AA6E4}">
-                <adec:decorative xmlns:adec="http://schemas.microsoft.com/office/drawing/2017/decorative" xmlns="" val="1"/>
+                <adec:decorative xmlns:adec="http://schemas.microsoft.com/office/drawing/2017/decorative" val="1"/>
               </a:ext>
             </a:extLst>
           </p:cNvPr>
@@ -13864,7 +13864,7 @@
           <p:cNvPr id="28" name="Textplatzhalter 9">
             <a:extLst>
               <a:ext uri="{FF2B5EF4-FFF2-40B4-BE49-F238E27FC236}">
-                <a16:creationId xmlns:a16="http://schemas.microsoft.com/office/drawing/2014/main" xmlns="" id="{F2727769-9A35-4722-8FB2-4C78D296549D}"/>
+                <a16:creationId xmlns:a16="http://schemas.microsoft.com/office/drawing/2014/main" id="{F2727769-9A35-4722-8FB2-4C78D296549D}"/>
               </a:ext>
             </a:extLst>
           </p:cNvPr>
@@ -13945,7 +13945,7 @@
           <p:cNvPr id="16" name="Titel 2">
             <a:extLst>
               <a:ext uri="{FF2B5EF4-FFF2-40B4-BE49-F238E27FC236}">
-                <a16:creationId xmlns:a16="http://schemas.microsoft.com/office/drawing/2014/main" xmlns="" id="{FCF15244-A895-48BB-9A90-27BC5159A1A9}"/>
+                <a16:creationId xmlns:a16="http://schemas.microsoft.com/office/drawing/2014/main" id="{FCF15244-A895-48BB-9A90-27BC5159A1A9}"/>
               </a:ext>
             </a:extLst>
           </p:cNvPr>
@@ -13996,7 +13996,7 @@
           <p:cNvPr id="15" name="Subtitle 2">
             <a:extLst>
               <a:ext uri="{FF2B5EF4-FFF2-40B4-BE49-F238E27FC236}">
-                <a16:creationId xmlns:a16="http://schemas.microsoft.com/office/drawing/2014/main" xmlns="" id="{FF9C1028-5CF0-4B0B-90F2-2CDD6683E1F7}"/>
+                <a16:creationId xmlns:a16="http://schemas.microsoft.com/office/drawing/2014/main" id="{FF9C1028-5CF0-4B0B-90F2-2CDD6683E1F7}"/>
               </a:ext>
             </a:extLst>
           </p:cNvPr>
@@ -14079,7 +14079,7 @@
           <p:cNvPr id="7" name="Bildplatzhalter 6">
             <a:extLst>
               <a:ext uri="{C183D7F6-B498-43B3-948B-1728B52AA6E4}">
-                <adec:decorative xmlns:adec="http://schemas.microsoft.com/office/drawing/2017/decorative" xmlns="" val="1"/>
+                <adec:decorative xmlns:adec="http://schemas.microsoft.com/office/drawing/2017/decorative" val="1"/>
               </a:ext>
             </a:extLst>
           </p:cNvPr>
@@ -14152,7 +14152,7 @@
           <p:cNvPr id="2" name="Titel 1">
             <a:extLst>
               <a:ext uri="{FF2B5EF4-FFF2-40B4-BE49-F238E27FC236}">
-                <a16:creationId xmlns:a16="http://schemas.microsoft.com/office/drawing/2014/main" xmlns="" id="{0785E028-F200-4ED8-8CC6-0D42239F975D}"/>
+                <a16:creationId xmlns:a16="http://schemas.microsoft.com/office/drawing/2014/main" id="{0785E028-F200-4ED8-8CC6-0D42239F975D}"/>
               </a:ext>
             </a:extLst>
           </p:cNvPr>
@@ -14181,7 +14181,7 @@
           <p:cNvPr id="9" name="Textplatzhalter 7">
             <a:extLst>
               <a:ext uri="{FF2B5EF4-FFF2-40B4-BE49-F238E27FC236}">
-                <a16:creationId xmlns:a16="http://schemas.microsoft.com/office/drawing/2014/main" xmlns="" id="{18B4599F-1F24-4FF7-8F3E-EDB79B1AB99C}"/>
+                <a16:creationId xmlns:a16="http://schemas.microsoft.com/office/drawing/2014/main" id="{18B4599F-1F24-4FF7-8F3E-EDB79B1AB99C}"/>
               </a:ext>
             </a:extLst>
           </p:cNvPr>
@@ -14271,10 +14271,10 @@
           <p:cNvPr id="7" name="Datumsplatzhalter 6">
             <a:extLst>
               <a:ext uri="{FF2B5EF4-FFF2-40B4-BE49-F238E27FC236}">
-                <a16:creationId xmlns:a16="http://schemas.microsoft.com/office/drawing/2014/main" xmlns="" id="{124A6A03-5D2E-417E-9A62-737D1DBC92ED}"/>
+                <a16:creationId xmlns:a16="http://schemas.microsoft.com/office/drawing/2014/main" id="{124A6A03-5D2E-417E-9A62-737D1DBC92ED}"/>
               </a:ext>
               <a:ext uri="{C183D7F6-B498-43B3-948B-1728B52AA6E4}">
-                <adec:decorative xmlns:adec="http://schemas.microsoft.com/office/drawing/2017/decorative" xmlns="" val="1"/>
+                <adec:decorative xmlns:adec="http://schemas.microsoft.com/office/drawing/2017/decorative" val="1"/>
               </a:ext>
             </a:extLst>
           </p:cNvPr>
@@ -14303,10 +14303,10 @@
           <p:cNvPr id="8" name="Fußzeilenplatzhalter 7">
             <a:extLst>
               <a:ext uri="{FF2B5EF4-FFF2-40B4-BE49-F238E27FC236}">
-                <a16:creationId xmlns:a16="http://schemas.microsoft.com/office/drawing/2014/main" xmlns="" id="{90427F68-7D65-4111-9D28-F407D044A73B}"/>
+                <a16:creationId xmlns:a16="http://schemas.microsoft.com/office/drawing/2014/main" id="{90427F68-7D65-4111-9D28-F407D044A73B}"/>
               </a:ext>
               <a:ext uri="{C183D7F6-B498-43B3-948B-1728B52AA6E4}">
-                <adec:decorative xmlns:adec="http://schemas.microsoft.com/office/drawing/2017/decorative" xmlns="" val="1"/>
+                <adec:decorative xmlns:adec="http://schemas.microsoft.com/office/drawing/2017/decorative" val="1"/>
               </a:ext>
             </a:extLst>
           </p:cNvPr>
@@ -14335,10 +14335,10 @@
           <p:cNvPr id="10" name="Foliennummernplatzhalter 9">
             <a:extLst>
               <a:ext uri="{FF2B5EF4-FFF2-40B4-BE49-F238E27FC236}">
-                <a16:creationId xmlns:a16="http://schemas.microsoft.com/office/drawing/2014/main" xmlns="" id="{BC2B8577-8AB8-42B5-8BA8-1751A412246A}"/>
+                <a16:creationId xmlns:a16="http://schemas.microsoft.com/office/drawing/2014/main" id="{BC2B8577-8AB8-42B5-8BA8-1751A412246A}"/>
               </a:ext>
               <a:ext uri="{C183D7F6-B498-43B3-948B-1728B52AA6E4}">
-                <adec:decorative xmlns:adec="http://schemas.microsoft.com/office/drawing/2017/decorative" xmlns="" val="1"/>
+                <adec:decorative xmlns:adec="http://schemas.microsoft.com/office/drawing/2017/decorative" val="1"/>
               </a:ext>
             </a:extLst>
           </p:cNvPr>
@@ -14398,7 +14398,7 @@
           <p:cNvPr id="15" name="Titel 14">
             <a:extLst>
               <a:ext uri="{FF2B5EF4-FFF2-40B4-BE49-F238E27FC236}">
-                <a16:creationId xmlns:a16="http://schemas.microsoft.com/office/drawing/2014/main" xmlns="" id="{D0727A05-0C1A-4583-AE41-BB5812D3F68A}"/>
+                <a16:creationId xmlns:a16="http://schemas.microsoft.com/office/drawing/2014/main" id="{D0727A05-0C1A-4583-AE41-BB5812D3F68A}"/>
               </a:ext>
             </a:extLst>
           </p:cNvPr>
@@ -14427,7 +14427,7 @@
           <p:cNvPr id="16" name="Textplatzhalter 7">
             <a:extLst>
               <a:ext uri="{FF2B5EF4-FFF2-40B4-BE49-F238E27FC236}">
-                <a16:creationId xmlns:a16="http://schemas.microsoft.com/office/drawing/2014/main" xmlns="" id="{0DBE4A7F-2625-4844-8794-CF87BAE82F32}"/>
+                <a16:creationId xmlns:a16="http://schemas.microsoft.com/office/drawing/2014/main" id="{0DBE4A7F-2625-4844-8794-CF87BAE82F32}"/>
               </a:ext>
             </a:extLst>
           </p:cNvPr>
@@ -14522,10 +14522,10 @@
           <p:cNvPr id="2" name="Datumsplatzhalter 1">
             <a:extLst>
               <a:ext uri="{FF2B5EF4-FFF2-40B4-BE49-F238E27FC236}">
-                <a16:creationId xmlns:a16="http://schemas.microsoft.com/office/drawing/2014/main" xmlns="" id="{6DE35B32-06B2-48EF-A04A-BC3F5F4173B3}"/>
+                <a16:creationId xmlns:a16="http://schemas.microsoft.com/office/drawing/2014/main" id="{6DE35B32-06B2-48EF-A04A-BC3F5F4173B3}"/>
               </a:ext>
               <a:ext uri="{C183D7F6-B498-43B3-948B-1728B52AA6E4}">
-                <adec:decorative xmlns:adec="http://schemas.microsoft.com/office/drawing/2017/decorative" xmlns="" val="1"/>
+                <adec:decorative xmlns:adec="http://schemas.microsoft.com/office/drawing/2017/decorative" val="1"/>
               </a:ext>
             </a:extLst>
           </p:cNvPr>
@@ -14554,10 +14554,10 @@
           <p:cNvPr id="7" name="Fußzeilenplatzhalter 6">
             <a:extLst>
               <a:ext uri="{FF2B5EF4-FFF2-40B4-BE49-F238E27FC236}">
-                <a16:creationId xmlns:a16="http://schemas.microsoft.com/office/drawing/2014/main" xmlns="" id="{3A40F854-10E0-4E29-BF41-53A0539FC584}"/>
+                <a16:creationId xmlns:a16="http://schemas.microsoft.com/office/drawing/2014/main" id="{3A40F854-10E0-4E29-BF41-53A0539FC584}"/>
               </a:ext>
               <a:ext uri="{C183D7F6-B498-43B3-948B-1728B52AA6E4}">
-                <adec:decorative xmlns:adec="http://schemas.microsoft.com/office/drawing/2017/decorative" xmlns="" val="1"/>
+                <adec:decorative xmlns:adec="http://schemas.microsoft.com/office/drawing/2017/decorative" val="1"/>
               </a:ext>
             </a:extLst>
           </p:cNvPr>
@@ -14586,10 +14586,10 @@
           <p:cNvPr id="8" name="Foliennummernplatzhalter 7">
             <a:extLst>
               <a:ext uri="{FF2B5EF4-FFF2-40B4-BE49-F238E27FC236}">
-                <a16:creationId xmlns:a16="http://schemas.microsoft.com/office/drawing/2014/main" xmlns="" id="{575A3FC3-7E0C-4829-99EC-583BF5DA6743}"/>
+                <a16:creationId xmlns:a16="http://schemas.microsoft.com/office/drawing/2014/main" id="{575A3FC3-7E0C-4829-99EC-583BF5DA6743}"/>
               </a:ext>
               <a:ext uri="{C183D7F6-B498-43B3-948B-1728B52AA6E4}">
-                <adec:decorative xmlns:adec="http://schemas.microsoft.com/office/drawing/2017/decorative" xmlns="" val="1"/>
+                <adec:decorative xmlns:adec="http://schemas.microsoft.com/office/drawing/2017/decorative" val="1"/>
               </a:ext>
             </a:extLst>
           </p:cNvPr>
@@ -14663,10 +14663,10 @@
           <p:cNvPr id="9" name="Freihandform: Form 8">
             <a:extLst>
               <a:ext uri="{FF2B5EF4-FFF2-40B4-BE49-F238E27FC236}">
-                <a16:creationId xmlns:a16="http://schemas.microsoft.com/office/drawing/2014/main" xmlns="" id="{989E6229-E650-4C0F-8141-1787714FDDFC}"/>
+                <a16:creationId xmlns:a16="http://schemas.microsoft.com/office/drawing/2014/main" id="{989E6229-E650-4C0F-8141-1787714FDDFC}"/>
               </a:ext>
               <a:ext uri="{C183D7F6-B498-43B3-948B-1728B52AA6E4}">
-                <adec:decorative xmlns:adec="http://schemas.microsoft.com/office/drawing/2017/decorative" xmlns="" val="1"/>
+                <adec:decorative xmlns:adec="http://schemas.microsoft.com/office/drawing/2017/decorative" val="1"/>
               </a:ext>
             </a:extLst>
           </p:cNvPr>
@@ -15558,7 +15558,7 @@
           <p:cNvPr id="5" name="Footer Placeholder 4">
             <a:extLst>
               <a:ext uri="{C183D7F6-B498-43B3-948B-1728B52AA6E4}">
-                <adec:decorative xmlns:adec="http://schemas.microsoft.com/office/drawing/2017/decorative" xmlns="" val="1"/>
+                <adec:decorative xmlns:adec="http://schemas.microsoft.com/office/drawing/2017/decorative" val="1"/>
               </a:ext>
             </a:extLst>
           </p:cNvPr>
@@ -15604,7 +15604,7 @@
           <p:cNvPr id="4" name="Date Placeholder 3">
             <a:extLst>
               <a:ext uri="{C183D7F6-B498-43B3-948B-1728B52AA6E4}">
-                <adec:decorative xmlns:adec="http://schemas.microsoft.com/office/drawing/2017/decorative" xmlns="" val="1"/>
+                <adec:decorative xmlns:adec="http://schemas.microsoft.com/office/drawing/2017/decorative" val="1"/>
               </a:ext>
             </a:extLst>
           </p:cNvPr>
@@ -15647,7 +15647,7 @@
           <p:cNvPr id="6" name="Slide Number Placeholder 5">
             <a:extLst>
               <a:ext uri="{C183D7F6-B498-43B3-948B-1728B52AA6E4}">
-                <adec:decorative xmlns:adec="http://schemas.microsoft.com/office/drawing/2017/decorative" xmlns="" val="1"/>
+                <adec:decorative xmlns:adec="http://schemas.microsoft.com/office/drawing/2017/decorative" val="1"/>
               </a:ext>
             </a:extLst>
           </p:cNvPr>
@@ -16025,7 +16025,7 @@
   </p:txStyles>
   <p:extLst>
     <p:ext uri="{27BBF7A9-308A-43DC-89C8-2F10F3537804}">
-      <p15:sldGuideLst xmlns:p15="http://schemas.microsoft.com/office/powerpoint/2012/main" xmlns="">
+      <p15:sldGuideLst xmlns:p15="http://schemas.microsoft.com/office/powerpoint/2012/main">
         <p15:guide id="1" orient="horz" pos="599" userDrawn="1">
           <p15:clr>
             <a:srgbClr val="F26B43"/>
@@ -16074,7 +16074,7 @@
           <p:cNvPr id="3" name="Titel 2">
             <a:extLst>
               <a:ext uri="{FF2B5EF4-FFF2-40B4-BE49-F238E27FC236}">
-                <a16:creationId xmlns:a16="http://schemas.microsoft.com/office/drawing/2014/main" xmlns="" id="{04E3A5FD-848E-4A76-A505-F7BC035B0971}"/>
+                <a16:creationId xmlns:a16="http://schemas.microsoft.com/office/drawing/2014/main" id="{04E3A5FD-848E-4A76-A505-F7BC035B0971}"/>
               </a:ext>
             </a:extLst>
           </p:cNvPr>
@@ -16091,22 +16091,21 @@
           <a:lstStyle/>
           <a:p>
             <a:r>
-              <a:rPr lang="de-DE" dirty="0" err="1" smtClean="0"/>
+              <a:rPr lang="de-DE" dirty="0" err="1"/>
               <a:t>Blockchain</a:t>
             </a:r>
             <a:r>
-              <a:rPr lang="de-DE" dirty="0" smtClean="0"/>
+              <a:rPr lang="de-DE" dirty="0"/>
               <a:t> Proof </a:t>
             </a:r>
             <a:r>
-              <a:rPr lang="de-DE" dirty="0" err="1" smtClean="0"/>
+              <a:rPr lang="de-DE" dirty="0" err="1"/>
               <a:t>of</a:t>
             </a:r>
             <a:r>
-              <a:rPr lang="de-DE" dirty="0" smtClean="0"/>
+              <a:rPr lang="de-DE" dirty="0"/>
               <a:t> Presence</a:t>
             </a:r>
-            <a:endParaRPr lang="de-DE" dirty="0"/>
           </a:p>
         </p:txBody>
       </p:sp>
@@ -16115,7 +16114,7 @@
           <p:cNvPr id="4" name="Untertitel 3">
             <a:extLst>
               <a:ext uri="{FF2B5EF4-FFF2-40B4-BE49-F238E27FC236}">
-                <a16:creationId xmlns:a16="http://schemas.microsoft.com/office/drawing/2014/main" xmlns="" id="{A25910D3-E398-478B-896F-7E4967C59986}"/>
+                <a16:creationId xmlns:a16="http://schemas.microsoft.com/office/drawing/2014/main" id="{A25910D3-E398-478B-896F-7E4967C59986}"/>
               </a:ext>
             </a:extLst>
           </p:cNvPr>
@@ -16137,28 +16136,27 @@
           <a:lstStyle/>
           <a:p>
             <a:r>
-              <a:rPr lang="de-DE" b="1" dirty="0" smtClean="0"/>
+              <a:rPr lang="de-DE" b="1" dirty="0"/>
               <a:t>Dennis Salzmann</a:t>
             </a:r>
           </a:p>
           <a:p>
             <a:r>
-              <a:rPr lang="de-DE" b="1" dirty="0" smtClean="0"/>
+              <a:rPr lang="de-DE" b="1" dirty="0"/>
               <a:t>Mario Ruoff</a:t>
             </a:r>
           </a:p>
           <a:p>
             <a:r>
-              <a:rPr lang="de-DE" b="1" dirty="0" smtClean="0"/>
+              <a:rPr lang="de-DE" b="1" dirty="0"/>
               <a:t>Fernando Leon</a:t>
             </a:r>
           </a:p>
           <a:p>
             <a:r>
-              <a:rPr lang="de-DE" b="1" dirty="0" smtClean="0"/>
+              <a:rPr lang="de-DE" b="1" dirty="0"/>
               <a:t>Fabian Jakob</a:t>
             </a:r>
-            <a:endParaRPr lang="de-DE" b="1" dirty="0"/>
           </a:p>
         </p:txBody>
       </p:sp>
@@ -16215,13 +16213,6 @@
   <p:clrMapOvr>
     <a:masterClrMapping/>
   </p:clrMapOvr>
-  <p:timing>
-    <p:tnLst>
-      <p:par>
-        <p:cTn id="1" dur="indefinite" restart="never" nodeType="tmRoot"/>
-      </p:par>
-    </p:tnLst>
-  </p:timing>
 </p:sld>
 </file>
 
@@ -16247,7 +16238,7 @@
           <p:cNvPr id="6" name="Titel 5">
             <a:extLst>
               <a:ext uri="{FF2B5EF4-FFF2-40B4-BE49-F238E27FC236}">
-                <a16:creationId xmlns:a16="http://schemas.microsoft.com/office/drawing/2014/main" xmlns="" id="{6BF0AFA7-69A7-4369-8161-21610A905B1A}"/>
+                <a16:creationId xmlns:a16="http://schemas.microsoft.com/office/drawing/2014/main" id="{6BF0AFA7-69A7-4369-8161-21610A905B1A}"/>
               </a:ext>
             </a:extLst>
           </p:cNvPr>
@@ -16264,10 +16255,9 @@
           <a:lstStyle/>
           <a:p>
             <a:r>
-              <a:rPr lang="de-DE" sz="2400" dirty="0" smtClean="0"/>
+              <a:rPr lang="de-DE" sz="2400" dirty="0"/>
               <a:t>Outline</a:t>
             </a:r>
-            <a:endParaRPr lang="de-DE" sz="2400" dirty="0"/>
           </a:p>
         </p:txBody>
       </p:sp>
@@ -16276,7 +16266,7 @@
           <p:cNvPr id="7" name="Inhaltsplatzhalter 6">
             <a:extLst>
               <a:ext uri="{FF2B5EF4-FFF2-40B4-BE49-F238E27FC236}">
-                <a16:creationId xmlns:a16="http://schemas.microsoft.com/office/drawing/2014/main" xmlns="" id="{F08191B6-772D-4CD3-ADA6-ABE61BA1B6CF}"/>
+                <a16:creationId xmlns:a16="http://schemas.microsoft.com/office/drawing/2014/main" id="{F08191B6-772D-4CD3-ADA6-ABE61BA1B6CF}"/>
               </a:ext>
             </a:extLst>
           </p:cNvPr>
@@ -16297,15 +16287,15 @@
               <a:buAutoNum type="romanUcPeriod"/>
             </a:pPr>
             <a:r>
-              <a:rPr lang="de-DE" sz="2000" b="1" dirty="0" smtClean="0"/>
+              <a:rPr lang="de-DE" sz="2000" b="1" dirty="0"/>
               <a:t>Setup </a:t>
             </a:r>
             <a:r>
-              <a:rPr lang="de-DE" sz="2000" b="1" dirty="0" err="1" smtClean="0"/>
+              <a:rPr lang="de-DE" sz="2000" b="1" dirty="0" err="1"/>
               <a:t>and</a:t>
             </a:r>
             <a:r>
-              <a:rPr lang="de-DE" sz="2000" b="1" dirty="0" smtClean="0"/>
+              <a:rPr lang="de-DE" sz="2000" b="1" dirty="0"/>
               <a:t> Components</a:t>
             </a:r>
           </a:p>
@@ -16315,7 +16305,7 @@
               <a:buAutoNum type="romanUcPeriod"/>
             </a:pPr>
             <a:r>
-              <a:rPr lang="de-DE" sz="2000" dirty="0" smtClean="0"/>
+              <a:rPr lang="de-DE" sz="2000" dirty="0"/>
               <a:t>Demonstration</a:t>
             </a:r>
           </a:p>
@@ -16325,7 +16315,7 @@
               <a:buAutoNum type="romanUcPeriod"/>
             </a:pPr>
             <a:r>
-              <a:rPr lang="de-DE" sz="2000" dirty="0" err="1" smtClean="0"/>
+              <a:rPr lang="de-DE" sz="2000" dirty="0" err="1"/>
               <a:t>Discussion</a:t>
             </a:r>
             <a:endParaRPr lang="de-DE" sz="2000" dirty="0"/>
@@ -16337,7 +16327,7 @@
           <p:cNvPr id="2" name="Datumsplatzhalter 1">
             <a:extLst>
               <a:ext uri="{FF2B5EF4-FFF2-40B4-BE49-F238E27FC236}">
-                <a16:creationId xmlns:a16="http://schemas.microsoft.com/office/drawing/2014/main" xmlns="" id="{76CF9658-DA7D-455E-B6EC-A07D773F79B0}"/>
+                <a16:creationId xmlns:a16="http://schemas.microsoft.com/office/drawing/2014/main" id="{76CF9658-DA7D-455E-B6EC-A07D773F79B0}"/>
               </a:ext>
             </a:extLst>
           </p:cNvPr>
@@ -16366,7 +16356,7 @@
           <p:cNvPr id="3" name="Fußzeilenplatzhalter 2">
             <a:extLst>
               <a:ext uri="{FF2B5EF4-FFF2-40B4-BE49-F238E27FC236}">
-                <a16:creationId xmlns:a16="http://schemas.microsoft.com/office/drawing/2014/main" xmlns="" id="{60787A50-FFDC-4F08-A1E0-271FBBA86C8E}"/>
+                <a16:creationId xmlns:a16="http://schemas.microsoft.com/office/drawing/2014/main" id="{60787A50-FFDC-4F08-A1E0-271FBBA86C8E}"/>
               </a:ext>
             </a:extLst>
           </p:cNvPr>
@@ -16395,7 +16385,7 @@
           <p:cNvPr id="4" name="Foliennummernplatzhalter 3">
             <a:extLst>
               <a:ext uri="{FF2B5EF4-FFF2-40B4-BE49-F238E27FC236}">
-                <a16:creationId xmlns:a16="http://schemas.microsoft.com/office/drawing/2014/main" xmlns="" id="{C074940A-1407-4EB3-8D77-C5636D3C75A8}"/>
+                <a16:creationId xmlns:a16="http://schemas.microsoft.com/office/drawing/2014/main" id="{C074940A-1407-4EB3-8D77-C5636D3C75A8}"/>
               </a:ext>
             </a:extLst>
           </p:cNvPr>
@@ -16430,13 +16420,6 @@
   <p:clrMapOvr>
     <a:masterClrMapping/>
   </p:clrMapOvr>
-  <p:timing>
-    <p:tnLst>
-      <p:par>
-        <p:cTn id="1" dur="indefinite" restart="never" nodeType="tmRoot"/>
-      </p:par>
-    </p:tnLst>
-  </p:timing>
 </p:sld>
 </file>
 
@@ -16480,7 +16463,7 @@
         </p:blipFill>
         <p:spPr>
           <a:xfrm>
-            <a:off x="422910" y="1973580"/>
+            <a:off x="4638052" y="1973580"/>
             <a:ext cx="1333500" cy="1333500"/>
           </a:xfrm>
         </p:spPr>
@@ -16490,7 +16473,7 @@
           <p:cNvPr id="35" name="Textplatzhalter 34">
             <a:extLst>
               <a:ext uri="{FF2B5EF4-FFF2-40B4-BE49-F238E27FC236}">
-                <a16:creationId xmlns:a16="http://schemas.microsoft.com/office/drawing/2014/main" xmlns="" id="{1464EF3D-1034-4CC4-82A7-7999F030BE6A}"/>
+                <a16:creationId xmlns:a16="http://schemas.microsoft.com/office/drawing/2014/main" id="{1464EF3D-1034-4CC4-82A7-7999F030BE6A}"/>
               </a:ext>
             </a:extLst>
           </p:cNvPr>
@@ -16503,7 +16486,7 @@
         </p:nvSpPr>
         <p:spPr>
           <a:xfrm>
-            <a:off x="2174400" y="2093040"/>
+            <a:off x="1995983" y="2093040"/>
             <a:ext cx="2153760" cy="194400"/>
           </a:xfrm>
         </p:spPr>
@@ -16512,10 +16495,9 @@
           <a:lstStyle/>
           <a:p>
             <a:r>
-              <a:rPr lang="de-DE" dirty="0" smtClean="0"/>
+              <a:rPr lang="de-DE" dirty="0"/>
               <a:t>Dennis Salzmann</a:t>
             </a:r>
-            <a:endParaRPr lang="de-DE" dirty="0"/>
           </a:p>
         </p:txBody>
       </p:sp>
@@ -16524,7 +16506,7 @@
           <p:cNvPr id="27" name="Textplatzhalter 26">
             <a:extLst>
               <a:ext uri="{FF2B5EF4-FFF2-40B4-BE49-F238E27FC236}">
-                <a16:creationId xmlns:a16="http://schemas.microsoft.com/office/drawing/2014/main" xmlns="" id="{2616FDAF-68EE-44D0-8491-AFCD8786CB5D}"/>
+                <a16:creationId xmlns:a16="http://schemas.microsoft.com/office/drawing/2014/main" id="{2616FDAF-68EE-44D0-8491-AFCD8786CB5D}"/>
               </a:ext>
             </a:extLst>
           </p:cNvPr>
@@ -16537,7 +16519,7 @@
         </p:nvSpPr>
         <p:spPr>
           <a:xfrm>
-            <a:off x="2174400" y="2731770"/>
+            <a:off x="1995983" y="2731770"/>
             <a:ext cx="542646" cy="216482"/>
           </a:xfrm>
         </p:spPr>
@@ -16558,7 +16540,7 @@
           <p:cNvPr id="40" name="Textplatzhalter 39">
             <a:extLst>
               <a:ext uri="{FF2B5EF4-FFF2-40B4-BE49-F238E27FC236}">
-                <a16:creationId xmlns:a16="http://schemas.microsoft.com/office/drawing/2014/main" xmlns="" id="{E401F403-868B-4976-90D2-F9F421810FAE}"/>
+                <a16:creationId xmlns:a16="http://schemas.microsoft.com/office/drawing/2014/main" id="{E401F403-868B-4976-90D2-F9F421810FAE}"/>
               </a:ext>
             </a:extLst>
           </p:cNvPr>
@@ -16571,7 +16553,7 @@
         </p:nvSpPr>
         <p:spPr>
           <a:xfrm>
-            <a:off x="2717046" y="2731770"/>
+            <a:off x="2538629" y="2731770"/>
             <a:ext cx="1816853" cy="216000"/>
           </a:xfrm>
         </p:spPr>
@@ -16580,10 +16562,9 @@
           <a:lstStyle/>
           <a:p>
             <a:r>
-              <a:rPr lang="de-DE" dirty="0" smtClean="0"/>
+              <a:rPr lang="de-DE" dirty="0"/>
               <a:t>den.salzmann@gmail.com</a:t>
             </a:r>
-            <a:endParaRPr lang="de-DE" dirty="0"/>
           </a:p>
         </p:txBody>
       </p:sp>
@@ -16592,7 +16573,7 @@
           <p:cNvPr id="28" name="Textplatzhalter 27">
             <a:extLst>
               <a:ext uri="{FF2B5EF4-FFF2-40B4-BE49-F238E27FC236}">
-                <a16:creationId xmlns:a16="http://schemas.microsoft.com/office/drawing/2014/main" xmlns="" id="{C84D60E2-1F4C-4A96-898B-55A78DD86501}"/>
+                <a16:creationId xmlns:a16="http://schemas.microsoft.com/office/drawing/2014/main" id="{C84D60E2-1F4C-4A96-898B-55A78DD86501}"/>
               </a:ext>
             </a:extLst>
           </p:cNvPr>
@@ -16605,7 +16586,7 @@
         </p:nvSpPr>
         <p:spPr>
           <a:xfrm>
-            <a:off x="2174400" y="2475458"/>
+            <a:off x="1995983" y="2475458"/>
             <a:ext cx="2268060" cy="245786"/>
           </a:xfrm>
         </p:spPr>
@@ -16614,15 +16595,15 @@
           <a:lstStyle/>
           <a:p>
             <a:r>
-              <a:rPr lang="de-DE" dirty="0" err="1" smtClean="0"/>
+              <a:rPr lang="de-DE" dirty="0" err="1"/>
               <a:t>M.Sc</a:t>
             </a:r>
             <a:r>
-              <a:rPr lang="de-DE" dirty="0" smtClean="0"/>
+              <a:rPr lang="de-DE" dirty="0"/>
               <a:t>. Engineering </a:t>
             </a:r>
             <a:r>
-              <a:rPr lang="de-DE" dirty="0" err="1" smtClean="0"/>
+              <a:rPr lang="de-DE" dirty="0" err="1"/>
               <a:t>Cybernetics</a:t>
             </a:r>
             <a:r>
@@ -16644,7 +16625,7 @@
         </p:nvSpPr>
         <p:spPr>
           <a:xfrm>
-            <a:off x="2174400" y="3111994"/>
+            <a:off x="1995983" y="3111994"/>
             <a:ext cx="2500012" cy="218691"/>
           </a:xfrm>
         </p:spPr>
@@ -16653,18 +16634,17 @@
           <a:lstStyle/>
           <a:p>
             <a:r>
-              <a:rPr lang="de-DE" dirty="0" smtClean="0"/>
+              <a:rPr lang="de-DE" dirty="0"/>
               <a:t>University </a:t>
             </a:r>
             <a:r>
-              <a:rPr lang="de-DE" dirty="0" err="1" smtClean="0"/>
+              <a:rPr lang="de-DE" dirty="0" err="1"/>
               <a:t>of</a:t>
             </a:r>
             <a:r>
-              <a:rPr lang="de-DE" dirty="0" smtClean="0"/>
+              <a:rPr lang="de-DE" dirty="0"/>
               <a:t> Stuttgart</a:t>
             </a:r>
-            <a:endParaRPr lang="de-DE" dirty="0"/>
           </a:p>
         </p:txBody>
       </p:sp>
@@ -16673,7 +16653,7 @@
           <p:cNvPr id="8" name="Textplatzhalter 34">
             <a:extLst>
               <a:ext uri="{FF2B5EF4-FFF2-40B4-BE49-F238E27FC236}">
-                <a16:creationId xmlns:a16="http://schemas.microsoft.com/office/drawing/2014/main" xmlns="" id="{1464EF3D-1034-4CC4-82A7-7999F030BE6A}"/>
+                <a16:creationId xmlns:a16="http://schemas.microsoft.com/office/drawing/2014/main" id="{1464EF3D-1034-4CC4-82A7-7999F030BE6A}"/>
               </a:ext>
             </a:extLst>
           </p:cNvPr>
@@ -16686,7 +16666,7 @@
         </p:nvSpPr>
         <p:spPr>
           <a:xfrm>
-            <a:off x="5085240" y="2054940"/>
+            <a:off x="6170623" y="2054940"/>
             <a:ext cx="2153760" cy="194400"/>
           </a:xfrm>
         </p:spPr>
@@ -16695,10 +16675,9 @@
           <a:lstStyle/>
           <a:p>
             <a:r>
-              <a:rPr lang="de-DE" dirty="0" smtClean="0"/>
+              <a:rPr lang="de-DE" dirty="0"/>
               <a:t>Fabian Jakob</a:t>
             </a:r>
-            <a:endParaRPr lang="de-DE" dirty="0"/>
           </a:p>
         </p:txBody>
       </p:sp>
@@ -16707,7 +16686,7 @@
           <p:cNvPr id="9" name="Textplatzhalter 26">
             <a:extLst>
               <a:ext uri="{FF2B5EF4-FFF2-40B4-BE49-F238E27FC236}">
-                <a16:creationId xmlns:a16="http://schemas.microsoft.com/office/drawing/2014/main" xmlns="" id="{2616FDAF-68EE-44D0-8491-AFCD8786CB5D}"/>
+                <a16:creationId xmlns:a16="http://schemas.microsoft.com/office/drawing/2014/main" id="{2616FDAF-68EE-44D0-8491-AFCD8786CB5D}"/>
               </a:ext>
             </a:extLst>
           </p:cNvPr>
@@ -16720,7 +16699,7 @@
         </p:nvSpPr>
         <p:spPr>
           <a:xfrm>
-            <a:off x="5085240" y="2724150"/>
+            <a:off x="6170623" y="2724150"/>
             <a:ext cx="542646" cy="216482"/>
           </a:xfrm>
         </p:spPr>
@@ -16741,7 +16720,7 @@
           <p:cNvPr id="10" name="Textplatzhalter 39">
             <a:extLst>
               <a:ext uri="{FF2B5EF4-FFF2-40B4-BE49-F238E27FC236}">
-                <a16:creationId xmlns:a16="http://schemas.microsoft.com/office/drawing/2014/main" xmlns="" id="{E401F403-868B-4976-90D2-F9F421810FAE}"/>
+                <a16:creationId xmlns:a16="http://schemas.microsoft.com/office/drawing/2014/main" id="{E401F403-868B-4976-90D2-F9F421810FAE}"/>
               </a:ext>
             </a:extLst>
           </p:cNvPr>
@@ -16754,7 +16733,7 @@
         </p:nvSpPr>
         <p:spPr>
           <a:xfrm>
-            <a:off x="5627887" y="2724150"/>
+            <a:off x="6713270" y="2724150"/>
             <a:ext cx="1717794" cy="216000"/>
           </a:xfrm>
         </p:spPr>
@@ -16763,10 +16742,9 @@
           <a:lstStyle/>
           <a:p>
             <a:r>
-              <a:rPr lang="de-DE" dirty="0" smtClean="0"/>
+              <a:rPr lang="de-DE" dirty="0"/>
               <a:t>fjakob@rj-cad-design.de</a:t>
             </a:r>
-            <a:endParaRPr lang="de-DE" dirty="0"/>
           </a:p>
         </p:txBody>
       </p:sp>
@@ -16775,7 +16753,7 @@
           <p:cNvPr id="11" name="Textplatzhalter 27">
             <a:extLst>
               <a:ext uri="{FF2B5EF4-FFF2-40B4-BE49-F238E27FC236}">
-                <a16:creationId xmlns:a16="http://schemas.microsoft.com/office/drawing/2014/main" xmlns="" id="{C84D60E2-1F4C-4A96-898B-55A78DD86501}"/>
+                <a16:creationId xmlns:a16="http://schemas.microsoft.com/office/drawing/2014/main" id="{C84D60E2-1F4C-4A96-898B-55A78DD86501}"/>
               </a:ext>
             </a:extLst>
           </p:cNvPr>
@@ -16788,7 +16766,7 @@
         </p:nvSpPr>
         <p:spPr>
           <a:xfrm>
-            <a:off x="5070000" y="2483078"/>
+            <a:off x="6155383" y="2483078"/>
             <a:ext cx="2191860" cy="245786"/>
           </a:xfrm>
         </p:spPr>
@@ -16797,15 +16775,15 @@
           <a:lstStyle/>
           <a:p>
             <a:r>
-              <a:rPr lang="de-DE" dirty="0" err="1" smtClean="0"/>
+              <a:rPr lang="de-DE" dirty="0" err="1"/>
               <a:t>M.Sc</a:t>
             </a:r>
             <a:r>
-              <a:rPr lang="de-DE" dirty="0" smtClean="0"/>
+              <a:rPr lang="de-DE" dirty="0"/>
               <a:t>. Engineering </a:t>
             </a:r>
             <a:r>
-              <a:rPr lang="de-DE" dirty="0" err="1" smtClean="0"/>
+              <a:rPr lang="de-DE" dirty="0" err="1"/>
               <a:t>Cybernetics</a:t>
             </a:r>
             <a:endParaRPr lang="de-DE" dirty="0"/>
@@ -16824,7 +16802,7 @@
         </p:nvSpPr>
         <p:spPr>
           <a:xfrm>
-            <a:off x="5085240" y="3073894"/>
+            <a:off x="6170623" y="3073894"/>
             <a:ext cx="2500012" cy="218691"/>
           </a:xfrm>
         </p:spPr>
@@ -16833,18 +16811,17 @@
           <a:lstStyle/>
           <a:p>
             <a:r>
-              <a:rPr lang="de-DE" dirty="0" smtClean="0"/>
+              <a:rPr lang="de-DE" dirty="0"/>
               <a:t>University </a:t>
             </a:r>
             <a:r>
-              <a:rPr lang="de-DE" dirty="0" err="1" smtClean="0"/>
+              <a:rPr lang="de-DE" dirty="0" err="1"/>
               <a:t>of</a:t>
             </a:r>
             <a:r>
-              <a:rPr lang="de-DE" dirty="0" smtClean="0"/>
+              <a:rPr lang="de-DE" dirty="0"/>
               <a:t> Stuttgart</a:t>
             </a:r>
-            <a:endParaRPr lang="de-DE" dirty="0"/>
           </a:p>
         </p:txBody>
       </p:sp>
@@ -16853,7 +16830,7 @@
           <p:cNvPr id="13" name="Textplatzhalter 34">
             <a:extLst>
               <a:ext uri="{FF2B5EF4-FFF2-40B4-BE49-F238E27FC236}">
-                <a16:creationId xmlns:a16="http://schemas.microsoft.com/office/drawing/2014/main" xmlns="" id="{1464EF3D-1034-4CC4-82A7-7999F030BE6A}"/>
+                <a16:creationId xmlns:a16="http://schemas.microsoft.com/office/drawing/2014/main" id="{1464EF3D-1034-4CC4-82A7-7999F030BE6A}"/>
               </a:ext>
             </a:extLst>
           </p:cNvPr>
@@ -16866,7 +16843,7 @@
         </p:nvSpPr>
         <p:spPr>
           <a:xfrm>
-            <a:off x="2143920" y="3639900"/>
+            <a:off x="1965503" y="3639900"/>
             <a:ext cx="2153760" cy="194400"/>
           </a:xfrm>
         </p:spPr>
@@ -16875,10 +16852,9 @@
           <a:lstStyle/>
           <a:p>
             <a:r>
-              <a:rPr lang="de-DE" dirty="0" smtClean="0"/>
+              <a:rPr lang="de-DE" dirty="0"/>
               <a:t>Mario Ruoff</a:t>
             </a:r>
-            <a:endParaRPr lang="de-DE" dirty="0"/>
           </a:p>
         </p:txBody>
       </p:sp>
@@ -16887,7 +16863,7 @@
           <p:cNvPr id="14" name="Textplatzhalter 26">
             <a:extLst>
               <a:ext uri="{FF2B5EF4-FFF2-40B4-BE49-F238E27FC236}">
-                <a16:creationId xmlns:a16="http://schemas.microsoft.com/office/drawing/2014/main" xmlns="" id="{2616FDAF-68EE-44D0-8491-AFCD8786CB5D}"/>
+                <a16:creationId xmlns:a16="http://schemas.microsoft.com/office/drawing/2014/main" id="{2616FDAF-68EE-44D0-8491-AFCD8786CB5D}"/>
               </a:ext>
             </a:extLst>
           </p:cNvPr>
@@ -16900,7 +16876,7 @@
         </p:nvSpPr>
         <p:spPr>
           <a:xfrm>
-            <a:off x="2143920" y="4271010"/>
+            <a:off x="1965503" y="4271010"/>
             <a:ext cx="542646" cy="216482"/>
           </a:xfrm>
         </p:spPr>
@@ -16921,7 +16897,7 @@
           <p:cNvPr id="15" name="Textplatzhalter 39">
             <a:extLst>
               <a:ext uri="{FF2B5EF4-FFF2-40B4-BE49-F238E27FC236}">
-                <a16:creationId xmlns:a16="http://schemas.microsoft.com/office/drawing/2014/main" xmlns="" id="{E401F403-868B-4976-90D2-F9F421810FAE}"/>
+                <a16:creationId xmlns:a16="http://schemas.microsoft.com/office/drawing/2014/main" id="{E401F403-868B-4976-90D2-F9F421810FAE}"/>
               </a:ext>
             </a:extLst>
           </p:cNvPr>
@@ -16934,7 +16910,7 @@
         </p:nvSpPr>
         <p:spPr>
           <a:xfrm>
-            <a:off x="2686567" y="4271010"/>
+            <a:off x="2508150" y="4271010"/>
             <a:ext cx="1717794" cy="216000"/>
           </a:xfrm>
         </p:spPr>
@@ -16942,7 +16918,10 @@
           <a:bodyPr/>
           <a:lstStyle/>
           <a:p>
-            <a:endParaRPr lang="de-DE" dirty="0"/>
+            <a:r>
+              <a:rPr lang="de-DE" dirty="0"/>
+              <a:t>mario.srx99@gmail.com</a:t>
+            </a:r>
           </a:p>
         </p:txBody>
       </p:sp>
@@ -16951,7 +16930,7 @@
           <p:cNvPr id="16" name="Textplatzhalter 27">
             <a:extLst>
               <a:ext uri="{FF2B5EF4-FFF2-40B4-BE49-F238E27FC236}">
-                <a16:creationId xmlns:a16="http://schemas.microsoft.com/office/drawing/2014/main" xmlns="" id="{C84D60E2-1F4C-4A96-898B-55A78DD86501}"/>
+                <a16:creationId xmlns:a16="http://schemas.microsoft.com/office/drawing/2014/main" id="{C84D60E2-1F4C-4A96-898B-55A78DD86501}"/>
               </a:ext>
             </a:extLst>
           </p:cNvPr>
@@ -16964,7 +16943,7 @@
         </p:nvSpPr>
         <p:spPr>
           <a:xfrm>
-            <a:off x="2128680" y="4022318"/>
+            <a:off x="1950263" y="4022318"/>
             <a:ext cx="2275680" cy="245786"/>
           </a:xfrm>
         </p:spPr>
@@ -16973,24 +16952,20 @@
           <a:lstStyle/>
           <a:p>
             <a:r>
-              <a:rPr lang="de-DE" dirty="0" err="1" smtClean="0"/>
+              <a:rPr lang="de-DE" dirty="0" err="1"/>
               <a:t>M.Sc</a:t>
             </a:r>
             <a:r>
-              <a:rPr lang="de-DE" dirty="0" smtClean="0"/>
+              <a:rPr lang="de-DE" dirty="0"/>
               <a:t>. </a:t>
             </a:r>
             <a:r>
-              <a:rPr lang="de-DE" dirty="0" err="1" smtClean="0"/>
+              <a:rPr lang="de-DE" dirty="0" err="1"/>
               <a:t>Autonomous</a:t>
             </a:r>
             <a:r>
-              <a:rPr lang="de-DE" dirty="0" smtClean="0"/>
-              <a:t> Systems</a:t>
-            </a:r>
-            <a:r>
-              <a:rPr lang="de-DE" dirty="0"/>
-              <a:t>	</a:t>
+              <a:rPr lang="de-DE" dirty="0"/>
+              <a:t> Systems	</a:t>
             </a:r>
           </a:p>
         </p:txBody>
@@ -17007,7 +16982,7 @@
         </p:nvSpPr>
         <p:spPr>
           <a:xfrm>
-            <a:off x="2143920" y="4658854"/>
+            <a:off x="1965503" y="4658854"/>
             <a:ext cx="2500012" cy="218691"/>
           </a:xfrm>
         </p:spPr>
@@ -17016,18 +16991,17 @@
           <a:lstStyle/>
           <a:p>
             <a:r>
-              <a:rPr lang="de-DE" dirty="0" smtClean="0"/>
+              <a:rPr lang="de-DE" dirty="0"/>
               <a:t>University </a:t>
             </a:r>
             <a:r>
-              <a:rPr lang="de-DE" dirty="0" err="1" smtClean="0"/>
+              <a:rPr lang="de-DE" dirty="0" err="1"/>
               <a:t>of</a:t>
             </a:r>
             <a:r>
-              <a:rPr lang="de-DE" dirty="0" smtClean="0"/>
+              <a:rPr lang="de-DE" dirty="0"/>
               <a:t> Stuttgart</a:t>
             </a:r>
-            <a:endParaRPr lang="de-DE" dirty="0"/>
           </a:p>
         </p:txBody>
       </p:sp>
@@ -17036,7 +17010,7 @@
           <p:cNvPr id="18" name="Textplatzhalter 34">
             <a:extLst>
               <a:ext uri="{FF2B5EF4-FFF2-40B4-BE49-F238E27FC236}">
-                <a16:creationId xmlns:a16="http://schemas.microsoft.com/office/drawing/2014/main" xmlns="" id="{1464EF3D-1034-4CC4-82A7-7999F030BE6A}"/>
+                <a16:creationId xmlns:a16="http://schemas.microsoft.com/office/drawing/2014/main" id="{1464EF3D-1034-4CC4-82A7-7999F030BE6A}"/>
               </a:ext>
             </a:extLst>
           </p:cNvPr>
@@ -17049,7 +17023,7 @@
         </p:nvSpPr>
         <p:spPr>
           <a:xfrm>
-            <a:off x="5031900" y="3655140"/>
+            <a:off x="6117283" y="3655140"/>
             <a:ext cx="2153760" cy="194400"/>
           </a:xfrm>
         </p:spPr>
@@ -17058,10 +17032,9 @@
           <a:lstStyle/>
           <a:p>
             <a:r>
-              <a:rPr lang="de-DE" dirty="0" smtClean="0"/>
+              <a:rPr lang="de-DE" dirty="0"/>
               <a:t>Fernando Leon</a:t>
             </a:r>
-            <a:endParaRPr lang="de-DE" dirty="0"/>
           </a:p>
         </p:txBody>
       </p:sp>
@@ -17070,7 +17043,7 @@
           <p:cNvPr id="19" name="Textplatzhalter 26">
             <a:extLst>
               <a:ext uri="{FF2B5EF4-FFF2-40B4-BE49-F238E27FC236}">
-                <a16:creationId xmlns:a16="http://schemas.microsoft.com/office/drawing/2014/main" xmlns="" id="{2616FDAF-68EE-44D0-8491-AFCD8786CB5D}"/>
+                <a16:creationId xmlns:a16="http://schemas.microsoft.com/office/drawing/2014/main" id="{2616FDAF-68EE-44D0-8491-AFCD8786CB5D}"/>
               </a:ext>
             </a:extLst>
           </p:cNvPr>
@@ -17083,7 +17056,7 @@
         </p:nvSpPr>
         <p:spPr>
           <a:xfrm>
-            <a:off x="5031900" y="4293870"/>
+            <a:off x="6117283" y="4293870"/>
             <a:ext cx="542646" cy="216482"/>
           </a:xfrm>
         </p:spPr>
@@ -17104,7 +17077,7 @@
           <p:cNvPr id="20" name="Textplatzhalter 39">
             <a:extLst>
               <a:ext uri="{FF2B5EF4-FFF2-40B4-BE49-F238E27FC236}">
-                <a16:creationId xmlns:a16="http://schemas.microsoft.com/office/drawing/2014/main" xmlns="" id="{E401F403-868B-4976-90D2-F9F421810FAE}"/>
+                <a16:creationId xmlns:a16="http://schemas.microsoft.com/office/drawing/2014/main" id="{E401F403-868B-4976-90D2-F9F421810FAE}"/>
               </a:ext>
             </a:extLst>
           </p:cNvPr>
@@ -17117,15 +17090,18 @@
         </p:nvSpPr>
         <p:spPr>
           <a:xfrm>
-            <a:off x="5574547" y="4293870"/>
-            <a:ext cx="1717794" cy="216000"/>
+            <a:off x="6659929" y="4293870"/>
+            <a:ext cx="2345333" cy="245786"/>
           </a:xfrm>
         </p:spPr>
         <p:txBody>
           <a:bodyPr/>
           <a:lstStyle/>
           <a:p>
-            <a:endParaRPr lang="de-DE" dirty="0"/>
+            <a:r>
+              <a:rPr lang="de-DE" dirty="0"/>
+              <a:t>f.leon.marquez.st@outlook.com</a:t>
+            </a:r>
           </a:p>
         </p:txBody>
       </p:sp>
@@ -17134,7 +17110,7 @@
           <p:cNvPr id="21" name="Textplatzhalter 27">
             <a:extLst>
               <a:ext uri="{FF2B5EF4-FFF2-40B4-BE49-F238E27FC236}">
-                <a16:creationId xmlns:a16="http://schemas.microsoft.com/office/drawing/2014/main" xmlns="" id="{C84D60E2-1F4C-4A96-898B-55A78DD86501}"/>
+                <a16:creationId xmlns:a16="http://schemas.microsoft.com/office/drawing/2014/main" id="{C84D60E2-1F4C-4A96-898B-55A78DD86501}"/>
               </a:ext>
             </a:extLst>
           </p:cNvPr>
@@ -17147,7 +17123,7 @@
         </p:nvSpPr>
         <p:spPr>
           <a:xfrm>
-            <a:off x="5031900" y="4045178"/>
+            <a:off x="6117283" y="4045178"/>
             <a:ext cx="1745931" cy="245786"/>
           </a:xfrm>
         </p:spPr>
@@ -17156,15 +17132,15 @@
           <a:lstStyle/>
           <a:p>
             <a:r>
-              <a:rPr lang="de-DE" dirty="0" err="1" smtClean="0"/>
+              <a:rPr lang="de-DE" dirty="0" err="1"/>
               <a:t>M.Sc</a:t>
             </a:r>
             <a:r>
-              <a:rPr lang="de-DE" dirty="0" smtClean="0"/>
+              <a:rPr lang="de-DE" dirty="0"/>
               <a:t>. </a:t>
             </a:r>
             <a:r>
-              <a:rPr lang="de-DE" dirty="0" err="1" smtClean="0"/>
+              <a:rPr lang="de-DE" dirty="0" err="1"/>
               <a:t>Mechatronics</a:t>
             </a:r>
             <a:r>
@@ -17186,7 +17162,7 @@
         </p:nvSpPr>
         <p:spPr>
           <a:xfrm>
-            <a:off x="5031900" y="4674094"/>
+            <a:off x="6117283" y="4674094"/>
             <a:ext cx="2500012" cy="218691"/>
           </a:xfrm>
         </p:spPr>
@@ -17195,21 +17171,122 @@
           <a:lstStyle/>
           <a:p>
             <a:r>
-              <a:rPr lang="de-DE" dirty="0" smtClean="0"/>
+              <a:rPr lang="de-DE" dirty="0"/>
               <a:t>University </a:t>
             </a:r>
             <a:r>
-              <a:rPr lang="de-DE" dirty="0" err="1" smtClean="0"/>
+              <a:rPr lang="de-DE" dirty="0" err="1"/>
               <a:t>of</a:t>
             </a:r>
             <a:r>
-              <a:rPr lang="de-DE" dirty="0" smtClean="0"/>
+              <a:rPr lang="de-DE" dirty="0"/>
               <a:t> Stuttgart</a:t>
             </a:r>
-            <a:endParaRPr lang="de-DE" dirty="0"/>
-          </a:p>
-        </p:txBody>
-      </p:sp>
+          </a:p>
+        </p:txBody>
+      </p:sp>
+      <p:pic>
+        <p:nvPicPr>
+          <p:cNvPr id="23" name="Bildplatzhalter 3">
+            <a:extLst>
+              <a:ext uri="{FF2B5EF4-FFF2-40B4-BE49-F238E27FC236}">
+                <a16:creationId xmlns:a16="http://schemas.microsoft.com/office/drawing/2014/main" id="{074FCB07-C78F-1BB1-0A3F-184775FD8E2B}"/>
+              </a:ext>
+            </a:extLst>
+          </p:cNvPr>
+          <p:cNvPicPr>
+            <a:picLocks noChangeAspect="1"/>
+          </p:cNvPicPr>
+          <p:nvPr/>
+        </p:nvPicPr>
+        <p:blipFill>
+          <a:blip r:embed="rId3"/>
+          <a:srcRect l="2836" r="2836"/>
+          <a:stretch/>
+        </p:blipFill>
+        <p:spPr>
+          <a:xfrm>
+            <a:off x="4634338" y="3649975"/>
+            <a:ext cx="1333500" cy="1333500"/>
+          </a:xfrm>
+          <a:prstGeom prst="ellipse">
+            <a:avLst/>
+          </a:prstGeom>
+          <a:solidFill>
+            <a:schemeClr val="bg1">
+              <a:lumMod val="95000"/>
+            </a:schemeClr>
+          </a:solidFill>
+        </p:spPr>
+      </p:pic>
+      <p:pic>
+        <p:nvPicPr>
+          <p:cNvPr id="24" name="Bildplatzhalter 3">
+            <a:extLst>
+              <a:ext uri="{FF2B5EF4-FFF2-40B4-BE49-F238E27FC236}">
+                <a16:creationId xmlns:a16="http://schemas.microsoft.com/office/drawing/2014/main" id="{097DF697-7A0B-B5D0-2AB3-DA1EF6A231B0}"/>
+              </a:ext>
+            </a:extLst>
+          </p:cNvPr>
+          <p:cNvPicPr>
+            <a:picLocks noChangeAspect="1"/>
+          </p:cNvPicPr>
+          <p:nvPr/>
+        </p:nvPicPr>
+        <p:blipFill>
+          <a:blip r:embed="rId4"/>
+          <a:srcRect t="6460" b="6460"/>
+          <a:stretch/>
+        </p:blipFill>
+        <p:spPr>
+          <a:xfrm>
+            <a:off x="463805" y="1977300"/>
+            <a:ext cx="1333500" cy="1333500"/>
+          </a:xfrm>
+          <a:prstGeom prst="ellipse">
+            <a:avLst/>
+          </a:prstGeom>
+          <a:solidFill>
+            <a:schemeClr val="bg1">
+              <a:lumMod val="95000"/>
+            </a:schemeClr>
+          </a:solidFill>
+        </p:spPr>
+      </p:pic>
+      <p:pic>
+        <p:nvPicPr>
+          <p:cNvPr id="25" name="Bildplatzhalter 3">
+            <a:extLst>
+              <a:ext uri="{FF2B5EF4-FFF2-40B4-BE49-F238E27FC236}">
+                <a16:creationId xmlns:a16="http://schemas.microsoft.com/office/drawing/2014/main" id="{5659DA9D-B7AD-5A57-3B46-63546203F453}"/>
+              </a:ext>
+            </a:extLst>
+          </p:cNvPr>
+          <p:cNvPicPr>
+            <a:picLocks noChangeAspect="1"/>
+          </p:cNvPicPr>
+          <p:nvPr/>
+        </p:nvPicPr>
+        <p:blipFill>
+          <a:blip r:embed="rId5"/>
+          <a:srcRect/>
+          <a:stretch/>
+        </p:blipFill>
+        <p:spPr>
+          <a:xfrm>
+            <a:off x="467525" y="3638825"/>
+            <a:ext cx="1333500" cy="1333500"/>
+          </a:xfrm>
+          <a:prstGeom prst="ellipse">
+            <a:avLst/>
+          </a:prstGeom>
+          <a:solidFill>
+            <a:schemeClr val="bg1">
+              <a:lumMod val="95000"/>
+            </a:schemeClr>
+          </a:solidFill>
+        </p:spPr>
+      </p:pic>
     </p:spTree>
     <p:extLst>
       <p:ext uri="{BB962C8B-B14F-4D97-AF65-F5344CB8AC3E}">
@@ -17220,13 +17297,6 @@
   <p:clrMapOvr>
     <a:masterClrMapping/>
   </p:clrMapOvr>
-  <p:timing>
-    <p:tnLst>
-      <p:par>
-        <p:cTn id="1" dur="indefinite" restart="never" nodeType="tmRoot"/>
-      </p:par>
-    </p:tnLst>
-  </p:timing>
 </p:sld>
 </file>
 
@@ -17325,7 +17395,7 @@
               <a:buNone/>
             </a:pPr>
             <a:r>
-              <a:rPr lang="en" dirty="0" smtClean="0"/>
+              <a:rPr lang="en" dirty="0"/>
               <a:t>We are 4 students @Uni Stuttgart from different IT-backgrounds (Computer Science, Mechatronics)</a:t>
             </a:r>
           </a:p>
@@ -17354,35 +17424,19 @@
               <a:buNone/>
             </a:pPr>
             <a:r>
-              <a:rPr lang="en" dirty="0" smtClean="0"/>
-              <a:t>You can find the project @</a:t>
-            </a:r>
-            <a:r>
-              <a:rPr lang="de-DE" dirty="0" err="1" smtClean="0"/>
-              <a:t>github</a:t>
-            </a:r>
-            <a:r>
-              <a:rPr lang="de-DE" dirty="0"/>
-              <a:t>: </a:t>
-            </a:r>
-            <a:r>
               <a:rPr lang="de-DE" sz="1100" dirty="0"/>
-              <a:t>mario-r99/hackathon-2022</a:t>
-            </a:r>
-            <a:r>
-              <a:rPr lang="de-DE" sz="1100" dirty="0" smtClean="0"/>
               <a:t>	</a:t>
             </a:r>
             <a:r>
-              <a:rPr lang="de-DE" dirty="0" smtClean="0"/>
+              <a:rPr lang="de-DE" dirty="0"/>
               <a:t>	</a:t>
             </a:r>
             <a:r>
-              <a:rPr lang="en" dirty="0" smtClean="0"/>
+              <a:rPr lang="en" dirty="0"/>
               <a:t>  </a:t>
             </a:r>
             <a:r>
-              <a:rPr lang="de-DE" b="1" dirty="0" smtClean="0"/>
+              <a:rPr lang="de-DE" b="1" dirty="0"/>
               <a:t>		</a:t>
             </a:r>
             <a:endParaRPr dirty="0"/>
@@ -17431,7 +17485,7 @@
           <a:lstStyle/>
           <a:p>
             <a:pPr algn="ctr"/>
-            <a:endParaRPr lang="de-DE" sz="1600" dirty="0" smtClean="0"/>
+            <a:endParaRPr lang="de-DE" sz="1600" dirty="0"/>
           </a:p>
         </p:txBody>
       </p:sp>
@@ -17445,13 +17499,6 @@
   <p:clrMapOvr>
     <a:masterClrMapping/>
   </p:clrMapOvr>
-  <p:timing>
-    <p:tnLst>
-      <p:par>
-        <p:cTn id="1" dur="indefinite" restart="never" nodeType="tmRoot"/>
-      </p:par>
-    </p:tnLst>
-  </p:timing>
 </p:sld>
 </file>
 
@@ -17477,7 +17524,7 @@
           <p:cNvPr id="6" name="Titel 5">
             <a:extLst>
               <a:ext uri="{FF2B5EF4-FFF2-40B4-BE49-F238E27FC236}">
-                <a16:creationId xmlns:a16="http://schemas.microsoft.com/office/drawing/2014/main" xmlns="" id="{6BF0AFA7-69A7-4369-8161-21610A905B1A}"/>
+                <a16:creationId xmlns:a16="http://schemas.microsoft.com/office/drawing/2014/main" id="{6BF0AFA7-69A7-4369-8161-21610A905B1A}"/>
               </a:ext>
             </a:extLst>
           </p:cNvPr>
@@ -17494,10 +17541,9 @@
           <a:lstStyle/>
           <a:p>
             <a:r>
-              <a:rPr lang="de-DE" dirty="0" smtClean="0"/>
+              <a:rPr lang="de-DE" dirty="0"/>
               <a:t>Project Motivation</a:t>
             </a:r>
-            <a:endParaRPr lang="de-DE" dirty="0"/>
           </a:p>
         </p:txBody>
       </p:sp>
@@ -17506,7 +17552,7 @@
           <p:cNvPr id="2" name="Datumsplatzhalter 1">
             <a:extLst>
               <a:ext uri="{FF2B5EF4-FFF2-40B4-BE49-F238E27FC236}">
-                <a16:creationId xmlns:a16="http://schemas.microsoft.com/office/drawing/2014/main" xmlns="" id="{76CF9658-DA7D-455E-B6EC-A07D773F79B0}"/>
+                <a16:creationId xmlns:a16="http://schemas.microsoft.com/office/drawing/2014/main" id="{76CF9658-DA7D-455E-B6EC-A07D773F79B0}"/>
               </a:ext>
             </a:extLst>
           </p:cNvPr>
@@ -17535,7 +17581,7 @@
           <p:cNvPr id="3" name="Fußzeilenplatzhalter 2">
             <a:extLst>
               <a:ext uri="{FF2B5EF4-FFF2-40B4-BE49-F238E27FC236}">
-                <a16:creationId xmlns:a16="http://schemas.microsoft.com/office/drawing/2014/main" xmlns="" id="{60787A50-FFDC-4F08-A1E0-271FBBA86C8E}"/>
+                <a16:creationId xmlns:a16="http://schemas.microsoft.com/office/drawing/2014/main" id="{60787A50-FFDC-4F08-A1E0-271FBBA86C8E}"/>
               </a:ext>
             </a:extLst>
           </p:cNvPr>
@@ -17564,7 +17610,7 @@
           <p:cNvPr id="4" name="Foliennummernplatzhalter 3">
             <a:extLst>
               <a:ext uri="{FF2B5EF4-FFF2-40B4-BE49-F238E27FC236}">
-                <a16:creationId xmlns:a16="http://schemas.microsoft.com/office/drawing/2014/main" xmlns="" id="{C074940A-1407-4EB3-8D77-C5636D3C75A8}"/>
+                <a16:creationId xmlns:a16="http://schemas.microsoft.com/office/drawing/2014/main" id="{C074940A-1407-4EB3-8D77-C5636D3C75A8}"/>
               </a:ext>
             </a:extLst>
           </p:cNvPr>
@@ -17678,21 +17724,17 @@
             </a:pPr>
             <a:r>
               <a:rPr lang="de-DE" sz="1200" dirty="0" err="1"/>
-              <a:t>m</a:t>
-            </a:r>
-            <a:r>
-              <a:rPr lang="de-DE" sz="1200" dirty="0" err="1" smtClean="0"/>
-              <a:t>antainance</a:t>
-            </a:r>
-            <a:r>
-              <a:rPr lang="de-DE" sz="1200" dirty="0" smtClean="0"/>
+              <a:t>mantainance</a:t>
+            </a:r>
+            <a:r>
+              <a:rPr lang="de-DE" sz="1200" dirty="0"/>
               <a:t> </a:t>
             </a:r>
             <a:r>
-              <a:rPr lang="de-DE" sz="1200" dirty="0" err="1" smtClean="0"/>
+              <a:rPr lang="de-DE" sz="1200" dirty="0" err="1"/>
               <a:t>service</a:t>
             </a:r>
-            <a:endParaRPr lang="de-DE" sz="1200" dirty="0" smtClean="0"/>
+            <a:endParaRPr lang="de-DE" sz="1200" dirty="0"/>
           </a:p>
         </p:txBody>
       </p:sp>
@@ -17729,34 +17771,34 @@
               <a:buChar char="•"/>
             </a:pPr>
             <a:r>
-              <a:rPr lang="de-DE" sz="1600" b="1" dirty="0" err="1" smtClean="0"/>
+              <a:rPr lang="de-DE" sz="1600" b="1" dirty="0" err="1"/>
               <a:t>No</a:t>
             </a:r>
             <a:r>
-              <a:rPr lang="de-DE" sz="1600" b="1" dirty="0" smtClean="0"/>
+              <a:rPr lang="de-DE" sz="1600" b="1" dirty="0"/>
               <a:t> </a:t>
             </a:r>
             <a:r>
-              <a:rPr lang="de-DE" sz="1600" b="1" dirty="0" err="1" smtClean="0"/>
+              <a:rPr lang="de-DE" sz="1600" b="1" dirty="0" err="1"/>
               <a:t>overview</a:t>
             </a:r>
             <a:r>
-              <a:rPr lang="de-DE" sz="1600" b="1" dirty="0" smtClean="0"/>
+              <a:rPr lang="de-DE" sz="1600" b="1" dirty="0"/>
               <a:t> </a:t>
             </a:r>
             <a:r>
-              <a:rPr lang="de-DE" sz="1600" b="1" dirty="0" err="1" smtClean="0"/>
+              <a:rPr lang="de-DE" sz="1600" b="1" dirty="0" err="1"/>
               <a:t>over</a:t>
             </a:r>
             <a:r>
-              <a:rPr lang="de-DE" sz="1600" b="1" dirty="0" smtClean="0"/>
+              <a:rPr lang="de-DE" sz="1600" b="1" dirty="0"/>
               <a:t> </a:t>
             </a:r>
             <a:r>
-              <a:rPr lang="de-DE" sz="1600" b="1" dirty="0" err="1" smtClean="0"/>
+              <a:rPr lang="de-DE" sz="1600" b="1" dirty="0" err="1"/>
               <a:t>maintainance</a:t>
             </a:r>
-            <a:endParaRPr lang="de-DE" sz="1600" b="1" dirty="0" smtClean="0"/>
+            <a:endParaRPr lang="de-DE" sz="1600" b="1" dirty="0"/>
           </a:p>
           <a:p>
             <a:pPr marL="179388" indent="-179388">
@@ -17770,10 +17812,10 @@
               <a:buChar char="•"/>
             </a:pPr>
             <a:r>
-              <a:rPr lang="de-DE" sz="1600" b="1" dirty="0" err="1" smtClean="0"/>
+              <a:rPr lang="de-DE" sz="1600" b="1" dirty="0" err="1"/>
               <a:t>Unreliable</a:t>
             </a:r>
-            <a:endParaRPr lang="de-DE" sz="1600" b="1" dirty="0" smtClean="0"/>
+            <a:endParaRPr lang="de-DE" sz="1600" b="1" dirty="0"/>
           </a:p>
           <a:p>
             <a:pPr marL="179388" indent="-179388">
@@ -17787,18 +17829,18 @@
               <a:buChar char="•"/>
             </a:pPr>
             <a:r>
-              <a:rPr lang="de-DE" sz="1600" b="1" dirty="0" err="1" smtClean="0"/>
+              <a:rPr lang="de-DE" sz="1600" b="1" dirty="0" err="1"/>
               <a:t>Monetary</a:t>
             </a:r>
             <a:r>
-              <a:rPr lang="de-DE" sz="1600" b="1" dirty="0" smtClean="0"/>
+              <a:rPr lang="de-DE" sz="1600" b="1" dirty="0"/>
               <a:t> </a:t>
             </a:r>
             <a:r>
-              <a:rPr lang="de-DE" sz="1600" b="1" dirty="0" err="1" smtClean="0"/>
+              <a:rPr lang="de-DE" sz="1600" b="1" dirty="0" err="1"/>
               <a:t>loss</a:t>
             </a:r>
-            <a:endParaRPr lang="de-DE" sz="1600" b="1" dirty="0" smtClean="0"/>
+            <a:endParaRPr lang="de-DE" sz="1600" b="1" dirty="0"/>
           </a:p>
         </p:txBody>
       </p:sp>
@@ -17841,30 +17883,22 @@
           <a:lstStyle/>
           <a:p>
             <a:pPr algn="ctr"/>
-            <a:endParaRPr lang="de-DE" sz="1600" dirty="0" smtClean="0"/>
+            <a:endParaRPr lang="de-DE" sz="1600" dirty="0"/>
           </a:p>
         </p:txBody>
       </p:sp>
       <p:pic>
         <p:nvPicPr>
-          <p:cNvPr id="1030" name="Picture 6" descr="QR Code Generator | Kostenlose QR Codes erstellen"/>
+          <p:cNvPr id="1030" name="Picture 6"/>
           <p:cNvPicPr>
             <a:picLocks noChangeAspect="1" noChangeArrowheads="1"/>
           </p:cNvPicPr>
           <p:nvPr/>
         </p:nvPicPr>
         <p:blipFill>
-          <a:blip r:embed="rId3">
-            <a:extLst>
-              <a:ext uri="{28A0092B-C50C-407E-A947-70E740481C1C}">
-                <a14:useLocalDpi xmlns:a14="http://schemas.microsoft.com/office/drawing/2010/main" val="0"/>
-              </a:ext>
-            </a:extLst>
-          </a:blip>
+          <a:blip r:embed="rId3"/>
           <a:srcRect/>
-          <a:stretch>
-            <a:fillRect/>
-          </a:stretch>
+          <a:stretch/>
         </p:blipFill>
         <p:spPr bwMode="auto">
           <a:xfrm flipV="1">
@@ -17919,7 +17953,7 @@
               <a:buChar char="•"/>
             </a:pPr>
             <a:r>
-              <a:rPr lang="de-DE" sz="1600" b="1" dirty="0" smtClean="0"/>
+              <a:rPr lang="de-DE" sz="1600" b="1" dirty="0"/>
               <a:t>SPIE Presence Service</a:t>
             </a:r>
           </a:p>
@@ -17935,7 +17969,7 @@
               <a:buChar char="•"/>
             </a:pPr>
             <a:r>
-              <a:rPr lang="de-DE" sz="1600" b="1" dirty="0" smtClean="0"/>
+              <a:rPr lang="de-DE" sz="1600" b="1" dirty="0"/>
               <a:t>Scan QR-Code</a:t>
             </a:r>
           </a:p>
@@ -17951,22 +17985,22 @@
               <a:buChar char="•"/>
             </a:pPr>
             <a:r>
-              <a:rPr lang="de-DE" sz="1600" b="1" dirty="0" smtClean="0"/>
+              <a:rPr lang="de-DE" sz="1600" b="1" dirty="0"/>
               <a:t>Information </a:t>
             </a:r>
             <a:r>
-              <a:rPr lang="de-DE" sz="1600" b="1" dirty="0" err="1" smtClean="0"/>
+              <a:rPr lang="de-DE" sz="1600" b="1" dirty="0" err="1"/>
               <a:t>encrypted</a:t>
             </a:r>
             <a:r>
-              <a:rPr lang="de-DE" sz="1600" b="1" dirty="0" smtClean="0"/>
+              <a:rPr lang="de-DE" sz="1600" b="1" dirty="0"/>
               <a:t> in </a:t>
             </a:r>
             <a:r>
-              <a:rPr lang="de-DE" sz="1600" b="1" dirty="0" err="1" smtClean="0"/>
+              <a:rPr lang="de-DE" sz="1600" b="1" dirty="0" err="1"/>
               <a:t>Blockchain</a:t>
             </a:r>
-            <a:endParaRPr lang="de-DE" sz="1600" b="1" dirty="0" smtClean="0"/>
+            <a:endParaRPr lang="de-DE" sz="1600" b="1" dirty="0"/>
           </a:p>
         </p:txBody>
       </p:sp>
@@ -17980,13 +18014,6 @@
   <p:clrMapOvr>
     <a:masterClrMapping/>
   </p:clrMapOvr>
-  <p:timing>
-    <p:tnLst>
-      <p:par>
-        <p:cTn id="1" dur="indefinite" restart="never" nodeType="tmRoot"/>
-      </p:par>
-    </p:tnLst>
-  </p:timing>
 </p:sld>
 </file>
 
@@ -18012,7 +18039,7 @@
           <p:cNvPr id="6" name="Titel 5">
             <a:extLst>
               <a:ext uri="{FF2B5EF4-FFF2-40B4-BE49-F238E27FC236}">
-                <a16:creationId xmlns:a16="http://schemas.microsoft.com/office/drawing/2014/main" xmlns="" id="{6BF0AFA7-69A7-4369-8161-21610A905B1A}"/>
+                <a16:creationId xmlns:a16="http://schemas.microsoft.com/office/drawing/2014/main" id="{6BF0AFA7-69A7-4369-8161-21610A905B1A}"/>
               </a:ext>
             </a:extLst>
           </p:cNvPr>
@@ -18029,10 +18056,9 @@
           <a:lstStyle/>
           <a:p>
             <a:r>
-              <a:rPr lang="de-DE" sz="2400" dirty="0" smtClean="0"/>
+              <a:rPr lang="de-DE" sz="2400" dirty="0"/>
               <a:t>Outline</a:t>
             </a:r>
-            <a:endParaRPr lang="de-DE" sz="2400" dirty="0"/>
           </a:p>
         </p:txBody>
       </p:sp>
@@ -18041,7 +18067,7 @@
           <p:cNvPr id="7" name="Inhaltsplatzhalter 6">
             <a:extLst>
               <a:ext uri="{FF2B5EF4-FFF2-40B4-BE49-F238E27FC236}">
-                <a16:creationId xmlns:a16="http://schemas.microsoft.com/office/drawing/2014/main" xmlns="" id="{F08191B6-772D-4CD3-ADA6-ABE61BA1B6CF}"/>
+                <a16:creationId xmlns:a16="http://schemas.microsoft.com/office/drawing/2014/main" id="{F08191B6-772D-4CD3-ADA6-ABE61BA1B6CF}"/>
               </a:ext>
             </a:extLst>
           </p:cNvPr>
@@ -18062,15 +18088,15 @@
               <a:buAutoNum type="romanUcPeriod"/>
             </a:pPr>
             <a:r>
-              <a:rPr lang="de-DE" sz="2000" dirty="0" smtClean="0"/>
+              <a:rPr lang="de-DE" sz="2000" dirty="0"/>
               <a:t>Setup </a:t>
             </a:r>
             <a:r>
-              <a:rPr lang="de-DE" sz="2000" dirty="0" err="1" smtClean="0"/>
+              <a:rPr lang="de-DE" sz="2000" dirty="0" err="1"/>
               <a:t>and</a:t>
             </a:r>
             <a:r>
-              <a:rPr lang="de-DE" sz="2000" dirty="0" smtClean="0"/>
+              <a:rPr lang="de-DE" sz="2000" dirty="0"/>
               <a:t> Components</a:t>
             </a:r>
           </a:p>
@@ -18080,7 +18106,7 @@
               <a:buAutoNum type="romanUcPeriod"/>
             </a:pPr>
             <a:r>
-              <a:rPr lang="de-DE" sz="2000" dirty="0" smtClean="0"/>
+              <a:rPr lang="de-DE" sz="2000" dirty="0"/>
               <a:t>Demonstration</a:t>
             </a:r>
           </a:p>
@@ -18090,7 +18116,7 @@
               <a:buAutoNum type="romanUcPeriod"/>
             </a:pPr>
             <a:r>
-              <a:rPr lang="de-DE" sz="2000" dirty="0" err="1" smtClean="0"/>
+              <a:rPr lang="de-DE" sz="2000" dirty="0" err="1"/>
               <a:t>Discussion</a:t>
             </a:r>
             <a:endParaRPr lang="de-DE" sz="2000" dirty="0"/>
@@ -18102,7 +18128,7 @@
           <p:cNvPr id="2" name="Datumsplatzhalter 1">
             <a:extLst>
               <a:ext uri="{FF2B5EF4-FFF2-40B4-BE49-F238E27FC236}">
-                <a16:creationId xmlns:a16="http://schemas.microsoft.com/office/drawing/2014/main" xmlns="" id="{76CF9658-DA7D-455E-B6EC-A07D773F79B0}"/>
+                <a16:creationId xmlns:a16="http://schemas.microsoft.com/office/drawing/2014/main" id="{76CF9658-DA7D-455E-B6EC-A07D773F79B0}"/>
               </a:ext>
             </a:extLst>
           </p:cNvPr>
@@ -18131,7 +18157,7 @@
           <p:cNvPr id="3" name="Fußzeilenplatzhalter 2">
             <a:extLst>
               <a:ext uri="{FF2B5EF4-FFF2-40B4-BE49-F238E27FC236}">
-                <a16:creationId xmlns:a16="http://schemas.microsoft.com/office/drawing/2014/main" xmlns="" id="{60787A50-FFDC-4F08-A1E0-271FBBA86C8E}"/>
+                <a16:creationId xmlns:a16="http://schemas.microsoft.com/office/drawing/2014/main" id="{60787A50-FFDC-4F08-A1E0-271FBBA86C8E}"/>
               </a:ext>
             </a:extLst>
           </p:cNvPr>
@@ -18160,7 +18186,7 @@
           <p:cNvPr id="4" name="Foliennummernplatzhalter 3">
             <a:extLst>
               <a:ext uri="{FF2B5EF4-FFF2-40B4-BE49-F238E27FC236}">
-                <a16:creationId xmlns:a16="http://schemas.microsoft.com/office/drawing/2014/main" xmlns="" id="{C074940A-1407-4EB3-8D77-C5636D3C75A8}"/>
+                <a16:creationId xmlns:a16="http://schemas.microsoft.com/office/drawing/2014/main" id="{C074940A-1407-4EB3-8D77-C5636D3C75A8}"/>
               </a:ext>
             </a:extLst>
           </p:cNvPr>
@@ -18195,13 +18221,6 @@
   <p:clrMapOvr>
     <a:masterClrMapping/>
   </p:clrMapOvr>
-  <p:timing>
-    <p:tnLst>
-      <p:par>
-        <p:cTn id="1" dur="indefinite" restart="never" nodeType="tmRoot"/>
-      </p:par>
-    </p:tnLst>
-  </p:timing>
 </p:sld>
 </file>
 
@@ -18227,7 +18246,7 @@
           <p:cNvPr id="6" name="Titel 5">
             <a:extLst>
               <a:ext uri="{FF2B5EF4-FFF2-40B4-BE49-F238E27FC236}">
-                <a16:creationId xmlns:a16="http://schemas.microsoft.com/office/drawing/2014/main" xmlns="" id="{6BF0AFA7-69A7-4369-8161-21610A905B1A}"/>
+                <a16:creationId xmlns:a16="http://schemas.microsoft.com/office/drawing/2014/main" id="{6BF0AFA7-69A7-4369-8161-21610A905B1A}"/>
               </a:ext>
             </a:extLst>
           </p:cNvPr>
@@ -18244,10 +18263,9 @@
           <a:lstStyle/>
           <a:p>
             <a:r>
-              <a:rPr lang="de-DE" sz="2400" dirty="0" smtClean="0"/>
+              <a:rPr lang="de-DE" sz="2400" dirty="0"/>
               <a:t>Outline</a:t>
             </a:r>
-            <a:endParaRPr lang="de-DE" sz="2400" dirty="0"/>
           </a:p>
         </p:txBody>
       </p:sp>
@@ -18256,7 +18274,7 @@
           <p:cNvPr id="7" name="Inhaltsplatzhalter 6">
             <a:extLst>
               <a:ext uri="{FF2B5EF4-FFF2-40B4-BE49-F238E27FC236}">
-                <a16:creationId xmlns:a16="http://schemas.microsoft.com/office/drawing/2014/main" xmlns="" id="{F08191B6-772D-4CD3-ADA6-ABE61BA1B6CF}"/>
+                <a16:creationId xmlns:a16="http://schemas.microsoft.com/office/drawing/2014/main" id="{F08191B6-772D-4CD3-ADA6-ABE61BA1B6CF}"/>
               </a:ext>
             </a:extLst>
           </p:cNvPr>
@@ -18277,15 +18295,15 @@
               <a:buAutoNum type="romanUcPeriod"/>
             </a:pPr>
             <a:r>
-              <a:rPr lang="de-DE" sz="2000" b="1" dirty="0" smtClean="0"/>
+              <a:rPr lang="de-DE" sz="2000" b="1" dirty="0"/>
               <a:t>Setup </a:t>
             </a:r>
             <a:r>
-              <a:rPr lang="de-DE" sz="2000" b="1" dirty="0" err="1" smtClean="0"/>
+              <a:rPr lang="de-DE" sz="2000" b="1" dirty="0" err="1"/>
               <a:t>and</a:t>
             </a:r>
             <a:r>
-              <a:rPr lang="de-DE" sz="2000" b="1" dirty="0" smtClean="0"/>
+              <a:rPr lang="de-DE" sz="2000" b="1" dirty="0"/>
               <a:t> Components</a:t>
             </a:r>
           </a:p>
@@ -18295,7 +18313,7 @@
               <a:buAutoNum type="romanUcPeriod"/>
             </a:pPr>
             <a:r>
-              <a:rPr lang="de-DE" sz="2000" dirty="0" smtClean="0"/>
+              <a:rPr lang="de-DE" sz="2000" dirty="0"/>
               <a:t>Demonstration</a:t>
             </a:r>
           </a:p>
@@ -18305,7 +18323,7 @@
               <a:buAutoNum type="romanUcPeriod"/>
             </a:pPr>
             <a:r>
-              <a:rPr lang="de-DE" sz="2000" dirty="0" err="1" smtClean="0"/>
+              <a:rPr lang="de-DE" sz="2000" dirty="0" err="1"/>
               <a:t>Discussion</a:t>
             </a:r>
             <a:endParaRPr lang="de-DE" sz="2000" dirty="0"/>
@@ -18317,7 +18335,7 @@
           <p:cNvPr id="2" name="Datumsplatzhalter 1">
             <a:extLst>
               <a:ext uri="{FF2B5EF4-FFF2-40B4-BE49-F238E27FC236}">
-                <a16:creationId xmlns:a16="http://schemas.microsoft.com/office/drawing/2014/main" xmlns="" id="{76CF9658-DA7D-455E-B6EC-A07D773F79B0}"/>
+                <a16:creationId xmlns:a16="http://schemas.microsoft.com/office/drawing/2014/main" id="{76CF9658-DA7D-455E-B6EC-A07D773F79B0}"/>
               </a:ext>
             </a:extLst>
           </p:cNvPr>
@@ -18346,7 +18364,7 @@
           <p:cNvPr id="3" name="Fußzeilenplatzhalter 2">
             <a:extLst>
               <a:ext uri="{FF2B5EF4-FFF2-40B4-BE49-F238E27FC236}">
-                <a16:creationId xmlns:a16="http://schemas.microsoft.com/office/drawing/2014/main" xmlns="" id="{60787A50-FFDC-4F08-A1E0-271FBBA86C8E}"/>
+                <a16:creationId xmlns:a16="http://schemas.microsoft.com/office/drawing/2014/main" id="{60787A50-FFDC-4F08-A1E0-271FBBA86C8E}"/>
               </a:ext>
             </a:extLst>
           </p:cNvPr>
@@ -18375,7 +18393,7 @@
           <p:cNvPr id="4" name="Foliennummernplatzhalter 3">
             <a:extLst>
               <a:ext uri="{FF2B5EF4-FFF2-40B4-BE49-F238E27FC236}">
-                <a16:creationId xmlns:a16="http://schemas.microsoft.com/office/drawing/2014/main" xmlns="" id="{C074940A-1407-4EB3-8D77-C5636D3C75A8}"/>
+                <a16:creationId xmlns:a16="http://schemas.microsoft.com/office/drawing/2014/main" id="{C074940A-1407-4EB3-8D77-C5636D3C75A8}"/>
               </a:ext>
             </a:extLst>
           </p:cNvPr>
@@ -18410,13 +18428,6 @@
   <p:clrMapOvr>
     <a:masterClrMapping/>
   </p:clrMapOvr>
-  <p:timing>
-    <p:tnLst>
-      <p:par>
-        <p:cTn id="1" dur="indefinite" restart="never" nodeType="tmRoot"/>
-      </p:par>
-    </p:tnLst>
-  </p:timing>
 </p:sld>
 </file>
 
@@ -18476,7 +18487,7 @@
           <a:lstStyle/>
           <a:p>
             <a:pPr algn="ctr"/>
-            <a:endParaRPr lang="de-DE" sz="1600" dirty="0" smtClean="0"/>
+            <a:endParaRPr lang="de-DE" sz="1600" dirty="0"/>
           </a:p>
         </p:txBody>
       </p:sp>
@@ -18501,18 +18512,17 @@
           <a:lstStyle/>
           <a:p>
             <a:r>
-              <a:rPr lang="de-DE" sz="2000" dirty="0" smtClean="0"/>
+              <a:rPr lang="de-DE" sz="2000" dirty="0"/>
               <a:t>I – Setup </a:t>
             </a:r>
             <a:r>
-              <a:rPr lang="de-DE" sz="2000" dirty="0" err="1" smtClean="0"/>
+              <a:rPr lang="de-DE" sz="2000" dirty="0" err="1"/>
               <a:t>and</a:t>
             </a:r>
             <a:r>
-              <a:rPr lang="de-DE" sz="2000" dirty="0" smtClean="0"/>
+              <a:rPr lang="de-DE" sz="2000" dirty="0"/>
               <a:t> Components</a:t>
             </a:r>
-            <a:endParaRPr lang="de-DE" sz="2000" dirty="0"/>
           </a:p>
         </p:txBody>
       </p:sp>
@@ -18537,11 +18547,11 @@
           <a:lstStyle/>
           <a:p>
             <a:r>
-              <a:rPr lang="de-DE" dirty="0" smtClean="0"/>
+              <a:rPr lang="de-DE" dirty="0"/>
               <a:t>Software </a:t>
             </a:r>
             <a:r>
-              <a:rPr lang="de-DE" dirty="0" err="1" smtClean="0"/>
+              <a:rPr lang="de-DE" dirty="0" err="1"/>
               <a:t>Architecture</a:t>
             </a:r>
             <a:endParaRPr lang="de-DE" dirty="0"/>
@@ -18564,7 +18574,7 @@
           <a:lstStyle/>
           <a:p>
             <a:r>
-              <a:rPr lang="de-DE" smtClean="0"/>
+              <a:rPr lang="de-DE"/>
               <a:t>08/20/2020</a:t>
             </a:r>
             <a:endParaRPr lang="en-US" dirty="0"/>
@@ -18587,7 +18597,7 @@
           <a:lstStyle/>
           <a:p>
             <a:r>
-              <a:rPr lang="en-US" smtClean="0"/>
+              <a:rPr lang="en-US"/>
               <a:t>University of Stuttgart</a:t>
             </a:r>
             <a:endParaRPr lang="en-US" dirty="0"/>
@@ -18660,7 +18670,7 @@
           <a:lstStyle/>
           <a:p>
             <a:pPr algn="ctr"/>
-            <a:endParaRPr lang="de-DE" sz="1600" dirty="0" smtClean="0"/>
+            <a:endParaRPr lang="de-DE" sz="1600" dirty="0"/>
           </a:p>
         </p:txBody>
       </p:sp>
@@ -18728,13 +18738,6 @@
   <p:clrMapOvr>
     <a:masterClrMapping/>
   </p:clrMapOvr>
-  <p:timing>
-    <p:tnLst>
-      <p:par>
-        <p:cTn id="1" dur="indefinite" restart="never" nodeType="tmRoot"/>
-      </p:par>
-    </p:tnLst>
-  </p:timing>
 </p:sld>
 </file>
 
@@ -18794,7 +18797,7 @@
           <a:lstStyle/>
           <a:p>
             <a:pPr algn="ctr"/>
-            <a:endParaRPr lang="de-DE" sz="1600" dirty="0" smtClean="0"/>
+            <a:endParaRPr lang="de-DE" sz="1600" dirty="0"/>
           </a:p>
         </p:txBody>
       </p:sp>
@@ -18819,18 +18822,17 @@
           <a:lstStyle/>
           <a:p>
             <a:r>
-              <a:rPr lang="de-DE" sz="2000" dirty="0" smtClean="0"/>
+              <a:rPr lang="de-DE" sz="2000" dirty="0"/>
               <a:t>I – Setup </a:t>
             </a:r>
             <a:r>
-              <a:rPr lang="de-DE" sz="2000" dirty="0" err="1" smtClean="0"/>
+              <a:rPr lang="de-DE" sz="2000" dirty="0" err="1"/>
               <a:t>and</a:t>
             </a:r>
             <a:r>
-              <a:rPr lang="de-DE" sz="2000" dirty="0" smtClean="0"/>
+              <a:rPr lang="de-DE" sz="2000" dirty="0"/>
               <a:t> Components</a:t>
             </a:r>
-            <a:endParaRPr lang="de-DE" sz="2000" dirty="0"/>
           </a:p>
         </p:txBody>
       </p:sp>
@@ -18855,11 +18857,11 @@
           <a:lstStyle/>
           <a:p>
             <a:r>
-              <a:rPr lang="de-DE" dirty="0" smtClean="0"/>
+              <a:rPr lang="de-DE" dirty="0"/>
               <a:t>Software </a:t>
             </a:r>
             <a:r>
-              <a:rPr lang="de-DE" dirty="0" err="1" smtClean="0"/>
+              <a:rPr lang="de-DE" dirty="0" err="1"/>
               <a:t>Architecture</a:t>
             </a:r>
             <a:endParaRPr lang="de-DE" dirty="0"/>
@@ -18882,7 +18884,7 @@
           <a:lstStyle/>
           <a:p>
             <a:r>
-              <a:rPr lang="de-DE" smtClean="0"/>
+              <a:rPr lang="de-DE"/>
               <a:t>08/20/2020</a:t>
             </a:r>
             <a:endParaRPr lang="en-US" dirty="0"/>
@@ -18905,7 +18907,7 @@
           <a:lstStyle/>
           <a:p>
             <a:r>
-              <a:rPr lang="en-US" smtClean="0"/>
+              <a:rPr lang="en-US"/>
               <a:t>University of Stuttgart</a:t>
             </a:r>
             <a:endParaRPr lang="en-US" dirty="0"/>
@@ -18978,7 +18980,7 @@
           <a:lstStyle/>
           <a:p>
             <a:pPr algn="ctr"/>
-            <a:endParaRPr lang="de-DE" sz="1600" dirty="0" smtClean="0"/>
+            <a:endParaRPr lang="de-DE" sz="1600" dirty="0"/>
           </a:p>
         </p:txBody>
       </p:sp>
@@ -18992,13 +18994,6 @@
   <p:clrMapOvr>
     <a:masterClrMapping/>
   </p:clrMapOvr>
-  <p:timing>
-    <p:tnLst>
-      <p:par>
-        <p:cTn id="1" dur="indefinite" restart="never" nodeType="tmRoot"/>
-      </p:par>
-    </p:tnLst>
-  </p:timing>
 </p:sld>
 </file>
 
@@ -19058,7 +19053,7 @@
           <a:lstStyle/>
           <a:p>
             <a:pPr algn="ctr"/>
-            <a:endParaRPr lang="de-DE" sz="1600" dirty="0" smtClean="0"/>
+            <a:endParaRPr lang="de-DE" sz="1600" dirty="0"/>
           </a:p>
         </p:txBody>
       </p:sp>
@@ -19083,18 +19078,17 @@
           <a:lstStyle/>
           <a:p>
             <a:r>
-              <a:rPr lang="de-DE" sz="2000" dirty="0" smtClean="0"/>
+              <a:rPr lang="de-DE" sz="2000" dirty="0"/>
               <a:t>I – Setup </a:t>
             </a:r>
             <a:r>
-              <a:rPr lang="de-DE" sz="2000" dirty="0" err="1" smtClean="0"/>
+              <a:rPr lang="de-DE" sz="2000" dirty="0" err="1"/>
               <a:t>and</a:t>
             </a:r>
             <a:r>
-              <a:rPr lang="de-DE" sz="2000" dirty="0" smtClean="0"/>
+              <a:rPr lang="de-DE" sz="2000" dirty="0"/>
               <a:t> Components</a:t>
             </a:r>
-            <a:endParaRPr lang="de-DE" sz="2000" dirty="0"/>
           </a:p>
         </p:txBody>
       </p:sp>
@@ -19119,11 +19113,11 @@
           <a:lstStyle/>
           <a:p>
             <a:r>
-              <a:rPr lang="de-DE" dirty="0" smtClean="0"/>
+              <a:rPr lang="de-DE" dirty="0"/>
               <a:t>Software </a:t>
             </a:r>
             <a:r>
-              <a:rPr lang="de-DE" dirty="0" err="1" smtClean="0"/>
+              <a:rPr lang="de-DE" dirty="0" err="1"/>
               <a:t>Architecture</a:t>
             </a:r>
             <a:endParaRPr lang="de-DE" dirty="0"/>
@@ -19146,7 +19140,7 @@
           <a:lstStyle/>
           <a:p>
             <a:r>
-              <a:rPr lang="de-DE" smtClean="0"/>
+              <a:rPr lang="de-DE"/>
               <a:t>08/20/2020</a:t>
             </a:r>
             <a:endParaRPr lang="en-US" dirty="0"/>
@@ -19169,7 +19163,7 @@
           <a:lstStyle/>
           <a:p>
             <a:r>
-              <a:rPr lang="en-US" smtClean="0"/>
+              <a:rPr lang="en-US"/>
               <a:t>University of Stuttgart</a:t>
             </a:r>
             <a:endParaRPr lang="en-US" dirty="0"/>
@@ -19242,7 +19236,7 @@
           <a:lstStyle/>
           <a:p>
             <a:pPr algn="ctr"/>
-            <a:endParaRPr lang="de-DE" sz="1600" dirty="0" smtClean="0"/>
+            <a:endParaRPr lang="de-DE" sz="1600" dirty="0"/>
           </a:p>
         </p:txBody>
       </p:sp>
@@ -19323,10 +19317,10 @@
               <a:buChar char="•"/>
             </a:pPr>
             <a:r>
-              <a:rPr lang="de-DE" sz="1600" b="1" dirty="0" err="1" smtClean="0"/>
+              <a:rPr lang="de-DE" sz="1600" b="1" dirty="0" err="1"/>
               <a:t>Kotlin</a:t>
             </a:r>
-            <a:endParaRPr lang="de-DE" sz="1600" b="1" dirty="0" smtClean="0"/>
+            <a:endParaRPr lang="de-DE" sz="1600" b="1" dirty="0"/>
           </a:p>
           <a:p>
             <a:pPr marL="285750" indent="-285750">
@@ -19343,10 +19337,10 @@
               <a:buChar char="•"/>
             </a:pPr>
             <a:r>
-              <a:rPr lang="de-DE" sz="1600" dirty="0" err="1" smtClean="0"/>
+              <a:rPr lang="de-DE" sz="1600" dirty="0" err="1"/>
               <a:t>blabla</a:t>
             </a:r>
-            <a:endParaRPr lang="de-DE" sz="1600" dirty="0" smtClean="0"/>
+            <a:endParaRPr lang="de-DE" sz="1600" dirty="0"/>
           </a:p>
         </p:txBody>
       </p:sp>
@@ -19389,7 +19383,7 @@
           <a:lstStyle/>
           <a:p>
             <a:pPr algn="ctr"/>
-            <a:endParaRPr lang="de-DE" sz="1600" dirty="0" smtClean="0"/>
+            <a:endParaRPr lang="de-DE" sz="1600" dirty="0"/>
           </a:p>
         </p:txBody>
       </p:sp>
@@ -19468,14 +19462,14 @@
               </a:buClr>
             </a:pPr>
             <a:r>
-              <a:rPr lang="de-DE" sz="1200" dirty="0" err="1" smtClean="0">
+              <a:rPr lang="de-DE" sz="1200" dirty="0" err="1">
                 <a:solidFill>
                   <a:srgbClr val="00B0F0"/>
                 </a:solidFill>
               </a:rPr>
               <a:t>protocol</a:t>
             </a:r>
-            <a:endParaRPr lang="de-DE" sz="1200" dirty="0" smtClean="0">
+            <a:endParaRPr lang="de-DE" sz="1200" dirty="0">
               <a:solidFill>
                 <a:srgbClr val="00B0F0"/>
               </a:solidFill>
@@ -19519,7 +19513,7 @@
               <a:buChar char="•"/>
             </a:pPr>
             <a:r>
-              <a:rPr lang="de-DE" sz="1600" b="1" dirty="0" smtClean="0"/>
+              <a:rPr lang="de-DE" sz="1600" b="1" dirty="0"/>
               <a:t>Python</a:t>
             </a:r>
           </a:p>
@@ -19538,10 +19532,10 @@
               <a:buChar char="•"/>
             </a:pPr>
             <a:r>
-              <a:rPr lang="de-DE" sz="1600" dirty="0" err="1" smtClean="0"/>
+              <a:rPr lang="de-DE" sz="1600" dirty="0" err="1"/>
               <a:t>blabla</a:t>
             </a:r>
-            <a:endParaRPr lang="de-DE" sz="1600" dirty="0" smtClean="0"/>
+            <a:endParaRPr lang="de-DE" sz="1600" dirty="0"/>
           </a:p>
         </p:txBody>
       </p:sp>
@@ -19584,7 +19578,7 @@
           <a:lstStyle/>
           <a:p>
             <a:pPr algn="ctr"/>
-            <a:endParaRPr lang="de-DE" sz="1600" dirty="0" smtClean="0"/>
+            <a:endParaRPr lang="de-DE" sz="1600" dirty="0"/>
           </a:p>
         </p:txBody>
       </p:sp>
@@ -19638,7 +19632,7 @@
         <p:spPr>
           <a:xfrm>
             <a:off x="7032942" y="3444240"/>
-            <a:ext cx="1829436" cy="693523"/>
+            <a:ext cx="1917770" cy="961802"/>
           </a:xfrm>
           <a:prstGeom prst="rect">
             <a:avLst/>
@@ -19665,9 +19659,14 @@
               <a:buChar char="•"/>
             </a:pPr>
             <a:r>
-              <a:rPr lang="de-DE" sz="1600" b="1" dirty="0" smtClean="0"/>
-              <a:t>Python</a:t>
-            </a:r>
+              <a:rPr lang="de-DE" sz="1600" b="1" dirty="0"/>
+              <a:t>Python, </a:t>
+            </a:r>
+            <a:r>
+              <a:rPr lang="de-DE" sz="1600" b="1" dirty="0" err="1"/>
+              <a:t>InfluxDB</a:t>
+            </a:r>
+            <a:endParaRPr lang="de-DE" sz="1600" b="1" dirty="0"/>
           </a:p>
           <a:p>
             <a:pPr marL="285750" indent="-285750">
@@ -19684,10 +19683,10 @@
               <a:buChar char="•"/>
             </a:pPr>
             <a:r>
-              <a:rPr lang="de-DE" sz="1600" dirty="0" err="1" smtClean="0"/>
+              <a:rPr lang="de-DE" sz="1600" dirty="0" err="1"/>
               <a:t>blabla</a:t>
             </a:r>
-            <a:endParaRPr lang="de-DE" sz="1600" dirty="0" smtClean="0"/>
+            <a:endParaRPr lang="de-DE" sz="1600" dirty="0"/>
           </a:p>
         </p:txBody>
       </p:sp>
@@ -19725,14 +19724,14 @@
               </a:buClr>
             </a:pPr>
             <a:r>
-              <a:rPr lang="de-DE" sz="1200" dirty="0" err="1" smtClean="0">
+              <a:rPr lang="de-DE" sz="1200" dirty="0" err="1">
                 <a:solidFill>
                   <a:srgbClr val="00B0F0"/>
                 </a:solidFill>
               </a:rPr>
               <a:t>protocol</a:t>
             </a:r>
-            <a:endParaRPr lang="de-DE" sz="1200" dirty="0" smtClean="0">
+            <a:endParaRPr lang="de-DE" sz="1200" dirty="0">
               <a:solidFill>
                 <a:srgbClr val="00B0F0"/>
               </a:solidFill>
@@ -19779,7 +19778,7 @@
           <a:lstStyle/>
           <a:p>
             <a:pPr algn="ctr"/>
-            <a:endParaRPr lang="de-DE" sz="1600" dirty="0" smtClean="0"/>
+            <a:endParaRPr lang="de-DE" sz="1600" dirty="0"/>
           </a:p>
         </p:txBody>
       </p:sp>
@@ -19860,11 +19859,11 @@
               <a:buChar char="•"/>
             </a:pPr>
             <a:r>
-              <a:rPr lang="de-DE" sz="1600" b="1" dirty="0" err="1" smtClean="0"/>
+              <a:rPr lang="de-DE" sz="1600" b="1" dirty="0" err="1"/>
               <a:t>Solidity</a:t>
             </a:r>
             <a:r>
-              <a:rPr lang="de-DE" sz="1600" b="1" dirty="0" smtClean="0"/>
+              <a:rPr lang="de-DE" sz="1600" b="1" dirty="0"/>
               <a:t>, Python</a:t>
             </a:r>
           </a:p>
@@ -19883,10 +19882,10 @@
               <a:buChar char="•"/>
             </a:pPr>
             <a:r>
-              <a:rPr lang="de-DE" sz="1600" dirty="0" err="1" smtClean="0"/>
+              <a:rPr lang="de-DE" sz="1600" dirty="0" err="1"/>
               <a:t>blabla</a:t>
             </a:r>
-            <a:endParaRPr lang="de-DE" sz="1600" dirty="0" smtClean="0"/>
+            <a:endParaRPr lang="de-DE" sz="1600" dirty="0"/>
           </a:p>
         </p:txBody>
       </p:sp>
@@ -19924,7 +19923,7 @@
               </a:buClr>
             </a:pPr>
             <a:r>
-              <a:rPr lang="de-DE" sz="1100" i="1" dirty="0" smtClean="0"/>
+              <a:rPr lang="de-DE" sz="1100" i="1" dirty="0"/>
               <a:t>QR-Code Scanner</a:t>
             </a:r>
           </a:p>
@@ -19964,7 +19963,7 @@
               </a:buClr>
             </a:pPr>
             <a:r>
-              <a:rPr lang="de-DE" sz="1100" i="1" dirty="0" smtClean="0"/>
+              <a:rPr lang="de-DE" sz="1100" i="1" dirty="0"/>
               <a:t>Server</a:t>
             </a:r>
           </a:p>
@@ -20004,10 +20003,10 @@
               </a:buClr>
             </a:pPr>
             <a:r>
-              <a:rPr lang="de-DE" sz="1100" i="1" dirty="0" err="1" smtClean="0"/>
+              <a:rPr lang="de-DE" sz="1100" i="1" dirty="0" err="1"/>
               <a:t>Blockchain</a:t>
             </a:r>
-            <a:endParaRPr lang="de-DE" sz="1100" i="1" dirty="0" smtClean="0"/>
+            <a:endParaRPr lang="de-DE" sz="1100" i="1" dirty="0"/>
           </a:p>
         </p:txBody>
       </p:sp>
@@ -20045,7 +20044,7 @@
               </a:buClr>
             </a:pPr>
             <a:r>
-              <a:rPr lang="de-DE" sz="1100" i="1" dirty="0" smtClean="0"/>
+              <a:rPr lang="de-DE" sz="1100" i="1" dirty="0"/>
               <a:t>User Interface</a:t>
             </a:r>
           </a:p>
@@ -20085,14 +20084,14 @@
               </a:buClr>
             </a:pPr>
             <a:r>
-              <a:rPr lang="de-DE" sz="1200" dirty="0" err="1" smtClean="0">
+              <a:rPr lang="de-DE" sz="1200" dirty="0" err="1">
                 <a:solidFill>
                   <a:srgbClr val="00B0F0"/>
                 </a:solidFill>
               </a:rPr>
               <a:t>protocol</a:t>
             </a:r>
-            <a:endParaRPr lang="de-DE" sz="1200" dirty="0" smtClean="0">
+            <a:endParaRPr lang="de-DE" sz="1200" dirty="0">
               <a:solidFill>
                 <a:srgbClr val="00B0F0"/>
               </a:solidFill>
@@ -20110,13 +20109,6 @@
   <p:clrMapOvr>
     <a:masterClrMapping/>
   </p:clrMapOvr>
-  <p:timing>
-    <p:tnLst>
-      <p:par>
-        <p:cTn id="1" dur="indefinite" restart="never" nodeType="tmRoot"/>
-      </p:par>
-    </p:tnLst>
-  </p:timing>
 </p:sld>
 </file>
 
@@ -20142,7 +20134,7 @@
           <p:cNvPr id="6" name="Titel 5">
             <a:extLst>
               <a:ext uri="{FF2B5EF4-FFF2-40B4-BE49-F238E27FC236}">
-                <a16:creationId xmlns:a16="http://schemas.microsoft.com/office/drawing/2014/main" xmlns="" id="{6BF0AFA7-69A7-4369-8161-21610A905B1A}"/>
+                <a16:creationId xmlns:a16="http://schemas.microsoft.com/office/drawing/2014/main" id="{6BF0AFA7-69A7-4369-8161-21610A905B1A}"/>
               </a:ext>
             </a:extLst>
           </p:cNvPr>
@@ -20159,10 +20151,9 @@
           <a:lstStyle/>
           <a:p>
             <a:r>
-              <a:rPr lang="de-DE" dirty="0" smtClean="0"/>
+              <a:rPr lang="de-DE" dirty="0"/>
               <a:t>Project Motivation</a:t>
             </a:r>
-            <a:endParaRPr lang="de-DE" dirty="0"/>
           </a:p>
         </p:txBody>
       </p:sp>
@@ -20171,7 +20162,7 @@
           <p:cNvPr id="2" name="Datumsplatzhalter 1">
             <a:extLst>
               <a:ext uri="{FF2B5EF4-FFF2-40B4-BE49-F238E27FC236}">
-                <a16:creationId xmlns:a16="http://schemas.microsoft.com/office/drawing/2014/main" xmlns="" id="{76CF9658-DA7D-455E-B6EC-A07D773F79B0}"/>
+                <a16:creationId xmlns:a16="http://schemas.microsoft.com/office/drawing/2014/main" id="{76CF9658-DA7D-455E-B6EC-A07D773F79B0}"/>
               </a:ext>
             </a:extLst>
           </p:cNvPr>
@@ -20200,7 +20191,7 @@
           <p:cNvPr id="3" name="Fußzeilenplatzhalter 2">
             <a:extLst>
               <a:ext uri="{FF2B5EF4-FFF2-40B4-BE49-F238E27FC236}">
-                <a16:creationId xmlns:a16="http://schemas.microsoft.com/office/drawing/2014/main" xmlns="" id="{60787A50-FFDC-4F08-A1E0-271FBBA86C8E}"/>
+                <a16:creationId xmlns:a16="http://schemas.microsoft.com/office/drawing/2014/main" id="{60787A50-FFDC-4F08-A1E0-271FBBA86C8E}"/>
               </a:ext>
             </a:extLst>
           </p:cNvPr>
@@ -20229,7 +20220,7 @@
           <p:cNvPr id="4" name="Foliennummernplatzhalter 3">
             <a:extLst>
               <a:ext uri="{FF2B5EF4-FFF2-40B4-BE49-F238E27FC236}">
-                <a16:creationId xmlns:a16="http://schemas.microsoft.com/office/drawing/2014/main" xmlns="" id="{C074940A-1407-4EB3-8D77-C5636D3C75A8}"/>
+                <a16:creationId xmlns:a16="http://schemas.microsoft.com/office/drawing/2014/main" id="{C074940A-1407-4EB3-8D77-C5636D3C75A8}"/>
               </a:ext>
             </a:extLst>
           </p:cNvPr>
@@ -20264,13 +20255,6 @@
   <p:clrMapOvr>
     <a:masterClrMapping/>
   </p:clrMapOvr>
-  <p:timing>
-    <p:tnLst>
-      <p:par>
-        <p:cTn id="1" dur="indefinite" restart="never" nodeType="tmRoot"/>
-      </p:par>
-    </p:tnLst>
-  </p:timing>
 </p:sld>
 </file>
 
@@ -20548,7 +20532,7 @@
   <a:extraClrSchemeLst/>
   <a:extLst>
     <a:ext uri="{05A4C25C-085E-4340-85A3-A5531E510DB2}">
-      <thm15:themeFamily xmlns:thm15="http://schemas.microsoft.com/office/thememl/2012/main" xmlns="" name="Uni Master D_16zu10 Institute.potx" id="{C3B3A38B-0338-49FB-B231-116B7D339AEF}" vid="{AA825256-4409-4510-8B2A-E00170960EBA}"/>
+      <thm15:themeFamily xmlns:thm15="http://schemas.microsoft.com/office/thememl/2012/main" name="Uni Master D_16zu10 Institute.potx" id="{C3B3A38B-0338-49FB-B231-116B7D339AEF}" vid="{AA825256-4409-4510-8B2A-E00170960EBA}"/>
     </a:ext>
   </a:extLst>
 </a:theme>
@@ -20749,7 +20733,7 @@
   <a:extraClrSchemeLst/>
   <a:extLst>
     <a:ext uri="{05A4C25C-085E-4340-85A3-A5531E510DB2}">
-      <thm15:themeFamily xmlns:thm15="http://schemas.microsoft.com/office/thememl/2012/main" xmlns="" name="Office Theme" id="{62F939B6-93AF-4DB8-9C6B-D6C7DFDC589F}" vid="{4A3C46E8-61CC-4603-A589-7422A47A8E4A}"/>
+      <thm15:themeFamily xmlns:thm15="http://schemas.microsoft.com/office/thememl/2012/main" name="Office Theme" id="{62F939B6-93AF-4DB8-9C6B-D6C7DFDC589F}" vid="{4A3C46E8-61CC-4603-A589-7422A47A8E4A}"/>
     </a:ext>
   </a:extLst>
 </a:theme>
@@ -20950,7 +20934,7 @@
   <a:extraClrSchemeLst/>
   <a:extLst>
     <a:ext uri="{05A4C25C-085E-4340-85A3-A5531E510DB2}">
-      <thm15:themeFamily xmlns:thm15="http://schemas.microsoft.com/office/thememl/2012/main" xmlns="" name="Office Theme" id="{62F939B6-93AF-4DB8-9C6B-D6C7DFDC589F}" vid="{4A3C46E8-61CC-4603-A589-7422A47A8E4A}"/>
+      <thm15:themeFamily xmlns:thm15="http://schemas.microsoft.com/office/thememl/2012/main" name="Office Theme" id="{62F939B6-93AF-4DB8-9C6B-D6C7DFDC589F}" vid="{4A3C46E8-61CC-4603-A589-7422A47A8E4A}"/>
     </a:ext>
   </a:extLst>
 </a:theme>

</xml_diff>